<commit_message>
Update slides and translator
</commit_message>
<xml_diff>
--- a/Robustness-SSSG.pptx
+++ b/Robustness-SSSG.pptx
@@ -58,33 +58,29 @@
   <p:notesSz cx="6858000" cy="9144000"/>
   <p:embeddedFontLst>
     <p:embeddedFont>
-      <p:font typeface="Open Sans" panose="020B0604020202020204" charset="0"/>
+      <p:font typeface="Cambria Math" panose="02040503050406030204" pitchFamily="18" charset="0"/>
       <p:regular r:id="rId48"/>
-      <p:bold r:id="rId49"/>
-      <p:italic r:id="rId50"/>
-      <p:boldItalic r:id="rId51"/>
     </p:embeddedFont>
     <p:embeddedFont>
-      <p:font typeface="宋体" panose="02010600030101010101" pitchFamily="2" charset="-122"/>
-      <p:regular r:id="rId52"/>
+      <p:font typeface="Open Sans" panose="02010600030101010101" charset="0"/>
+      <p:regular r:id="rId49"/>
+      <p:bold r:id="rId50"/>
+      <p:italic r:id="rId51"/>
+      <p:boldItalic r:id="rId52"/>
     </p:embeddedFont>
     <p:embeddedFont>
-      <p:font typeface="Cambria Math" panose="02040503050406030204" pitchFamily="18" charset="0"/>
+      <p:font typeface="Open Sans Light" panose="02010600030101010101" charset="0"/>
       <p:regular r:id="rId53"/>
+      <p:bold r:id="rId54"/>
+      <p:italic r:id="rId55"/>
+      <p:boldItalic r:id="rId56"/>
     </p:embeddedFont>
     <p:embeddedFont>
-      <p:font typeface="Open Sans Light" panose="020B0604020202020204" charset="0"/>
-      <p:regular r:id="rId54"/>
-      <p:bold r:id="rId55"/>
-      <p:italic r:id="rId56"/>
-      <p:boldItalic r:id="rId57"/>
-    </p:embeddedFont>
-    <p:embeddedFont>
-      <p:font typeface="Open Sans SemiBold" panose="020B0604020202020204" charset="0"/>
-      <p:regular r:id="rId58"/>
-      <p:bold r:id="rId59"/>
-      <p:italic r:id="rId60"/>
-      <p:boldItalic r:id="rId61"/>
+      <p:font typeface="Open Sans SemiBold" panose="02010600030101010101" charset="0"/>
+      <p:regular r:id="rId57"/>
+      <p:bold r:id="rId58"/>
+      <p:italic r:id="rId59"/>
+      <p:boldItalic r:id="rId60"/>
     </p:embeddedFont>
   </p:embeddedFontLst>
   <p:defaultTextStyle>
@@ -1973,10 +1969,9 @@
         <a:lstStyle/>
         <a:p>
           <a:r>
-            <a:rPr lang="en-US" dirty="0" smtClean="0"/>
+            <a:rPr lang="en-US" dirty="0"/>
             <a:t>Requirements</a:t>
           </a:r>
-          <a:endParaRPr lang="en-US" dirty="0"/>
         </a:p>
       </dgm:t>
     </dgm:pt>
@@ -2010,10 +2005,9 @@
         <a:lstStyle/>
         <a:p>
           <a:r>
-            <a:rPr lang="en-US" dirty="0" smtClean="0"/>
+            <a:rPr lang="en-US" dirty="0"/>
             <a:t>Formal Models</a:t>
           </a:r>
-          <a:endParaRPr lang="en-US" dirty="0"/>
         </a:p>
       </dgm:t>
     </dgm:pt>
@@ -2047,10 +2041,9 @@
         <a:lstStyle/>
         <a:p>
           <a:r>
-            <a:rPr lang="en-US" dirty="0" smtClean="0"/>
+            <a:rPr lang="en-US" dirty="0"/>
             <a:t>Implementation</a:t>
           </a:r>
-          <a:endParaRPr lang="en-US" dirty="0"/>
         </a:p>
       </dgm:t>
     </dgm:pt>
@@ -2091,35 +2084,14 @@
         </dgm:presLayoutVars>
       </dgm:prSet>
       <dgm:spPr/>
-      <dgm:t>
-        <a:bodyPr/>
-        <a:lstStyle/>
-        <a:p>
-          <a:endParaRPr lang="en-US"/>
-        </a:p>
-      </dgm:t>
     </dgm:pt>
     <dgm:pt modelId="{71DCDA3D-F6AC-477E-8277-8B1A049BA441}" type="pres">
       <dgm:prSet presAssocID="{B7E0B08A-A644-454A-9758-D5CAFB28A3CA}" presName="sibTrans" presStyleLbl="sibTrans2D1" presStyleIdx="0" presStyleCnt="2"/>
       <dgm:spPr/>
-      <dgm:t>
-        <a:bodyPr/>
-        <a:lstStyle/>
-        <a:p>
-          <a:endParaRPr lang="en-US"/>
-        </a:p>
-      </dgm:t>
     </dgm:pt>
     <dgm:pt modelId="{2F4EE405-88C1-4AF6-B24F-D6226C26F8F3}" type="pres">
       <dgm:prSet presAssocID="{B7E0B08A-A644-454A-9758-D5CAFB28A3CA}" presName="connectorText" presStyleLbl="sibTrans2D1" presStyleIdx="0" presStyleCnt="2"/>
       <dgm:spPr/>
-      <dgm:t>
-        <a:bodyPr/>
-        <a:lstStyle/>
-        <a:p>
-          <a:endParaRPr lang="en-US"/>
-        </a:p>
-      </dgm:t>
     </dgm:pt>
     <dgm:pt modelId="{F72B6CF8-105B-410B-AC54-DA7464EB14C1}" type="pres">
       <dgm:prSet presAssocID="{086413C2-C785-403D-99D3-834A0245019F}" presName="node" presStyleLbl="node1" presStyleIdx="1" presStyleCnt="3">
@@ -2128,35 +2100,14 @@
         </dgm:presLayoutVars>
       </dgm:prSet>
       <dgm:spPr/>
-      <dgm:t>
-        <a:bodyPr/>
-        <a:lstStyle/>
-        <a:p>
-          <a:endParaRPr lang="en-US"/>
-        </a:p>
-      </dgm:t>
     </dgm:pt>
     <dgm:pt modelId="{11530BA9-3DC9-4A49-BA20-8431D4462ED4}" type="pres">
       <dgm:prSet presAssocID="{44A1F245-36D7-4328-AAF3-9698D37D82A9}" presName="sibTrans" presStyleLbl="sibTrans2D1" presStyleIdx="1" presStyleCnt="2" custLinFactNeighborY="14507"/>
       <dgm:spPr/>
-      <dgm:t>
-        <a:bodyPr/>
-        <a:lstStyle/>
-        <a:p>
-          <a:endParaRPr lang="en-US"/>
-        </a:p>
-      </dgm:t>
     </dgm:pt>
     <dgm:pt modelId="{AEF80222-AA16-430E-A2E9-0EC4A65729F9}" type="pres">
       <dgm:prSet presAssocID="{44A1F245-36D7-4328-AAF3-9698D37D82A9}" presName="connectorText" presStyleLbl="sibTrans2D1" presStyleIdx="1" presStyleCnt="2"/>
       <dgm:spPr/>
-      <dgm:t>
-        <a:bodyPr/>
-        <a:lstStyle/>
-        <a:p>
-          <a:endParaRPr lang="en-US"/>
-        </a:p>
-      </dgm:t>
     </dgm:pt>
     <dgm:pt modelId="{B2EC2A35-DAD0-47D9-A89D-EB5C8F343AF9}" type="pres">
       <dgm:prSet presAssocID="{20705E99-54D4-43DC-B43F-32B12B29B9DD}" presName="node" presStyleLbl="node1" presStyleIdx="2" presStyleCnt="3">
@@ -2165,27 +2116,20 @@
         </dgm:presLayoutVars>
       </dgm:prSet>
       <dgm:spPr/>
-      <dgm:t>
-        <a:bodyPr/>
-        <a:lstStyle/>
-        <a:p>
-          <a:endParaRPr lang="en-US"/>
-        </a:p>
-      </dgm:t>
     </dgm:pt>
   </dgm:ptLst>
   <dgm:cxnLst>
+    <dgm:cxn modelId="{FB8FD60E-DF3D-4406-A670-FF0871AEEAC0}" srcId="{F202BABD-B732-4DA8-83EF-41D6FA6F3D28}" destId="{086413C2-C785-403D-99D3-834A0245019F}" srcOrd="1" destOrd="0" parTransId="{F3D23565-456D-4A7E-A256-0AA176BAD525}" sibTransId="{44A1F245-36D7-4328-AAF3-9698D37D82A9}"/>
+    <dgm:cxn modelId="{A4E0155F-62A4-4996-96F1-E6AC3D4A6BBE}" type="presOf" srcId="{20705E99-54D4-43DC-B43F-32B12B29B9DD}" destId="{B2EC2A35-DAD0-47D9-A89D-EB5C8F343AF9}" srcOrd="0" destOrd="0" presId="urn:microsoft.com/office/officeart/2005/8/layout/process2"/>
+    <dgm:cxn modelId="{9F649B62-ED53-4C2D-808D-01833CF85BB7}" type="presOf" srcId="{086413C2-C785-403D-99D3-834A0245019F}" destId="{F72B6CF8-105B-410B-AC54-DA7464EB14C1}" srcOrd="0" destOrd="0" presId="urn:microsoft.com/office/officeart/2005/8/layout/process2"/>
     <dgm:cxn modelId="{B135517C-B95D-471B-B18A-0A7D43B9FC9E}" srcId="{F202BABD-B732-4DA8-83EF-41D6FA6F3D28}" destId="{4E9F245D-6757-4C89-9F8C-64D90C686FD5}" srcOrd="0" destOrd="0" parTransId="{703A834B-BBD7-4BB5-B20F-E547C8746EA0}" sibTransId="{B7E0B08A-A644-454A-9758-D5CAFB28A3CA}"/>
+    <dgm:cxn modelId="{533A0D8E-8547-4692-A924-8F81E00AC74C}" type="presOf" srcId="{44A1F245-36D7-4328-AAF3-9698D37D82A9}" destId="{11530BA9-3DC9-4A49-BA20-8431D4462ED4}" srcOrd="0" destOrd="0" presId="urn:microsoft.com/office/officeart/2005/8/layout/process2"/>
+    <dgm:cxn modelId="{1F8DB29C-97BD-427F-8C21-A403045A1414}" srcId="{F202BABD-B732-4DA8-83EF-41D6FA6F3D28}" destId="{20705E99-54D4-43DC-B43F-32B12B29B9DD}" srcOrd="2" destOrd="0" parTransId="{DB71EF53-8CF8-445B-BFE1-680420C0D91E}" sibTransId="{B06D6090-41F4-4E1F-BE92-602ACEA0C745}"/>
+    <dgm:cxn modelId="{E071F2AD-3D8D-4B22-ABBC-E2CEA0D3C579}" type="presOf" srcId="{B7E0B08A-A644-454A-9758-D5CAFB28A3CA}" destId="{71DCDA3D-F6AC-477E-8277-8B1A049BA441}" srcOrd="0" destOrd="0" presId="urn:microsoft.com/office/officeart/2005/8/layout/process2"/>
     <dgm:cxn modelId="{7D6D11B2-AA89-4350-A431-19054A44BE48}" type="presOf" srcId="{B7E0B08A-A644-454A-9758-D5CAFB28A3CA}" destId="{2F4EE405-88C1-4AF6-B24F-D6226C26F8F3}" srcOrd="1" destOrd="0" presId="urn:microsoft.com/office/officeart/2005/8/layout/process2"/>
     <dgm:cxn modelId="{516A2FCE-C12E-4205-8703-6C318A4BFFC8}" type="presOf" srcId="{44A1F245-36D7-4328-AAF3-9698D37D82A9}" destId="{AEF80222-AA16-430E-A2E9-0EC4A65729F9}" srcOrd="1" destOrd="0" presId="urn:microsoft.com/office/officeart/2005/8/layout/process2"/>
+    <dgm:cxn modelId="{3046A9D1-74FA-40AF-8AE7-3A78376625D1}" type="presOf" srcId="{F202BABD-B732-4DA8-83EF-41D6FA6F3D28}" destId="{CE60B819-AB82-49EA-BA97-417BBB8C6101}" srcOrd="0" destOrd="0" presId="urn:microsoft.com/office/officeart/2005/8/layout/process2"/>
     <dgm:cxn modelId="{9D0B07D3-5117-4655-A382-CD93D1FF683B}" type="presOf" srcId="{4E9F245D-6757-4C89-9F8C-64D90C686FD5}" destId="{F574793B-4AA5-4E02-8858-068A6227A427}" srcOrd="0" destOrd="0" presId="urn:microsoft.com/office/officeart/2005/8/layout/process2"/>
-    <dgm:cxn modelId="{A4E0155F-62A4-4996-96F1-E6AC3D4A6BBE}" type="presOf" srcId="{20705E99-54D4-43DC-B43F-32B12B29B9DD}" destId="{B2EC2A35-DAD0-47D9-A89D-EB5C8F343AF9}" srcOrd="0" destOrd="0" presId="urn:microsoft.com/office/officeart/2005/8/layout/process2"/>
-    <dgm:cxn modelId="{3046A9D1-74FA-40AF-8AE7-3A78376625D1}" type="presOf" srcId="{F202BABD-B732-4DA8-83EF-41D6FA6F3D28}" destId="{CE60B819-AB82-49EA-BA97-417BBB8C6101}" srcOrd="0" destOrd="0" presId="urn:microsoft.com/office/officeart/2005/8/layout/process2"/>
-    <dgm:cxn modelId="{E071F2AD-3D8D-4B22-ABBC-E2CEA0D3C579}" type="presOf" srcId="{B7E0B08A-A644-454A-9758-D5CAFB28A3CA}" destId="{71DCDA3D-F6AC-477E-8277-8B1A049BA441}" srcOrd="0" destOrd="0" presId="urn:microsoft.com/office/officeart/2005/8/layout/process2"/>
-    <dgm:cxn modelId="{533A0D8E-8547-4692-A924-8F81E00AC74C}" type="presOf" srcId="{44A1F245-36D7-4328-AAF3-9698D37D82A9}" destId="{11530BA9-3DC9-4A49-BA20-8431D4462ED4}" srcOrd="0" destOrd="0" presId="urn:microsoft.com/office/officeart/2005/8/layout/process2"/>
-    <dgm:cxn modelId="{1F8DB29C-97BD-427F-8C21-A403045A1414}" srcId="{F202BABD-B732-4DA8-83EF-41D6FA6F3D28}" destId="{20705E99-54D4-43DC-B43F-32B12B29B9DD}" srcOrd="2" destOrd="0" parTransId="{DB71EF53-8CF8-445B-BFE1-680420C0D91E}" sibTransId="{B06D6090-41F4-4E1F-BE92-602ACEA0C745}"/>
-    <dgm:cxn modelId="{9F649B62-ED53-4C2D-808D-01833CF85BB7}" type="presOf" srcId="{086413C2-C785-403D-99D3-834A0245019F}" destId="{F72B6CF8-105B-410B-AC54-DA7464EB14C1}" srcOrd="0" destOrd="0" presId="urn:microsoft.com/office/officeart/2005/8/layout/process2"/>
-    <dgm:cxn modelId="{FB8FD60E-DF3D-4406-A670-FF0871AEEAC0}" srcId="{F202BABD-B732-4DA8-83EF-41D6FA6F3D28}" destId="{086413C2-C785-403D-99D3-834A0245019F}" srcOrd="1" destOrd="0" parTransId="{F3D23565-456D-4A7E-A256-0AA176BAD525}" sibTransId="{44A1F245-36D7-4328-AAF3-9698D37D82A9}"/>
     <dgm:cxn modelId="{8F24B9B9-2DF6-4730-A5D8-B923FB4CDEEF}" type="presParOf" srcId="{CE60B819-AB82-49EA-BA97-417BBB8C6101}" destId="{F574793B-4AA5-4E02-8858-068A6227A427}" srcOrd="0" destOrd="0" presId="urn:microsoft.com/office/officeart/2005/8/layout/process2"/>
     <dgm:cxn modelId="{95C5C9C1-D195-4057-8BBF-51321BB4CDCB}" type="presParOf" srcId="{CE60B819-AB82-49EA-BA97-417BBB8C6101}" destId="{71DCDA3D-F6AC-477E-8277-8B1A049BA441}" srcOrd="1" destOrd="0" presId="urn:microsoft.com/office/officeart/2005/8/layout/process2"/>
     <dgm:cxn modelId="{4ADC17B1-2EE6-4BA3-940D-2836B8323508}" type="presParOf" srcId="{71DCDA3D-F6AC-477E-8277-8B1A049BA441}" destId="{2F4EE405-88C1-4AF6-B24F-D6226C26F8F3}" srcOrd="0" destOrd="0" presId="urn:microsoft.com/office/officeart/2005/8/layout/process2"/>
@@ -2484,13 +2428,6 @@
         </dgm:presLayoutVars>
       </dgm:prSet>
       <dgm:spPr/>
-      <dgm:t>
-        <a:bodyPr/>
-        <a:lstStyle/>
-        <a:p>
-          <a:endParaRPr lang="en-US"/>
-        </a:p>
-      </dgm:t>
     </dgm:pt>
     <dgm:pt modelId="{FE9B7B2D-6E0A-451B-A6B6-B7A47F0A4ED4}" type="pres">
       <dgm:prSet presAssocID="{3D7B3E38-995E-45E6-B8E3-FB502DA80652}" presName="spacerT" presStyleCnt="0"/>
@@ -2499,13 +2436,6 @@
     <dgm:pt modelId="{CAE67F45-C242-4CA0-9A93-1CF54DC6A4B2}" type="pres">
       <dgm:prSet presAssocID="{3D7B3E38-995E-45E6-B8E3-FB502DA80652}" presName="sibTrans" presStyleLbl="sibTrans2D1" presStyleIdx="0" presStyleCnt="3"/>
       <dgm:spPr/>
-      <dgm:t>
-        <a:bodyPr/>
-        <a:lstStyle/>
-        <a:p>
-          <a:endParaRPr lang="en-US"/>
-        </a:p>
-      </dgm:t>
     </dgm:pt>
     <dgm:pt modelId="{2F6879B7-6BBF-4D4F-9AF5-9C6DFF4C5A4B}" type="pres">
       <dgm:prSet presAssocID="{3D7B3E38-995E-45E6-B8E3-FB502DA80652}" presName="spacerB" presStyleCnt="0"/>
@@ -2518,13 +2448,6 @@
         </dgm:presLayoutVars>
       </dgm:prSet>
       <dgm:spPr/>
-      <dgm:t>
-        <a:bodyPr/>
-        <a:lstStyle/>
-        <a:p>
-          <a:endParaRPr lang="en-US"/>
-        </a:p>
-      </dgm:t>
     </dgm:pt>
     <dgm:pt modelId="{37E56C71-CDC9-4B39-92CB-FECEABBAF583}" type="pres">
       <dgm:prSet presAssocID="{22CC6DC0-3F9A-46C5-B765-A8692E00B968}" presName="spacerT" presStyleCnt="0"/>
@@ -2533,13 +2456,6 @@
     <dgm:pt modelId="{A4F524BC-5044-43E9-9ED4-F28F50329C8E}" type="pres">
       <dgm:prSet presAssocID="{22CC6DC0-3F9A-46C5-B765-A8692E00B968}" presName="sibTrans" presStyleLbl="sibTrans2D1" presStyleIdx="1" presStyleCnt="3"/>
       <dgm:spPr/>
-      <dgm:t>
-        <a:bodyPr/>
-        <a:lstStyle/>
-        <a:p>
-          <a:endParaRPr lang="en-US"/>
-        </a:p>
-      </dgm:t>
     </dgm:pt>
     <dgm:pt modelId="{68B319BC-7EE2-42A3-B838-9339FF0A3099}" type="pres">
       <dgm:prSet presAssocID="{22CC6DC0-3F9A-46C5-B765-A8692E00B968}" presName="spacerB" presStyleCnt="0"/>
@@ -2552,35 +2468,14 @@
         </dgm:presLayoutVars>
       </dgm:prSet>
       <dgm:spPr/>
-      <dgm:t>
-        <a:bodyPr/>
-        <a:lstStyle/>
-        <a:p>
-          <a:endParaRPr lang="en-US"/>
-        </a:p>
-      </dgm:t>
     </dgm:pt>
     <dgm:pt modelId="{8C167BF4-3B48-4E48-B7EB-402E1EBCD4C4}" type="pres">
       <dgm:prSet presAssocID="{7F6B5A0A-0F54-4B18-951E-1A0CFC44F6C4}" presName="sibTransLast" presStyleLbl="sibTrans2D1" presStyleIdx="2" presStyleCnt="3"/>
       <dgm:spPr/>
-      <dgm:t>
-        <a:bodyPr/>
-        <a:lstStyle/>
-        <a:p>
-          <a:endParaRPr lang="en-US"/>
-        </a:p>
-      </dgm:t>
     </dgm:pt>
     <dgm:pt modelId="{6D3D89C7-2463-4B65-8B98-57E4FF79799E}" type="pres">
       <dgm:prSet presAssocID="{7F6B5A0A-0F54-4B18-951E-1A0CFC44F6C4}" presName="connectorText" presStyleLbl="sibTrans2D1" presStyleIdx="2" presStyleCnt="3"/>
       <dgm:spPr/>
-      <dgm:t>
-        <a:bodyPr/>
-        <a:lstStyle/>
-        <a:p>
-          <a:endParaRPr lang="en-US"/>
-        </a:p>
-      </dgm:t>
     </dgm:pt>
     <dgm:pt modelId="{019AF5E6-0576-4F30-AF54-C6ABA9F8714D}" type="pres">
       <dgm:prSet presAssocID="{7F6B5A0A-0F54-4B18-951E-1A0CFC44F6C4}" presName="lastNode" presStyleLbl="node1" presStyleIdx="3" presStyleCnt="4">
@@ -2589,29 +2484,22 @@
         </dgm:presLayoutVars>
       </dgm:prSet>
       <dgm:spPr/>
-      <dgm:t>
-        <a:bodyPr/>
-        <a:lstStyle/>
-        <a:p>
-          <a:endParaRPr lang="en-US"/>
-        </a:p>
-      </dgm:t>
     </dgm:pt>
   </dgm:ptLst>
   <dgm:cxnLst>
-    <dgm:cxn modelId="{C4EE0257-8F26-40B8-98FD-28E7D13A18FE}" type="presOf" srcId="{788FFD9D-7404-4CCE-A245-0BD6B0E93B24}" destId="{ADDE6D51-0326-48FC-8262-22DC9FF00928}" srcOrd="0" destOrd="0" presId="urn:microsoft.com/office/officeart/2005/8/layout/equation2"/>
-    <dgm:cxn modelId="{9DF4F15D-83DA-4A81-AC99-DAAA7154E8FC}" type="presOf" srcId="{3D7B3E38-995E-45E6-B8E3-FB502DA80652}" destId="{CAE67F45-C242-4CA0-9A93-1CF54DC6A4B2}" srcOrd="0" destOrd="0" presId="urn:microsoft.com/office/officeart/2005/8/layout/equation2"/>
     <dgm:cxn modelId="{3074BA33-5E6B-4CD8-B00C-4B1D75F82156}" type="presOf" srcId="{22CC6DC0-3F9A-46C5-B765-A8692E00B968}" destId="{A4F524BC-5044-43E9-9ED4-F28F50329C8E}" srcOrd="0" destOrd="0" presId="urn:microsoft.com/office/officeart/2005/8/layout/equation2"/>
     <dgm:cxn modelId="{129B2235-A666-4972-9C81-A32268B29CC3}" srcId="{7F6B5A0A-0F54-4B18-951E-1A0CFC44F6C4}" destId="{788FFD9D-7404-4CCE-A245-0BD6B0E93B24}" srcOrd="0" destOrd="0" parTransId="{5E24E0D7-ADE3-4230-995A-808460C79C74}" sibTransId="{3D7B3E38-995E-45E6-B8E3-FB502DA80652}"/>
+    <dgm:cxn modelId="{204A073C-B394-4995-92B2-29EDC5B85EE2}" type="presOf" srcId="{13DFDD1A-F857-4873-9289-F89CB29F0AE3}" destId="{CEF2E0B5-9AB4-4780-9ABF-357ADA3D91CB}" srcOrd="0" destOrd="0" presId="urn:microsoft.com/office/officeart/2005/8/layout/equation2"/>
+    <dgm:cxn modelId="{19C8C83D-641A-494E-A8D8-62E4FE557EF4}" srcId="{7F6B5A0A-0F54-4B18-951E-1A0CFC44F6C4}" destId="{CDEEB3D3-689E-413A-B48B-3B4C259D2CDA}" srcOrd="1" destOrd="0" parTransId="{F27EFF3B-7C66-4921-A60B-0490F7F05817}" sibTransId="{22CC6DC0-3F9A-46C5-B765-A8692E00B968}"/>
+    <dgm:cxn modelId="{9DF4F15D-83DA-4A81-AC99-DAAA7154E8FC}" type="presOf" srcId="{3D7B3E38-995E-45E6-B8E3-FB502DA80652}" destId="{CAE67F45-C242-4CA0-9A93-1CF54DC6A4B2}" srcOrd="0" destOrd="0" presId="urn:microsoft.com/office/officeart/2005/8/layout/equation2"/>
+    <dgm:cxn modelId="{8A82D260-762D-4E67-B9C2-EE27803E73AC}" type="presOf" srcId="{CDEEB3D3-689E-413A-B48B-3B4C259D2CDA}" destId="{19F58809-13FA-49CC-AECD-B6EA26B8D0F9}" srcOrd="0" destOrd="0" presId="urn:microsoft.com/office/officeart/2005/8/layout/equation2"/>
     <dgm:cxn modelId="{2E697D6D-F056-4088-9E32-833B4B75A03C}" type="presOf" srcId="{09353CC5-9DAE-40D9-A6ED-AC3D6931F2A5}" destId="{019AF5E6-0576-4F30-AF54-C6ABA9F8714D}" srcOrd="0" destOrd="0" presId="urn:microsoft.com/office/officeart/2005/8/layout/equation2"/>
-    <dgm:cxn modelId="{8A82D260-762D-4E67-B9C2-EE27803E73AC}" type="presOf" srcId="{CDEEB3D3-689E-413A-B48B-3B4C259D2CDA}" destId="{19F58809-13FA-49CC-AECD-B6EA26B8D0F9}" srcOrd="0" destOrd="0" presId="urn:microsoft.com/office/officeart/2005/8/layout/equation2"/>
+    <dgm:cxn modelId="{DA7D3650-E88E-4310-A3CB-787262591F55}" type="presOf" srcId="{E7CA5D59-5D6A-4850-A24E-CB6E32D1EA89}" destId="{8C167BF4-3B48-4E48-B7EB-402E1EBCD4C4}" srcOrd="0" destOrd="0" presId="urn:microsoft.com/office/officeart/2005/8/layout/equation2"/>
+    <dgm:cxn modelId="{C4EE0257-8F26-40B8-98FD-28E7D13A18FE}" type="presOf" srcId="{788FFD9D-7404-4CCE-A245-0BD6B0E93B24}" destId="{ADDE6D51-0326-48FC-8262-22DC9FF00928}" srcOrd="0" destOrd="0" presId="urn:microsoft.com/office/officeart/2005/8/layout/equation2"/>
+    <dgm:cxn modelId="{1BFB0EA2-22FF-498D-A19E-FD59F187BE85}" type="presOf" srcId="{7F6B5A0A-0F54-4B18-951E-1A0CFC44F6C4}" destId="{600386E9-DD67-4413-8FD7-D7B9E299B8F1}" srcOrd="0" destOrd="0" presId="urn:microsoft.com/office/officeart/2005/8/layout/equation2"/>
     <dgm:cxn modelId="{683C64B8-0BF0-4A2E-9133-256426DBA86B}" srcId="{7F6B5A0A-0F54-4B18-951E-1A0CFC44F6C4}" destId="{09353CC5-9DAE-40D9-A6ED-AC3D6931F2A5}" srcOrd="3" destOrd="0" parTransId="{DAF3A442-BF4D-4AC2-A3B6-6C05624A55CE}" sibTransId="{00373967-E678-4682-81B8-B346B7B1880E}"/>
+    <dgm:cxn modelId="{CC6B26CB-7305-494E-80B1-A99DB7744352}" srcId="{7F6B5A0A-0F54-4B18-951E-1A0CFC44F6C4}" destId="{13DFDD1A-F857-4873-9289-F89CB29F0AE3}" srcOrd="2" destOrd="0" parTransId="{35071CC0-26AC-4257-906B-C57E6550F4D8}" sibTransId="{E7CA5D59-5D6A-4850-A24E-CB6E32D1EA89}"/>
     <dgm:cxn modelId="{348596DD-86F7-4CC5-9998-9E16C8F5357F}" type="presOf" srcId="{E7CA5D59-5D6A-4850-A24E-CB6E32D1EA89}" destId="{6D3D89C7-2463-4B65-8B98-57E4FF79799E}" srcOrd="1" destOrd="0" presId="urn:microsoft.com/office/officeart/2005/8/layout/equation2"/>
-    <dgm:cxn modelId="{DA7D3650-E88E-4310-A3CB-787262591F55}" type="presOf" srcId="{E7CA5D59-5D6A-4850-A24E-CB6E32D1EA89}" destId="{8C167BF4-3B48-4E48-B7EB-402E1EBCD4C4}" srcOrd="0" destOrd="0" presId="urn:microsoft.com/office/officeart/2005/8/layout/equation2"/>
-    <dgm:cxn modelId="{204A073C-B394-4995-92B2-29EDC5B85EE2}" type="presOf" srcId="{13DFDD1A-F857-4873-9289-F89CB29F0AE3}" destId="{CEF2E0B5-9AB4-4780-9ABF-357ADA3D91CB}" srcOrd="0" destOrd="0" presId="urn:microsoft.com/office/officeart/2005/8/layout/equation2"/>
-    <dgm:cxn modelId="{1BFB0EA2-22FF-498D-A19E-FD59F187BE85}" type="presOf" srcId="{7F6B5A0A-0F54-4B18-951E-1A0CFC44F6C4}" destId="{600386E9-DD67-4413-8FD7-D7B9E299B8F1}" srcOrd="0" destOrd="0" presId="urn:microsoft.com/office/officeart/2005/8/layout/equation2"/>
-    <dgm:cxn modelId="{CC6B26CB-7305-494E-80B1-A99DB7744352}" srcId="{7F6B5A0A-0F54-4B18-951E-1A0CFC44F6C4}" destId="{13DFDD1A-F857-4873-9289-F89CB29F0AE3}" srcOrd="2" destOrd="0" parTransId="{35071CC0-26AC-4257-906B-C57E6550F4D8}" sibTransId="{E7CA5D59-5D6A-4850-A24E-CB6E32D1EA89}"/>
-    <dgm:cxn modelId="{19C8C83D-641A-494E-A8D8-62E4FE557EF4}" srcId="{7F6B5A0A-0F54-4B18-951E-1A0CFC44F6C4}" destId="{CDEEB3D3-689E-413A-B48B-3B4C259D2CDA}" srcOrd="1" destOrd="0" parTransId="{F27EFF3B-7C66-4921-A60B-0490F7F05817}" sibTransId="{22CC6DC0-3F9A-46C5-B765-A8692E00B968}"/>
     <dgm:cxn modelId="{814D597A-20A3-45B0-BCA8-CE4F71C3F6F8}" type="presParOf" srcId="{600386E9-DD67-4413-8FD7-D7B9E299B8F1}" destId="{19697C7A-B482-43A6-ADF5-AAB6958C65CD}" srcOrd="0" destOrd="0" presId="urn:microsoft.com/office/officeart/2005/8/layout/equation2"/>
     <dgm:cxn modelId="{7433A93E-5832-4E98-A452-511F15FD99D7}" type="presParOf" srcId="{19697C7A-B482-43A6-ADF5-AAB6958C65CD}" destId="{ADDE6D51-0326-48FC-8262-22DC9FF00928}" srcOrd="0" destOrd="0" presId="urn:microsoft.com/office/officeart/2005/8/layout/equation2"/>
     <dgm:cxn modelId="{DD4AE222-CE87-40E7-ACA8-0B228B1FEF42}" type="presParOf" srcId="{19697C7A-B482-43A6-ADF5-AAB6958C65CD}" destId="{FE9B7B2D-6E0A-451B-A6B6-B7A47F0A4ED4}" srcOrd="1" destOrd="0" presId="urn:microsoft.com/office/officeart/2005/8/layout/equation2"/>
@@ -2701,7 +2589,7 @@
         </a:bodyPr>
         <a:lstStyle/>
         <a:p>
-          <a:pPr lvl="0" algn="ctr" defTabSz="800100">
+          <a:pPr marL="0" lvl="0" indent="0" algn="ctr" defTabSz="800100">
             <a:lnSpc>
               <a:spcPct val="90000"/>
             </a:lnSpc>
@@ -2711,12 +2599,12 @@
             <a:spcAft>
               <a:spcPct val="35000"/>
             </a:spcAft>
+            <a:buNone/>
           </a:pPr>
           <a:r>
-            <a:rPr lang="en-US" sz="1800" kern="1200" dirty="0" smtClean="0"/>
+            <a:rPr lang="en-US" sz="1800" kern="1200" dirty="0"/>
             <a:t>Requirements</a:t>
           </a:r>
-          <a:endParaRPr lang="en-US" sz="1800" kern="1200" dirty="0"/>
         </a:p>
       </dsp:txBody>
       <dsp:txXfrm>
@@ -2774,7 +2662,7 @@
         </a:bodyPr>
         <a:lstStyle/>
         <a:p>
-          <a:pPr lvl="0" algn="ctr" defTabSz="622300">
+          <a:pPr marL="0" lvl="0" indent="0" algn="ctr" defTabSz="622300">
             <a:lnSpc>
               <a:spcPct val="90000"/>
             </a:lnSpc>
@@ -2784,6 +2672,7 @@
             <a:spcAft>
               <a:spcPct val="35000"/>
             </a:spcAft>
+            <a:buNone/>
           </a:pPr>
           <a:endParaRPr lang="en-US" sz="1400" kern="1200"/>
         </a:p>
@@ -2850,7 +2739,7 @@
         </a:bodyPr>
         <a:lstStyle/>
         <a:p>
-          <a:pPr lvl="0" algn="ctr" defTabSz="800100">
+          <a:pPr marL="0" lvl="0" indent="0" algn="ctr" defTabSz="800100">
             <a:lnSpc>
               <a:spcPct val="90000"/>
             </a:lnSpc>
@@ -2860,12 +2749,12 @@
             <a:spcAft>
               <a:spcPct val="35000"/>
             </a:spcAft>
+            <a:buNone/>
           </a:pPr>
           <a:r>
-            <a:rPr lang="en-US" sz="1800" kern="1200" dirty="0" smtClean="0"/>
+            <a:rPr lang="en-US" sz="1800" kern="1200" dirty="0"/>
             <a:t>Formal Models</a:t>
           </a:r>
-          <a:endParaRPr lang="en-US" sz="1800" kern="1200" dirty="0"/>
         </a:p>
       </dsp:txBody>
       <dsp:txXfrm>
@@ -2923,7 +2812,7 @@
         </a:bodyPr>
         <a:lstStyle/>
         <a:p>
-          <a:pPr lvl="0" algn="ctr" defTabSz="622300">
+          <a:pPr marL="0" lvl="0" indent="0" algn="ctr" defTabSz="622300">
             <a:lnSpc>
               <a:spcPct val="90000"/>
             </a:lnSpc>
@@ -2933,6 +2822,7 @@
             <a:spcAft>
               <a:spcPct val="35000"/>
             </a:spcAft>
+            <a:buNone/>
           </a:pPr>
           <a:endParaRPr lang="en-US" sz="1400" kern="1200"/>
         </a:p>
@@ -2999,7 +2889,7 @@
         </a:bodyPr>
         <a:lstStyle/>
         <a:p>
-          <a:pPr lvl="0" algn="ctr" defTabSz="800100">
+          <a:pPr marL="0" lvl="0" indent="0" algn="ctr" defTabSz="800100">
             <a:lnSpc>
               <a:spcPct val="90000"/>
             </a:lnSpc>
@@ -3009,12 +2899,12 @@
             <a:spcAft>
               <a:spcPct val="35000"/>
             </a:spcAft>
+            <a:buNone/>
           </a:pPr>
           <a:r>
-            <a:rPr lang="en-US" sz="1800" kern="1200" dirty="0" smtClean="0"/>
+            <a:rPr lang="en-US" sz="1800" kern="1200" dirty="0"/>
             <a:t>Implementation</a:t>
           </a:r>
-          <a:endParaRPr lang="en-US" sz="1800" kern="1200" dirty="0"/>
         </a:p>
       </dsp:txBody>
       <dsp:txXfrm>
@@ -3084,7 +2974,7 @@
         </a:bodyPr>
         <a:lstStyle/>
         <a:p>
-          <a:pPr lvl="0" algn="ctr" defTabSz="355600">
+          <a:pPr marL="0" lvl="0" indent="0" algn="ctr" defTabSz="355600">
             <a:lnSpc>
               <a:spcPct val="90000"/>
             </a:lnSpc>
@@ -3094,6 +2984,7 @@
             <a:spcAft>
               <a:spcPct val="35000"/>
             </a:spcAft>
+            <a:buNone/>
           </a:pPr>
           <a:r>
             <a:rPr lang="en-US" sz="800" kern="1200" dirty="0"/>
@@ -3156,7 +3047,7 @@
         </a:bodyPr>
         <a:lstStyle/>
         <a:p>
-          <a:pPr lvl="0" algn="ctr" defTabSz="266700">
+          <a:pPr marL="0" lvl="0" indent="0" algn="ctr" defTabSz="266700">
             <a:lnSpc>
               <a:spcPct val="90000"/>
             </a:lnSpc>
@@ -3166,6 +3057,7 @@
             <a:spcAft>
               <a:spcPct val="35000"/>
             </a:spcAft>
+            <a:buNone/>
           </a:pPr>
           <a:endParaRPr lang="en-US" sz="600" kern="1200"/>
         </a:p>
@@ -3225,7 +3117,7 @@
         </a:bodyPr>
         <a:lstStyle/>
         <a:p>
-          <a:pPr lvl="0" algn="ctr" defTabSz="355600">
+          <a:pPr marL="0" lvl="0" indent="0" algn="ctr" defTabSz="355600">
             <a:lnSpc>
               <a:spcPct val="90000"/>
             </a:lnSpc>
@@ -3235,6 +3127,7 @@
             <a:spcAft>
               <a:spcPct val="35000"/>
             </a:spcAft>
+            <a:buNone/>
           </a:pPr>
           <a:r>
             <a:rPr lang="en-US" sz="800" kern="1200" dirty="0" err="1"/>
@@ -3301,7 +3194,7 @@
         </a:bodyPr>
         <a:lstStyle/>
         <a:p>
-          <a:pPr lvl="0" algn="ctr" defTabSz="266700">
+          <a:pPr marL="0" lvl="0" indent="0" algn="ctr" defTabSz="266700">
             <a:lnSpc>
               <a:spcPct val="90000"/>
             </a:lnSpc>
@@ -3311,6 +3204,7 @@
             <a:spcAft>
               <a:spcPct val="35000"/>
             </a:spcAft>
+            <a:buNone/>
           </a:pPr>
           <a:endParaRPr lang="en-US" sz="600" kern="1200"/>
         </a:p>
@@ -3370,7 +3264,7 @@
         </a:bodyPr>
         <a:lstStyle/>
         <a:p>
-          <a:pPr lvl="0" algn="ctr" defTabSz="355600">
+          <a:pPr marL="0" lvl="0" indent="0" algn="ctr" defTabSz="355600">
             <a:lnSpc>
               <a:spcPct val="90000"/>
             </a:lnSpc>
@@ -3380,6 +3274,7 @@
             <a:spcAft>
               <a:spcPct val="35000"/>
             </a:spcAft>
+            <a:buNone/>
           </a:pPr>
           <a:r>
             <a:rPr lang="en-US" sz="800" kern="1200" dirty="0"/>
@@ -3445,7 +3340,7 @@
         </a:bodyPr>
         <a:lstStyle/>
         <a:p>
-          <a:pPr lvl="0" algn="ctr" defTabSz="311150">
+          <a:pPr marL="0" lvl="0" indent="0" algn="ctr" defTabSz="311150">
             <a:lnSpc>
               <a:spcPct val="90000"/>
             </a:lnSpc>
@@ -3455,6 +3350,7 @@
             <a:spcAft>
               <a:spcPct val="35000"/>
             </a:spcAft>
+            <a:buNone/>
           </a:pPr>
           <a:endParaRPr lang="en-US" sz="700" kern="1200"/>
         </a:p>
@@ -3514,7 +3410,7 @@
         </a:bodyPr>
         <a:lstStyle/>
         <a:p>
-          <a:pPr lvl="0" algn="ctr" defTabSz="533400">
+          <a:pPr marL="0" lvl="0" indent="0" algn="ctr" defTabSz="533400">
             <a:lnSpc>
               <a:spcPct val="90000"/>
             </a:lnSpc>
@@ -3524,6 +3420,7 @@
             <a:spcAft>
               <a:spcPct val="35000"/>
             </a:spcAft>
+            <a:buNone/>
           </a:pPr>
           <a:r>
             <a:rPr lang="en-US" sz="1200" kern="1200" dirty="0"/>
@@ -6618,7 +6515,17 @@
           <a:p>
             <a:r>
               <a:rPr lang="en-US" altLang="zh-CN" dirty="0"/>
-              <a:t>Later, I’ll use an example to show how this can happen</a:t>
+              <a:t>Basically, an LTS describes a state machine</a:t>
+            </a:r>
+          </a:p>
+          <a:p>
+            <a:r>
+              <a:rPr lang="en-US" altLang="zh-CN" dirty="0"/>
+              <a:t>For</a:t>
+            </a:r>
+            <a:r>
+              <a:rPr lang="en-US" altLang="zh-CN" baseline="0" dirty="0"/>
+              <a:t> events start with h, it refers to an event by a user.</a:t>
             </a:r>
             <a:endParaRPr lang="zh-CN" altLang="en-US" dirty="0"/>
           </a:p>
@@ -6627,7 +6534,7 @@
     </p:spTree>
     <p:extLst>
       <p:ext uri="{BB962C8B-B14F-4D97-AF65-F5344CB8AC3E}">
-        <p14:creationId xmlns:p14="http://schemas.microsoft.com/office/powerpoint/2010/main" val="3832254359"/>
+        <p14:creationId xmlns:p14="http://schemas.microsoft.com/office/powerpoint/2010/main" val="1547276267"/>
       </p:ext>
     </p:extLst>
   </p:cSld>
@@ -6687,17 +6594,17 @@
           <a:lstStyle/>
           <a:p>
             <a:r>
-              <a:rPr lang="en-US" dirty="0" smtClean="0"/>
-              <a:t>Miss-behaving human</a:t>
+              <a:rPr lang="en-US" altLang="zh-CN" dirty="0"/>
+              <a:t>Later, I’ll use an example to show how this can happen</a:t>
             </a:r>
-            <a:endParaRPr lang="en-US" dirty="0"/>
+            <a:endParaRPr lang="zh-CN" altLang="en-US" dirty="0"/>
           </a:p>
         </p:txBody>
       </p:sp>
     </p:spTree>
     <p:extLst>
       <p:ext uri="{BB962C8B-B14F-4D97-AF65-F5344CB8AC3E}">
-        <p14:creationId xmlns:p14="http://schemas.microsoft.com/office/powerpoint/2010/main" val="815507627"/>
+        <p14:creationId xmlns:p14="http://schemas.microsoft.com/office/powerpoint/2010/main" val="3832254359"/>
       </p:ext>
     </p:extLst>
   </p:cSld>
@@ -6756,14 +6663,17 @@
           <a:bodyPr/>
           <a:lstStyle/>
           <a:p>
-            <a:endParaRPr lang="zh-CN" altLang="en-US" dirty="0"/>
+            <a:r>
+              <a:rPr lang="en-US" dirty="0"/>
+              <a:t>Miss-behaving human</a:t>
+            </a:r>
           </a:p>
         </p:txBody>
       </p:sp>
     </p:spTree>
     <p:extLst>
       <p:ext uri="{BB962C8B-B14F-4D97-AF65-F5344CB8AC3E}">
-        <p14:creationId xmlns:p14="http://schemas.microsoft.com/office/powerpoint/2010/main" val="3132018796"/>
+        <p14:creationId xmlns:p14="http://schemas.microsoft.com/office/powerpoint/2010/main" val="815507627"/>
       </p:ext>
     </p:extLst>
   </p:cSld>
@@ -6822,14 +6732,6 @@
           <a:bodyPr/>
           <a:lstStyle/>
           <a:p>
-            <a:r>
-              <a:rPr lang="en-US" altLang="zh-CN" dirty="0" smtClean="0"/>
-              <a:t>One example</a:t>
-            </a:r>
-            <a:r>
-              <a:rPr lang="en-US" altLang="zh-CN" baseline="0" dirty="0" smtClean="0"/>
-              <a:t> of errors in the environment which violates the property.</a:t>
-            </a:r>
             <a:endParaRPr lang="zh-CN" altLang="en-US" dirty="0"/>
           </a:p>
         </p:txBody>
@@ -6837,7 +6739,7 @@
     </p:spTree>
     <p:extLst>
       <p:ext uri="{BB962C8B-B14F-4D97-AF65-F5344CB8AC3E}">
-        <p14:creationId xmlns:p14="http://schemas.microsoft.com/office/powerpoint/2010/main" val="3270550227"/>
+        <p14:creationId xmlns:p14="http://schemas.microsoft.com/office/powerpoint/2010/main" val="3132018796"/>
       </p:ext>
     </p:extLst>
   </p:cSld>
@@ -6896,6 +6798,14 @@
           <a:bodyPr/>
           <a:lstStyle/>
           <a:p>
+            <a:r>
+              <a:rPr lang="en-US" altLang="zh-CN" dirty="0"/>
+              <a:t>One example</a:t>
+            </a:r>
+            <a:r>
+              <a:rPr lang="en-US" altLang="zh-CN" baseline="0" dirty="0"/>
+              <a:t> of errors in the environment which violates the property.</a:t>
+            </a:r>
             <a:endParaRPr lang="zh-CN" altLang="en-US" dirty="0"/>
           </a:p>
         </p:txBody>
@@ -6903,7 +6813,7 @@
     </p:spTree>
     <p:extLst>
       <p:ext uri="{BB962C8B-B14F-4D97-AF65-F5344CB8AC3E}">
-        <p14:creationId xmlns:p14="http://schemas.microsoft.com/office/powerpoint/2010/main" val="1561140675"/>
+        <p14:creationId xmlns:p14="http://schemas.microsoft.com/office/powerpoint/2010/main" val="3270550227"/>
       </p:ext>
     </p:extLst>
   </p:cSld>
@@ -6962,25 +6872,6 @@
           <a:bodyPr/>
           <a:lstStyle/>
           <a:p>
-            <a:pPr marL="158750" indent="0">
-              <a:buNone/>
-            </a:pPr>
-            <a:r>
-              <a:rPr lang="en-US" altLang="zh-CN" dirty="0" smtClean="0"/>
-              <a:t>Show a </a:t>
-            </a:r>
-            <a:r>
-              <a:rPr lang="en-US" altLang="zh-CN" dirty="0" err="1" smtClean="0"/>
-              <a:t>venn</a:t>
-            </a:r>
-            <a:r>
-              <a:rPr lang="en-US" altLang="zh-CN" dirty="0" smtClean="0"/>
-              <a:t> what </a:t>
-            </a:r>
-            <a:r>
-              <a:rPr lang="en-US" altLang="zh-CN" dirty="0" smtClean="0"/>
-              <a:t>is delta</a:t>
-            </a:r>
             <a:endParaRPr lang="zh-CN" altLang="en-US" dirty="0"/>
           </a:p>
         </p:txBody>
@@ -6988,7 +6879,7 @@
     </p:spTree>
     <p:extLst>
       <p:ext uri="{BB962C8B-B14F-4D97-AF65-F5344CB8AC3E}">
-        <p14:creationId xmlns:p14="http://schemas.microsoft.com/office/powerpoint/2010/main" val="1174819320"/>
+        <p14:creationId xmlns:p14="http://schemas.microsoft.com/office/powerpoint/2010/main" val="1561140675"/>
       </p:ext>
     </p:extLst>
   </p:cSld>
@@ -7047,21 +6938,20 @@
           <a:bodyPr/>
           <a:lstStyle/>
           <a:p>
+            <a:pPr marL="158750" indent="0">
+              <a:buNone/>
+            </a:pPr>
             <a:r>
-              <a:rPr lang="en-US" altLang="zh-CN" dirty="0" smtClean="0"/>
-              <a:t>In the coffee machine example, we developed an erroneous environment model and verified that it does not satisfy the property.</a:t>
+              <a:rPr lang="en-US" altLang="zh-CN" dirty="0"/>
+              <a:t>Show a </a:t>
             </a:r>
-          </a:p>
-          <a:p>
             <a:r>
-              <a:rPr lang="en-US" altLang="zh-CN" dirty="0" smtClean="0"/>
-              <a:t>However, this is just one case, it is often impossible to enumerate all the human behaviors.</a:t>
+              <a:rPr lang="en-US" altLang="zh-CN" dirty="0" err="1"/>
+              <a:t>venn</a:t>
             </a:r>
-          </a:p>
-          <a:p>
             <a:r>
-              <a:rPr lang="en-US" altLang="zh-CN" dirty="0" smtClean="0"/>
-              <a:t>Thus, we cannot tell what kind of errors the system can handle and what it cannot.</a:t>
+              <a:rPr lang="en-US" altLang="zh-CN" dirty="0"/>
+              <a:t> what is delta</a:t>
             </a:r>
             <a:endParaRPr lang="zh-CN" altLang="en-US" dirty="0"/>
           </a:p>
@@ -7070,7 +6960,7 @@
     </p:spTree>
     <p:extLst>
       <p:ext uri="{BB962C8B-B14F-4D97-AF65-F5344CB8AC3E}">
-        <p14:creationId xmlns:p14="http://schemas.microsoft.com/office/powerpoint/2010/main" val="954646274"/>
+        <p14:creationId xmlns:p14="http://schemas.microsoft.com/office/powerpoint/2010/main" val="1174819320"/>
       </p:ext>
     </p:extLst>
   </p:cSld>
@@ -7129,14 +7019,30 @@
           <a:bodyPr/>
           <a:lstStyle/>
           <a:p>
-            <a:endParaRPr lang="en-US" dirty="0"/>
+            <a:r>
+              <a:rPr lang="en-US" altLang="zh-CN" dirty="0"/>
+              <a:t>In the coffee machine example, we developed an erroneous environment model and verified that it does not satisfy the property.</a:t>
+            </a:r>
+          </a:p>
+          <a:p>
+            <a:r>
+              <a:rPr lang="en-US" altLang="zh-CN" dirty="0"/>
+              <a:t>However, this is just one case, it is often impossible to enumerate all the human behaviors.</a:t>
+            </a:r>
+          </a:p>
+          <a:p>
+            <a:r>
+              <a:rPr lang="en-US" altLang="zh-CN" dirty="0"/>
+              <a:t>Thus, we cannot tell what kind of errors the system can handle and what it cannot.</a:t>
+            </a:r>
+            <a:endParaRPr lang="zh-CN" altLang="en-US" dirty="0"/>
           </a:p>
         </p:txBody>
       </p:sp>
     </p:spTree>
     <p:extLst>
       <p:ext uri="{BB962C8B-B14F-4D97-AF65-F5344CB8AC3E}">
-        <p14:creationId xmlns:p14="http://schemas.microsoft.com/office/powerpoint/2010/main" val="2258562081"/>
+        <p14:creationId xmlns:p14="http://schemas.microsoft.com/office/powerpoint/2010/main" val="954646274"/>
       </p:ext>
     </p:extLst>
   </p:cSld>
@@ -7195,17 +7101,14 @@
           <a:bodyPr/>
           <a:lstStyle/>
           <a:p>
-            <a:pPr marL="158750" indent="0">
-              <a:buNone/>
-            </a:pPr>
-            <a:endParaRPr lang="zh-CN" altLang="en-US" dirty="0"/>
+            <a:endParaRPr lang="en-US" dirty="0"/>
           </a:p>
         </p:txBody>
       </p:sp>
     </p:spTree>
     <p:extLst>
       <p:ext uri="{BB962C8B-B14F-4D97-AF65-F5344CB8AC3E}">
-        <p14:creationId xmlns:p14="http://schemas.microsoft.com/office/powerpoint/2010/main" val="2882009939"/>
+        <p14:creationId xmlns:p14="http://schemas.microsoft.com/office/powerpoint/2010/main" val="2258562081"/>
       </p:ext>
     </p:extLst>
   </p:cSld>
@@ -7264,14 +7167,17 @@
           <a:bodyPr/>
           <a:lstStyle/>
           <a:p>
-            <a:endParaRPr lang="en-US" dirty="0"/>
+            <a:pPr marL="158750" indent="0">
+              <a:buNone/>
+            </a:pPr>
+            <a:endParaRPr lang="zh-CN" altLang="en-US" dirty="0"/>
           </a:p>
         </p:txBody>
       </p:sp>
     </p:spTree>
     <p:extLst>
       <p:ext uri="{BB962C8B-B14F-4D97-AF65-F5344CB8AC3E}">
-        <p14:creationId xmlns:p14="http://schemas.microsoft.com/office/powerpoint/2010/main" val="1191776298"/>
+        <p14:creationId xmlns:p14="http://schemas.microsoft.com/office/powerpoint/2010/main" val="2882009939"/>
       </p:ext>
     </p:extLst>
   </p:cSld>
@@ -7406,54 +7312,14 @@
           <a:bodyPr/>
           <a:lstStyle/>
           <a:p>
-            <a:pPr marL="457200" indent="-298450"/>
-            <a:r>
-              <a:rPr lang="en-US" altLang="zh-CN" dirty="0"/>
-              <a:t>Why this is useful?</a:t>
-            </a:r>
-          </a:p>
-          <a:p>
-            <a:pPr marL="457200" indent="-298450"/>
-            <a:r>
-              <a:rPr lang="en-US" altLang="zh-CN" dirty="0"/>
-              <a:t>One use case: there’s always a cost to make a system more robust!</a:t>
-            </a:r>
-          </a:p>
-          <a:p>
-            <a:pPr marL="457200" indent="-298450"/>
-            <a:r>
-              <a:rPr lang="en-US" altLang="zh-CN" dirty="0"/>
-              <a:t>In the coffee machine example,</a:t>
-            </a:r>
-          </a:p>
-          <a:p>
-            <a:pPr marL="457200" indent="-298450"/>
-            <a:r>
-              <a:rPr lang="en-US" altLang="zh-CN" dirty="0"/>
-              <a:t>what kind of human error we’d like to prevent?</a:t>
-            </a:r>
-            <a:r>
-              <a:rPr lang="zh-CN" altLang="en-US" dirty="0"/>
-              <a:t> </a:t>
-            </a:r>
-            <a:r>
-              <a:rPr lang="en-US" altLang="zh-CN" dirty="0"/>
-              <a:t>Forgetting to place the mug seems not a valuable error to invest on.</a:t>
-            </a:r>
-          </a:p>
-          <a:p>
-            <a:pPr marL="457200" indent="-298450"/>
-            <a:r>
-              <a:rPr lang="en-US" altLang="zh-CN" dirty="0"/>
-              <a:t>Is the design consistent with our intention? Do we address all the errors we’d like to deal with?</a:t>
-            </a:r>
+            <a:endParaRPr lang="en-US" dirty="0"/>
           </a:p>
         </p:txBody>
       </p:sp>
     </p:spTree>
     <p:extLst>
       <p:ext uri="{BB962C8B-B14F-4D97-AF65-F5344CB8AC3E}">
-        <p14:creationId xmlns:p14="http://schemas.microsoft.com/office/powerpoint/2010/main" val="1883646462"/>
+        <p14:creationId xmlns:p14="http://schemas.microsoft.com/office/powerpoint/2010/main" val="1191776298"/>
       </p:ext>
     </p:extLst>
   </p:cSld>
@@ -7512,6 +7378,112 @@
           <a:bodyPr/>
           <a:lstStyle/>
           <a:p>
+            <a:pPr marL="457200" indent="-298450"/>
+            <a:r>
+              <a:rPr lang="en-US" altLang="zh-CN" dirty="0"/>
+              <a:t>Why this is useful?</a:t>
+            </a:r>
+          </a:p>
+          <a:p>
+            <a:pPr marL="457200" indent="-298450"/>
+            <a:r>
+              <a:rPr lang="en-US" altLang="zh-CN" dirty="0"/>
+              <a:t>One use case: there’s always a cost to make a system more robust!</a:t>
+            </a:r>
+          </a:p>
+          <a:p>
+            <a:pPr marL="457200" indent="-298450"/>
+            <a:r>
+              <a:rPr lang="en-US" altLang="zh-CN" dirty="0"/>
+              <a:t>In the coffee machine example,</a:t>
+            </a:r>
+          </a:p>
+          <a:p>
+            <a:pPr marL="457200" indent="-298450"/>
+            <a:r>
+              <a:rPr lang="en-US" altLang="zh-CN" dirty="0"/>
+              <a:t>what kind of human error we’d like to prevent?</a:t>
+            </a:r>
+            <a:r>
+              <a:rPr lang="zh-CN" altLang="en-US" dirty="0"/>
+              <a:t> </a:t>
+            </a:r>
+            <a:r>
+              <a:rPr lang="en-US" altLang="zh-CN" dirty="0"/>
+              <a:t>Forgetting to place the mug seems not a valuable error to invest on.</a:t>
+            </a:r>
+          </a:p>
+          <a:p>
+            <a:pPr marL="457200" indent="-298450"/>
+            <a:r>
+              <a:rPr lang="en-US" altLang="zh-CN" dirty="0"/>
+              <a:t>Is the design consistent with our intention? Do we address all the errors we’d like to deal with?</a:t>
+            </a:r>
+          </a:p>
+        </p:txBody>
+      </p:sp>
+    </p:spTree>
+    <p:extLst>
+      <p:ext uri="{BB962C8B-B14F-4D97-AF65-F5344CB8AC3E}">
+        <p14:creationId xmlns:p14="http://schemas.microsoft.com/office/powerpoint/2010/main" val="1883646462"/>
+      </p:ext>
+    </p:extLst>
+  </p:cSld>
+  <p:clrMapOvr>
+    <a:masterClrMapping/>
+  </p:clrMapOvr>
+</p:notes>
+</file>
+
+<file path=ppt/notesSlides/notesSlide22.xml><?xml version="1.0" encoding="utf-8"?>
+<p:notes xmlns:a="http://schemas.openxmlformats.org/drawingml/2006/main" xmlns:r="http://schemas.openxmlformats.org/officeDocument/2006/relationships" xmlns:p="http://schemas.openxmlformats.org/presentationml/2006/main">
+  <p:cSld>
+    <p:spTree>
+      <p:nvGrpSpPr>
+        <p:cNvPr id="1" name=""/>
+        <p:cNvGrpSpPr/>
+        <p:nvPr/>
+      </p:nvGrpSpPr>
+      <p:grpSpPr>
+        <a:xfrm>
+          <a:off x="0" y="0"/>
+          <a:ext cx="0" cy="0"/>
+          <a:chOff x="0" y="0"/>
+          <a:chExt cx="0" cy="0"/>
+        </a:xfrm>
+      </p:grpSpPr>
+      <p:sp>
+        <p:nvSpPr>
+          <p:cNvPr id="2" name="Slide Image Placeholder 1"/>
+          <p:cNvSpPr>
+            <a:spLocks noGrp="1" noRot="1" noChangeAspect="1"/>
+          </p:cNvSpPr>
+          <p:nvPr>
+            <p:ph type="sldImg"/>
+          </p:nvPr>
+        </p:nvSpPr>
+        <p:spPr>
+          <a:xfrm>
+            <a:off x="381000" y="685800"/>
+            <a:ext cx="6096000" cy="3429000"/>
+          </a:xfrm>
+        </p:spPr>
+      </p:sp>
+      <p:sp>
+        <p:nvSpPr>
+          <p:cNvPr id="3" name="Notes Placeholder 2"/>
+          <p:cNvSpPr>
+            <a:spLocks noGrp="1"/>
+          </p:cNvSpPr>
+          <p:nvPr>
+            <p:ph type="body" idx="1"/>
+          </p:nvPr>
+        </p:nvSpPr>
+        <p:spPr/>
+        <p:txBody>
+          <a:bodyPr/>
+          <a:lstStyle/>
+          <a:p>
             <a:r>
               <a:rPr lang="en-US" altLang="zh-CN" dirty="0"/>
               <a:t>EOFM is a human task model, it describes that to complete a task, what a human operator should do, when they should perform an action, and when the action is done.</a:t>
@@ -7545,7 +7517,7 @@
 </p:notes>
 </file>
 
-<file path=ppt/notesSlides/notesSlide22.xml><?xml version="1.0" encoding="utf-8"?>
+<file path=ppt/notesSlides/notesSlide23.xml><?xml version="1.0" encoding="utf-8"?>
 <p:notes xmlns:a="http://schemas.openxmlformats.org/drawingml/2006/main" xmlns:r="http://schemas.openxmlformats.org/officeDocument/2006/relationships" xmlns:p="http://schemas.openxmlformats.org/presentationml/2006/main">
   <p:cSld>
     <p:spTree>
@@ -7978,31 +7950,60 @@
           </a:bodyPr>
           <a:lstStyle/>
           <a:p>
-            <a:pPr marL="0" lvl="0" indent="0" algn="l" rtl="0">
+            <a:pPr marL="171450" lvl="0" indent="-171450" algn="l" rtl="0">
               <a:spcBef>
                 <a:spcPts val="0"/>
               </a:spcBef>
               <a:spcAft>
                 <a:spcPts val="0"/>
               </a:spcAft>
-              <a:buNone/>
             </a:pPr>
             <a:r>
-              <a:rPr lang="en-US" dirty="0" smtClean="0"/>
+              <a:rPr lang="en-US" dirty="0"/>
               <a:t>In</a:t>
             </a:r>
             <a:r>
-              <a:rPr lang="en-US" baseline="0" dirty="0" smtClean="0"/>
-              <a:t> fuzz testing/chaos engineering just randomize input or </a:t>
+              <a:rPr lang="en-US" baseline="0" dirty="0"/>
+              <a:t> fuzz testing/chaos engineering just randomize input or env to fail the system.</a:t>
             </a:r>
+          </a:p>
+          <a:p>
+            <a:pPr marL="171450" lvl="0" indent="-171450" algn="l" rtl="0">
+              <a:spcBef>
+                <a:spcPts val="0"/>
+              </a:spcBef>
+              <a:spcAft>
+                <a:spcPts val="0"/>
+              </a:spcAft>
+            </a:pPr>
             <a:r>
-              <a:rPr lang="en-US" baseline="0" dirty="0" err="1" smtClean="0"/>
-              <a:t>env</a:t>
+              <a:rPr lang="en-US" baseline="0" dirty="0"/>
+              <a:t>Cannot say lower error rate refers to a more robust system,</a:t>
             </a:r>
+          </a:p>
+          <a:p>
+            <a:pPr marL="171450" lvl="0" indent="-171450" algn="l" rtl="0">
+              <a:spcBef>
+                <a:spcPts val="0"/>
+              </a:spcBef>
+              <a:spcAft>
+                <a:spcPts val="0"/>
+              </a:spcAft>
+            </a:pPr>
             <a:r>
-              <a:rPr lang="en-US" baseline="0" dirty="0" smtClean="0"/>
-              <a:t> to fail the system.</a:t>
+              <a:rPr lang="en-US" baseline="0" dirty="0"/>
+              <a:t>Also, cannot tell what kind of errors the system can handle or not</a:t>
             </a:r>
+          </a:p>
+          <a:p>
+            <a:pPr marL="171450" lvl="0" indent="-171450" algn="l" rtl="0">
+              <a:spcBef>
+                <a:spcPts val="0"/>
+              </a:spcBef>
+              <a:spcAft>
+                <a:spcPts val="0"/>
+              </a:spcAft>
+            </a:pPr>
             <a:endParaRPr lang="en-US" dirty="0"/>
           </a:p>
         </p:txBody>
@@ -8070,17 +8071,17 @@
           <a:lstStyle/>
           <a:p>
             <a:r>
-              <a:rPr lang="en-US" altLang="zh-CN" dirty="0" smtClean="0"/>
+              <a:rPr lang="en-US" altLang="zh-CN" dirty="0"/>
               <a:t>For formal</a:t>
             </a:r>
             <a:r>
-              <a:rPr lang="en-US" altLang="zh-CN" baseline="0" dirty="0" smtClean="0"/>
+              <a:rPr lang="en-US" altLang="zh-CN" baseline="0" dirty="0"/>
               <a:t> methods guys, we build a bridge between requirements and implementation.</a:t>
             </a:r>
           </a:p>
           <a:p>
             <a:r>
-              <a:rPr lang="en-US" altLang="zh-CN" baseline="0" dirty="0" smtClean="0"/>
+              <a:rPr lang="en-US" altLang="zh-CN" baseline="0" dirty="0"/>
               <a:t>And ensure the properties of a system by formal analysis.</a:t>
             </a:r>
             <a:endParaRPr lang="zh-CN" altLang="en-US" dirty="0"/>
@@ -8101,67 +8102,6 @@
 </file>
 
 <file path=ppt/notesSlides/notesSlide7.xml><?xml version="1.0" encoding="utf-8"?>
-<p:notes xmlns:a="http://schemas.openxmlformats.org/drawingml/2006/main" xmlns:r="http://schemas.openxmlformats.org/officeDocument/2006/relationships" xmlns:p="http://schemas.openxmlformats.org/presentationml/2006/main">
-  <p:cSld>
-    <p:spTree>
-      <p:nvGrpSpPr>
-        <p:cNvPr id="1" name=""/>
-        <p:cNvGrpSpPr/>
-        <p:nvPr/>
-      </p:nvGrpSpPr>
-      <p:grpSpPr>
-        <a:xfrm>
-          <a:off x="0" y="0"/>
-          <a:ext cx="0" cy="0"/>
-          <a:chOff x="0" y="0"/>
-          <a:chExt cx="0" cy="0"/>
-        </a:xfrm>
-      </p:grpSpPr>
-      <p:sp>
-        <p:nvSpPr>
-          <p:cNvPr id="2" name="Slide Image Placeholder 1"/>
-          <p:cNvSpPr>
-            <a:spLocks noGrp="1" noRot="1" noChangeAspect="1"/>
-          </p:cNvSpPr>
-          <p:nvPr>
-            <p:ph type="sldImg"/>
-          </p:nvPr>
-        </p:nvSpPr>
-        <p:spPr/>
-      </p:sp>
-      <p:sp>
-        <p:nvSpPr>
-          <p:cNvPr id="3" name="Notes Placeholder 2"/>
-          <p:cNvSpPr>
-            <a:spLocks noGrp="1"/>
-          </p:cNvSpPr>
-          <p:nvPr>
-            <p:ph type="body" idx="1"/>
-          </p:nvPr>
-        </p:nvSpPr>
-        <p:spPr/>
-        <p:txBody>
-          <a:bodyPr/>
-          <a:lstStyle/>
-          <a:p>
-            <a:endParaRPr lang="en-US" dirty="0"/>
-          </a:p>
-        </p:txBody>
-      </p:sp>
-    </p:spTree>
-    <p:extLst>
-      <p:ext uri="{BB962C8B-B14F-4D97-AF65-F5344CB8AC3E}">
-        <p14:creationId xmlns:p14="http://schemas.microsoft.com/office/powerpoint/2010/main" val="209170875"/>
-      </p:ext>
-    </p:extLst>
-  </p:cSld>
-  <p:clrMapOvr>
-    <a:masterClrMapping/>
-  </p:clrMapOvr>
-</p:notes>
-</file>
-
-<file path=ppt/notesSlides/notesSlide8.xml><?xml version="1.0" encoding="utf-8"?>
 <p:notes xmlns:a="http://schemas.openxmlformats.org/drawingml/2006/main" xmlns:r="http://schemas.openxmlformats.org/officeDocument/2006/relationships" xmlns:p="http://schemas.openxmlformats.org/presentationml/2006/main">
   <p:cSld>
     <p:spTree>
@@ -8211,29 +8151,78 @@
           <a:lstStyle/>
           <a:p>
             <a:r>
-              <a:rPr lang="en-US" dirty="0" smtClean="0"/>
-              <a:t>Give</a:t>
+              <a:rPr lang="en-US" altLang="zh-CN" dirty="0"/>
+              <a:t>For instance, when design a communication protocol</a:t>
             </a:r>
-            <a:r>
-              <a:rPr lang="en-US" baseline="0" dirty="0" smtClean="0"/>
-              <a:t> one or two </a:t>
-            </a:r>
-            <a:r>
-              <a:rPr lang="en-US" baseline="0" dirty="0" err="1" smtClean="0"/>
-              <a:t>exmples</a:t>
-            </a:r>
-            <a:r>
-              <a:rPr lang="en-US" baseline="0" dirty="0" smtClean="0"/>
-              <a:t>.</a:t>
-            </a:r>
-            <a:endParaRPr lang="en-US" dirty="0"/>
+            <a:endParaRPr lang="zh-CN" altLang="en-US" dirty="0"/>
           </a:p>
         </p:txBody>
       </p:sp>
     </p:spTree>
     <p:extLst>
       <p:ext uri="{BB962C8B-B14F-4D97-AF65-F5344CB8AC3E}">
-        <p14:creationId xmlns:p14="http://schemas.microsoft.com/office/powerpoint/2010/main" val="2149993869"/>
+        <p14:creationId xmlns:p14="http://schemas.microsoft.com/office/powerpoint/2010/main" val="507233868"/>
+      </p:ext>
+    </p:extLst>
+  </p:cSld>
+  <p:clrMapOvr>
+    <a:masterClrMapping/>
+  </p:clrMapOvr>
+</p:notes>
+</file>
+
+<file path=ppt/notesSlides/notesSlide8.xml><?xml version="1.0" encoding="utf-8"?>
+<p:notes xmlns:a="http://schemas.openxmlformats.org/drawingml/2006/main" xmlns:r="http://schemas.openxmlformats.org/officeDocument/2006/relationships" xmlns:p="http://schemas.openxmlformats.org/presentationml/2006/main">
+  <p:cSld>
+    <p:spTree>
+      <p:nvGrpSpPr>
+        <p:cNvPr id="1" name=""/>
+        <p:cNvGrpSpPr/>
+        <p:nvPr/>
+      </p:nvGrpSpPr>
+      <p:grpSpPr>
+        <a:xfrm>
+          <a:off x="0" y="0"/>
+          <a:ext cx="0" cy="0"/>
+          <a:chOff x="0" y="0"/>
+          <a:chExt cx="0" cy="0"/>
+        </a:xfrm>
+      </p:grpSpPr>
+      <p:sp>
+        <p:nvSpPr>
+          <p:cNvPr id="2" name="Slide Image Placeholder 1"/>
+          <p:cNvSpPr>
+            <a:spLocks noGrp="1" noRot="1" noChangeAspect="1"/>
+          </p:cNvSpPr>
+          <p:nvPr>
+            <p:ph type="sldImg"/>
+          </p:nvPr>
+        </p:nvSpPr>
+        <p:spPr/>
+      </p:sp>
+      <p:sp>
+        <p:nvSpPr>
+          <p:cNvPr id="3" name="Notes Placeholder 2"/>
+          <p:cNvSpPr>
+            <a:spLocks noGrp="1"/>
+          </p:cNvSpPr>
+          <p:nvPr>
+            <p:ph type="body" idx="1"/>
+          </p:nvPr>
+        </p:nvSpPr>
+        <p:spPr/>
+        <p:txBody>
+          <a:bodyPr/>
+          <a:lstStyle/>
+          <a:p>
+            <a:endParaRPr lang="en-US" dirty="0"/>
+          </a:p>
+        </p:txBody>
+      </p:sp>
+    </p:spTree>
+    <p:extLst>
+      <p:ext uri="{BB962C8B-B14F-4D97-AF65-F5344CB8AC3E}">
+        <p14:creationId xmlns:p14="http://schemas.microsoft.com/office/powerpoint/2010/main" val="209170875"/>
       </p:ext>
     </p:extLst>
   </p:cSld>
@@ -8293,31 +8282,29 @@
           <a:lstStyle/>
           <a:p>
             <a:r>
-              <a:rPr lang="en-US" altLang="zh-CN" dirty="0"/>
-              <a:t>Basically, an LTS describes a state </a:t>
+              <a:rPr lang="en-US" dirty="0"/>
+              <a:t>Give</a:t>
             </a:r>
             <a:r>
-              <a:rPr lang="en-US" altLang="zh-CN" dirty="0" smtClean="0"/>
-              <a:t>machine</a:t>
-            </a:r>
-          </a:p>
-          <a:p>
-            <a:r>
-              <a:rPr lang="en-US" altLang="zh-CN" dirty="0" smtClean="0"/>
-              <a:t>For</a:t>
+              <a:rPr lang="en-US" baseline="0" dirty="0"/>
+              <a:t> one or two </a:t>
             </a:r>
             <a:r>
-              <a:rPr lang="en-US" altLang="zh-CN" baseline="0" dirty="0" smtClean="0"/>
-              <a:t> events start with h, it refers to an event by a user.</a:t>
+              <a:rPr lang="en-US" baseline="0" dirty="0" err="1"/>
+              <a:t>exmples</a:t>
             </a:r>
-            <a:endParaRPr lang="zh-CN" altLang="en-US" dirty="0"/>
+            <a:r>
+              <a:rPr lang="en-US" baseline="0" dirty="0"/>
+              <a:t>.</a:t>
+            </a:r>
+            <a:endParaRPr lang="en-US" dirty="0"/>
           </a:p>
         </p:txBody>
       </p:sp>
     </p:spTree>
     <p:extLst>
       <p:ext uri="{BB962C8B-B14F-4D97-AF65-F5344CB8AC3E}">
-        <p14:creationId xmlns:p14="http://schemas.microsoft.com/office/powerpoint/2010/main" val="1547276267"/>
+        <p14:creationId xmlns:p14="http://schemas.microsoft.com/office/powerpoint/2010/main" val="2149993869"/>
       </p:ext>
     </p:extLst>
   </p:cSld>
@@ -13736,13 +13723,6 @@
   <p:clrMapOvr>
     <a:masterClrMapping/>
   </p:clrMapOvr>
-  <p:timing>
-    <p:tnLst>
-      <p:par>
-        <p:cTn id="1" dur="indefinite" restart="never" nodeType="tmRoot"/>
-      </p:par>
-    </p:tnLst>
-  </p:timing>
 </p:sld>
 </file>
 
@@ -13779,10 +13759,9 @@
           <a:lstStyle/>
           <a:p>
             <a:r>
-              <a:rPr lang="en-US" dirty="0" smtClean="0"/>
+              <a:rPr lang="en-US" dirty="0"/>
               <a:t>Approach Overview</a:t>
             </a:r>
-            <a:endParaRPr lang="en-US" dirty="0"/>
           </a:p>
         </p:txBody>
       </p:sp>
@@ -13853,10 +13832,9 @@
           <a:p>
             <a:pPr algn="ctr"/>
             <a:r>
-              <a:rPr lang="en-US" sz="1200" dirty="0" smtClean="0"/>
+              <a:rPr lang="en-US" sz="1200" dirty="0"/>
               <a:t>System Behavior Model</a:t>
             </a:r>
-            <a:endParaRPr lang="en-US" sz="1200" dirty="0"/>
           </a:p>
         </p:txBody>
       </p:sp>
@@ -13895,10 +13873,9 @@
           <a:p>
             <a:pPr algn="ctr"/>
             <a:r>
-              <a:rPr lang="en-US" sz="1200" dirty="0" smtClean="0"/>
+              <a:rPr lang="en-US" sz="1200" dirty="0"/>
               <a:t>Environment Behavior Model</a:t>
             </a:r>
-            <a:endParaRPr lang="en-US" sz="1200" dirty="0"/>
           </a:p>
         </p:txBody>
       </p:sp>
@@ -13937,10 +13914,9 @@
           <a:p>
             <a:pPr algn="ctr"/>
             <a:r>
-              <a:rPr lang="en-US" sz="1200" dirty="0" smtClean="0"/>
+              <a:rPr lang="en-US" sz="1200" dirty="0"/>
               <a:t>Properties</a:t>
             </a:r>
-            <a:endParaRPr lang="en-US" sz="1200" dirty="0"/>
           </a:p>
         </p:txBody>
       </p:sp>
@@ -13979,10 +13955,9 @@
           <a:p>
             <a:pPr algn="ctr"/>
             <a:r>
-              <a:rPr lang="en-US" sz="1200" dirty="0" smtClean="0"/>
+              <a:rPr lang="en-US" sz="1200" dirty="0"/>
               <a:t>Robustness Computer</a:t>
             </a:r>
-            <a:endParaRPr lang="en-US" sz="1200" dirty="0"/>
           </a:p>
         </p:txBody>
       </p:sp>
@@ -14021,10 +13996,9 @@
           <a:p>
             <a:pPr algn="ctr"/>
             <a:r>
-              <a:rPr lang="en-US" sz="1200" dirty="0" smtClean="0"/>
+              <a:rPr lang="en-US" sz="1200" dirty="0"/>
               <a:t>Errors/ Deviations can handle</a:t>
             </a:r>
-            <a:endParaRPr lang="en-US" sz="1200" dirty="0"/>
           </a:p>
         </p:txBody>
       </p:sp>
@@ -14063,10 +14037,9 @@
           <a:p>
             <a:pPr algn="ctr"/>
             <a:r>
-              <a:rPr lang="en-US" sz="1200" dirty="0" smtClean="0"/>
+              <a:rPr lang="en-US" sz="1200" dirty="0"/>
               <a:t>Existing Fault/Error Models</a:t>
             </a:r>
-            <a:endParaRPr lang="en-US" sz="1200" dirty="0"/>
           </a:p>
         </p:txBody>
       </p:sp>
@@ -14105,10 +14078,9 @@
           <a:p>
             <a:pPr algn="ctr"/>
             <a:r>
-              <a:rPr lang="en-US" sz="1200" dirty="0" smtClean="0"/>
+              <a:rPr lang="en-US" sz="1200" dirty="0"/>
               <a:t>A Profile of System Robustness</a:t>
             </a:r>
-            <a:endParaRPr lang="en-US" sz="1200" dirty="0"/>
           </a:p>
         </p:txBody>
       </p:sp>
@@ -14395,10 +14367,9 @@
           <a:p>
             <a:pPr algn="ctr"/>
             <a:r>
-              <a:rPr lang="en-US" dirty="0" smtClean="0"/>
-              <a:t>How to represent robustness from such errors and deviations?</a:t>
+              <a:rPr lang="en-US" dirty="0"/>
+              <a:t>How to map such errors/deviations to existing fault models?</a:t>
             </a:r>
-            <a:endParaRPr lang="en-US" dirty="0"/>
           </a:p>
         </p:txBody>
       </p:sp>
@@ -14526,10 +14497,9 @@
           <a:lstStyle/>
           <a:p>
             <a:r>
-              <a:rPr lang="en-US" dirty="0" smtClean="0"/>
+              <a:rPr lang="en-US" dirty="0"/>
               <a:t>Where are we?</a:t>
             </a:r>
-            <a:endParaRPr lang="en-US" dirty="0"/>
           </a:p>
         </p:txBody>
       </p:sp>
@@ -14600,10 +14570,9 @@
           <a:p>
             <a:pPr algn="ctr"/>
             <a:r>
-              <a:rPr lang="en-US" sz="1200" dirty="0" smtClean="0"/>
+              <a:rPr lang="en-US" sz="1200" dirty="0"/>
               <a:t>System Behavior Model</a:t>
             </a:r>
-            <a:endParaRPr lang="en-US" sz="1200" dirty="0"/>
           </a:p>
         </p:txBody>
       </p:sp>
@@ -14642,10 +14611,9 @@
           <a:p>
             <a:pPr algn="ctr"/>
             <a:r>
-              <a:rPr lang="en-US" sz="1200" dirty="0" smtClean="0"/>
+              <a:rPr lang="en-US" sz="1200" dirty="0"/>
               <a:t>Environment Behavior Model</a:t>
             </a:r>
-            <a:endParaRPr lang="en-US" sz="1200" dirty="0"/>
           </a:p>
         </p:txBody>
       </p:sp>
@@ -14684,10 +14652,9 @@
           <a:p>
             <a:pPr algn="ctr"/>
             <a:r>
-              <a:rPr lang="en-US" sz="1200" dirty="0" smtClean="0"/>
+              <a:rPr lang="en-US" sz="1200" dirty="0"/>
               <a:t>Properties</a:t>
             </a:r>
-            <a:endParaRPr lang="en-US" sz="1200" dirty="0"/>
           </a:p>
         </p:txBody>
       </p:sp>
@@ -14726,10 +14693,9 @@
           <a:p>
             <a:pPr algn="ctr"/>
             <a:r>
-              <a:rPr lang="en-US" sz="1200" dirty="0" smtClean="0"/>
+              <a:rPr lang="en-US" sz="1200" dirty="0"/>
               <a:t>Robustness Computer</a:t>
             </a:r>
-            <a:endParaRPr lang="en-US" sz="1200" dirty="0"/>
           </a:p>
         </p:txBody>
       </p:sp>
@@ -14768,10 +14734,9 @@
           <a:p>
             <a:pPr algn="ctr"/>
             <a:r>
-              <a:rPr lang="en-US" sz="1200" dirty="0" smtClean="0"/>
+              <a:rPr lang="en-US" sz="1200" dirty="0"/>
               <a:t>Errors/ Deviations can handle</a:t>
             </a:r>
-            <a:endParaRPr lang="en-US" sz="1200" dirty="0"/>
           </a:p>
         </p:txBody>
       </p:sp>
@@ -14810,10 +14775,9 @@
           <a:p>
             <a:pPr algn="ctr"/>
             <a:r>
-              <a:rPr lang="en-US" sz="1200" dirty="0" smtClean="0"/>
+              <a:rPr lang="en-US" sz="1200" dirty="0"/>
               <a:t>Existing Fault/Error Models</a:t>
             </a:r>
-            <a:endParaRPr lang="en-US" sz="1200" dirty="0"/>
           </a:p>
         </p:txBody>
       </p:sp>
@@ -14852,10 +14816,9 @@
           <a:p>
             <a:pPr algn="ctr"/>
             <a:r>
-              <a:rPr lang="en-US" sz="1200" dirty="0" smtClean="0"/>
+              <a:rPr lang="en-US" sz="1200" dirty="0"/>
               <a:t>A Profile of System Robustness</a:t>
             </a:r>
-            <a:endParaRPr lang="en-US" sz="1200" dirty="0"/>
           </a:p>
         </p:txBody>
       </p:sp>
@@ -15097,10 +15060,9 @@
           <a:p>
             <a:pPr algn="ctr"/>
             <a:r>
-              <a:rPr lang="en-US" dirty="0" smtClean="0"/>
+              <a:rPr lang="en-US" dirty="0"/>
               <a:t>How to model these behaviors?</a:t>
             </a:r>
-            <a:endParaRPr lang="en-US" dirty="0"/>
           </a:p>
         </p:txBody>
       </p:sp>
@@ -15159,13 +15121,6 @@
   <p:clrMapOvr>
     <a:masterClrMapping/>
   </p:clrMapOvr>
-  <p:timing>
-    <p:tnLst>
-      <p:par>
-        <p:cTn id="1" dur="indefinite" restart="never" nodeType="tmRoot"/>
-      </p:par>
-    </p:tnLst>
-  </p:timing>
 </p:sld>
 </file>
 
@@ -15249,13 +15204,8 @@
           <a:p>
             <a:r>
               <a:rPr lang="en-US" altLang="zh-CN" dirty="0"/>
-              <a:t>Environment: </a:t>
+              <a:t>Environment: Users.</a:t>
             </a:r>
-            <a:r>
-              <a:rPr lang="en-US" altLang="zh-CN" dirty="0" smtClean="0"/>
-              <a:t>Users.</a:t>
-            </a:r>
-            <a:endParaRPr lang="en-US" altLang="zh-CN" dirty="0"/>
           </a:p>
           <a:p>
             <a:endParaRPr lang="en-US" altLang="zh-CN" dirty="0"/>
@@ -15270,23 +15220,14 @@
             <a:pPr lvl="1"/>
             <a:r>
               <a:rPr lang="en-US" altLang="zh-CN" sz="1600" dirty="0"/>
-              <a:t>Safety Property: the system should not do </a:t>
+              <a:t>Safety Property: the system should not do something bad.</a:t>
             </a:r>
-            <a:r>
-              <a:rPr lang="en-US" altLang="zh-CN" sz="1600" dirty="0" smtClean="0"/>
-              <a:t>something bad.</a:t>
-            </a:r>
-            <a:endParaRPr lang="en-US" altLang="zh-CN" sz="1600" dirty="0"/>
           </a:p>
           <a:p>
             <a:pPr lvl="1"/>
             <a:r>
               <a:rPr lang="en-US" altLang="zh-CN" sz="1600" dirty="0"/>
-              <a:t>Liveness Property: the system should do </a:t>
-            </a:r>
-            <a:r>
-              <a:rPr lang="en-US" altLang="zh-CN" sz="1600" dirty="0" smtClean="0"/>
-              <a:t>something good.</a:t>
+              <a:t>Liveness Property: the system should do something good.</a:t>
             </a:r>
             <a:endParaRPr lang="zh-CN" altLang="en-US" sz="1600" dirty="0"/>
           </a:p>
@@ -15369,13 +15310,6 @@
   <p:clrMapOvr>
     <a:masterClrMapping/>
   </p:clrMapOvr>
-  <p:timing>
-    <p:tnLst>
-      <p:par>
-        <p:cTn id="1" dur="indefinite" restart="never" nodeType="tmRoot"/>
-      </p:par>
-    </p:tnLst>
-  </p:timing>
 </p:sld>
 </file>
 
@@ -15616,13 +15550,6 @@
   <p:clrMapOvr>
     <a:masterClrMapping/>
   </p:clrMapOvr>
-  <p:timing>
-    <p:tnLst>
-      <p:par>
-        <p:cTn id="1" dur="indefinite" restart="never" nodeType="tmRoot"/>
-      </p:par>
-    </p:tnLst>
-  </p:timing>
 </p:sld>
 </file>
 
@@ -15927,13 +15854,6 @@
   <p:clrMapOvr>
     <a:masterClrMapping/>
   </p:clrMapOvr>
-  <p:timing>
-    <p:tnLst>
-      <p:par>
-        <p:cTn id="1" dur="indefinite" restart="never" nodeType="tmRoot"/>
-      </p:par>
-    </p:tnLst>
-  </p:timing>
 </p:sld>
 </file>
 
@@ -16323,13 +16243,6 @@
   <p:clrMapOvr>
     <a:masterClrMapping/>
   </p:clrMapOvr>
-  <p:timing>
-    <p:tnLst>
-      <p:par>
-        <p:cTn id="1" dur="indefinite" restart="never" nodeType="tmRoot"/>
-      </p:par>
-    </p:tnLst>
-  </p:timing>
 </p:sld>
 </file>
 
@@ -16576,13 +16489,6 @@
   <p:clrMapOvr>
     <a:masterClrMapping/>
   </p:clrMapOvr>
-  <p:timing>
-    <p:tnLst>
-      <p:par>
-        <p:cTn id="1" dur="indefinite" restart="never" nodeType="tmRoot"/>
-      </p:par>
-    </p:tnLst>
-  </p:timing>
 </p:sld>
 </file>
 
@@ -16724,11 +16630,11 @@
               <a:t>E.g., </a:t>
             </a:r>
             <a:r>
-              <a:rPr lang="en-US" altLang="zh-CN" b="1" i="1" dirty="0" smtClean="0"/>
+              <a:rPr lang="en-US" altLang="zh-CN" b="1" i="1" dirty="0"/>
               <a:t>brew only when the mug is placed</a:t>
             </a:r>
             <a:r>
-              <a:rPr lang="en-US" altLang="zh-CN" dirty="0" smtClean="0"/>
+              <a:rPr lang="en-US" altLang="zh-CN" dirty="0"/>
               <a:t>.</a:t>
             </a:r>
             <a:endParaRPr lang="zh-CN" altLang="en-US" dirty="0"/>
@@ -16818,13 +16724,6 @@
   <p:clrMapOvr>
     <a:masterClrMapping/>
   </p:clrMapOvr>
-  <p:timing>
-    <p:tnLst>
-      <p:par>
-        <p:cTn id="1" dur="indefinite" restart="never" nodeType="tmRoot"/>
-      </p:par>
-    </p:tnLst>
-  </p:timing>
 </p:sld>
 </file>
 
@@ -16966,12 +16865,8 @@
               <a:t>E.g., </a:t>
             </a:r>
             <a:r>
-              <a:rPr lang="en-US" altLang="zh-CN" b="1" i="1" dirty="0" smtClean="0"/>
-              <a:t>brew </a:t>
-            </a:r>
-            <a:r>
               <a:rPr lang="en-US" altLang="zh-CN" b="1" i="1" dirty="0"/>
-              <a:t>only when the mug is placed</a:t>
+              <a:t>brew only when the mug is placed</a:t>
             </a:r>
             <a:r>
               <a:rPr lang="en-US" altLang="zh-CN" dirty="0"/>
@@ -17114,13 +17009,6 @@
   <p:clrMapOvr>
     <a:masterClrMapping/>
   </p:clrMapOvr>
-  <p:timing>
-    <p:tnLst>
-      <p:par>
-        <p:cTn id="1" dur="indefinite" restart="never" nodeType="tmRoot"/>
-      </p:par>
-    </p:tnLst>
-  </p:timing>
 </p:sld>
 </file>
 
@@ -17358,13 +17246,6 @@
   <p:clrMapOvr>
     <a:masterClrMapping/>
   </p:clrMapOvr>
-  <p:timing>
-    <p:tnLst>
-      <p:par>
-        <p:cTn id="1" dur="indefinite" restart="never" nodeType="tmRoot"/>
-      </p:par>
-    </p:tnLst>
-  </p:timing>
 </p:sld>
 </file>
 
@@ -17527,13 +17408,6 @@
   <p:clrMapOvr>
     <a:masterClrMapping/>
   </p:clrMapOvr>
-  <p:timing>
-    <p:tnLst>
-      <p:par>
-        <p:cTn id="1" dur="indefinite" restart="never" nodeType="tmRoot"/>
-      </p:par>
-    </p:tnLst>
-  </p:timing>
 </p:sld>
 </file>
 
@@ -17720,13 +17594,6 @@
   <p:clrMapOvr>
     <a:masterClrMapping/>
   </p:clrMapOvr>
-  <p:timing>
-    <p:tnLst>
-      <p:par>
-        <p:cTn id="1" dur="indefinite" restart="never" nodeType="tmRoot"/>
-      </p:par>
-    </p:tnLst>
-  </p:timing>
 </p:sld>
 </file>
 
@@ -17913,13 +17780,6 @@
   <p:clrMapOvr>
     <a:masterClrMapping/>
   </p:clrMapOvr>
-  <p:timing>
-    <p:tnLst>
-      <p:par>
-        <p:cTn id="1" dur="indefinite" restart="never" nodeType="tmRoot"/>
-      </p:par>
-    </p:tnLst>
-  </p:timing>
 </p:sld>
 </file>
 
@@ -18106,13 +17966,6 @@
   <p:clrMapOvr>
     <a:masterClrMapping/>
   </p:clrMapOvr>
-  <p:timing>
-    <p:tnLst>
-      <p:par>
-        <p:cTn id="1" dur="indefinite" restart="never" nodeType="tmRoot"/>
-      </p:par>
-    </p:tnLst>
-  </p:timing>
 </p:sld>
 </file>
 
@@ -18299,13 +18152,6 @@
   <p:clrMapOvr>
     <a:masterClrMapping/>
   </p:clrMapOvr>
-  <p:timing>
-    <p:tnLst>
-      <p:par>
-        <p:cTn id="1" dur="indefinite" restart="never" nodeType="tmRoot"/>
-      </p:par>
-    </p:tnLst>
-  </p:timing>
 </p:sld>
 </file>
 
@@ -18527,7 +18373,7 @@
           <a:p>
             <a:pPr algn="ctr"/>
             <a:r>
-              <a:rPr lang="en-US" altLang="zh-CN" sz="1800" dirty="0" smtClean="0"/>
+              <a:rPr lang="en-US" altLang="zh-CN" sz="1800" dirty="0"/>
               <a:t>Brewing when NO mug is placed!!!</a:t>
             </a:r>
             <a:endParaRPr lang="zh-CN" altLang="en-US" sz="1800" dirty="0"/>
@@ -18544,13 +18390,6 @@
   <p:clrMapOvr>
     <a:masterClrMapping/>
   </p:clrMapOvr>
-  <p:timing>
-    <p:tnLst>
-      <p:par>
-        <p:cTn id="1" dur="indefinite" restart="never" nodeType="tmRoot"/>
-      </p:par>
-    </p:tnLst>
-  </p:timing>
 </p:sld>
 </file>
 
@@ -18587,10 +18426,9 @@
           <a:lstStyle/>
           <a:p>
             <a:r>
-              <a:rPr lang="en-US" dirty="0" smtClean="0"/>
+              <a:rPr lang="en-US" dirty="0"/>
               <a:t>Where are we?</a:t>
             </a:r>
-            <a:endParaRPr lang="en-US" dirty="0"/>
           </a:p>
         </p:txBody>
       </p:sp>
@@ -18661,10 +18499,9 @@
           <a:p>
             <a:pPr algn="ctr"/>
             <a:r>
-              <a:rPr lang="en-US" sz="1200" dirty="0" smtClean="0"/>
+              <a:rPr lang="en-US" sz="1200" dirty="0"/>
               <a:t>System Behavior Model</a:t>
             </a:r>
-            <a:endParaRPr lang="en-US" sz="1200" dirty="0"/>
           </a:p>
         </p:txBody>
       </p:sp>
@@ -18703,10 +18540,9 @@
           <a:p>
             <a:pPr algn="ctr"/>
             <a:r>
-              <a:rPr lang="en-US" sz="1200" dirty="0" smtClean="0"/>
+              <a:rPr lang="en-US" sz="1200" dirty="0"/>
               <a:t>Environment Behavior Model</a:t>
             </a:r>
-            <a:endParaRPr lang="en-US" sz="1200" dirty="0"/>
           </a:p>
         </p:txBody>
       </p:sp>
@@ -18745,10 +18581,9 @@
           <a:p>
             <a:pPr algn="ctr"/>
             <a:r>
-              <a:rPr lang="en-US" sz="1200" dirty="0" smtClean="0"/>
+              <a:rPr lang="en-US" sz="1200" dirty="0"/>
               <a:t>Properties</a:t>
             </a:r>
-            <a:endParaRPr lang="en-US" sz="1200" dirty="0"/>
           </a:p>
         </p:txBody>
       </p:sp>
@@ -18787,10 +18622,9 @@
           <a:p>
             <a:pPr algn="ctr"/>
             <a:r>
-              <a:rPr lang="en-US" sz="1200" dirty="0" smtClean="0"/>
+              <a:rPr lang="en-US" sz="1200" dirty="0"/>
               <a:t>Robustness Computer</a:t>
             </a:r>
-            <a:endParaRPr lang="en-US" sz="1200" dirty="0"/>
           </a:p>
         </p:txBody>
       </p:sp>
@@ -18829,10 +18663,9 @@
           <a:p>
             <a:pPr algn="ctr"/>
             <a:r>
-              <a:rPr lang="en-US" sz="1200" dirty="0" smtClean="0"/>
+              <a:rPr lang="en-US" sz="1200" dirty="0"/>
               <a:t>Errors/ Deviations can handle</a:t>
             </a:r>
-            <a:endParaRPr lang="en-US" sz="1200" dirty="0"/>
           </a:p>
         </p:txBody>
       </p:sp>
@@ -18871,10 +18704,9 @@
           <a:p>
             <a:pPr algn="ctr"/>
             <a:r>
-              <a:rPr lang="en-US" sz="1200" dirty="0" smtClean="0"/>
+              <a:rPr lang="en-US" sz="1200" dirty="0"/>
               <a:t>Existing Fault/Error Models</a:t>
             </a:r>
-            <a:endParaRPr lang="en-US" sz="1200" dirty="0"/>
           </a:p>
         </p:txBody>
       </p:sp>
@@ -18913,10 +18745,9 @@
           <a:p>
             <a:pPr algn="ctr"/>
             <a:r>
-              <a:rPr lang="en-US" sz="1200" dirty="0" smtClean="0"/>
+              <a:rPr lang="en-US" sz="1200" dirty="0"/>
               <a:t>A Profile of System Robustness</a:t>
             </a:r>
-            <a:endParaRPr lang="en-US" sz="1200" dirty="0"/>
           </a:p>
         </p:txBody>
       </p:sp>
@@ -19158,10 +18989,9 @@
           <a:p>
             <a:pPr algn="ctr"/>
             <a:r>
-              <a:rPr lang="en-US" dirty="0" smtClean="0"/>
+              <a:rPr lang="en-US" dirty="0"/>
               <a:t>How to compute the errors/deviations allowed by a system?</a:t>
             </a:r>
-            <a:endParaRPr lang="en-US" dirty="0"/>
           </a:p>
         </p:txBody>
       </p:sp>
@@ -19220,13 +19050,6 @@
   <p:clrMapOvr>
     <a:masterClrMapping/>
   </p:clrMapOvr>
-  <p:timing>
-    <p:tnLst>
-      <p:par>
-        <p:cTn id="1" dur="indefinite" restart="never" nodeType="tmRoot"/>
-      </p:par>
-    </p:tnLst>
-  </p:timing>
 </p:sld>
 </file>
 
@@ -19597,13 +19420,6 @@
   <p:clrMapOvr>
     <a:masterClrMapping/>
   </p:clrMapOvr>
-  <p:timing>
-    <p:tnLst>
-      <p:par>
-        <p:cTn id="1" dur="indefinite" restart="never" nodeType="tmRoot"/>
-      </p:par>
-    </p:tnLst>
-  </p:timing>
 </p:sld>
 </file>
 
@@ -19653,8 +19469,8 @@
           </a:p>
         </p:txBody>
       </p:sp>
-      <mc:AlternateContent xmlns:mc="http://schemas.openxmlformats.org/markup-compatibility/2006">
-        <mc:Choice xmlns:a14="http://schemas.microsoft.com/office/drawing/2010/main" Requires="a14">
+      <mc:AlternateContent xmlns:mc="http://schemas.openxmlformats.org/markup-compatibility/2006" xmlns:a14="http://schemas.microsoft.com/office/drawing/2010/main">
+        <mc:Choice Requires="a14">
           <p:sp>
             <p:nvSpPr>
               <p:cNvPr id="3" name="Text Placeholder 2">
@@ -19685,7 +19501,7 @@
                   <a:buNone/>
                 </a:pPr>
                 <a:r>
-                  <a:rPr lang="en-US" altLang="zh-CN" sz="1600" dirty="0" smtClean="0"/>
+                  <a:rPr lang="en-US" altLang="zh-CN" sz="1600" dirty="0"/>
                   <a:t>Let </a:t>
                 </a:r>
                 <a14:m>
@@ -19818,19 +19634,15 @@
                 <a:pPr marL="114300" indent="0">
                   <a:buNone/>
                 </a:pPr>
-                <a:endParaRPr lang="en-US" altLang="zh-CN" sz="1600" dirty="0" smtClean="0"/>
+                <a:endParaRPr lang="en-US" altLang="zh-CN" sz="1600" dirty="0"/>
               </a:p>
               <a:p>
                 <a:pPr marL="114300" indent="0">
                   <a:buNone/>
                 </a:pPr>
                 <a:r>
-                  <a:rPr lang="en-US" altLang="zh-CN" sz="1600" dirty="0" smtClean="0"/>
-                  <a:t>If it does, then </a:t>
-                </a:r>
-                <a:r>
                   <a:rPr lang="en-US" altLang="zh-CN" sz="1600" dirty="0"/>
-                  <a:t>we say system </a:t>
+                  <a:t>If it does, then we say system </a:t>
                 </a:r>
                 <a14:m>
                   <m:oMath xmlns:m="http://schemas.openxmlformats.org/officeDocument/2006/math">
@@ -19860,7 +19672,7 @@
                   </m:oMath>
                 </a14:m>
                 <a:r>
-                  <a:rPr lang="en-US" altLang="zh-CN" dirty="0" smtClean="0"/>
+                  <a:rPr lang="en-US" altLang="zh-CN" dirty="0"/>
                   <a:t>,</a:t>
                 </a:r>
                 <a:endParaRPr lang="zh-CN" altLang="en-US" dirty="0"/>
@@ -19869,17 +19681,16 @@
                 <a:pPr marL="114300" indent="0">
                   <a:buNone/>
                 </a:pPr>
-                <a:endParaRPr lang="en-US" altLang="zh-CN" sz="1600" dirty="0" smtClean="0"/>
+                <a:endParaRPr lang="en-US" altLang="zh-CN" sz="1600" dirty="0"/>
               </a:p>
               <a:p>
                 <a:pPr marL="114300" indent="0">
                   <a:buNone/>
                 </a:pPr>
                 <a:r>
-                  <a:rPr lang="en-US" altLang="zh-CN" sz="1600" dirty="0" smtClean="0"/>
+                  <a:rPr lang="en-US" altLang="zh-CN" sz="1600" dirty="0"/>
                   <a:t>where </a:t>
                 </a:r>
-                <a:endParaRPr lang="en-US" altLang="zh-CN" sz="1600" dirty="0"/>
               </a:p>
               <a:p>
                 <a:pPr marL="114300" indent="0">
@@ -19890,7 +19701,7 @@
             </p:txBody>
           </p:sp>
         </mc:Choice>
-        <mc:Fallback>
+        <mc:Fallback xmlns="">
           <p:sp>
             <p:nvSpPr>
               <p:cNvPr id="3" name="Text Placeholder 2">
@@ -20102,8 +19913,8 @@
               <a:chExt cx="1880462" cy="821413"/>
             </a:xfrm>
           </p:grpSpPr>
-          <mc:AlternateContent xmlns:mc="http://schemas.openxmlformats.org/markup-compatibility/2006">
-            <mc:Choice xmlns:a14="http://schemas.microsoft.com/office/drawing/2010/main" Requires="a14">
+          <mc:AlternateContent xmlns:mc="http://schemas.openxmlformats.org/markup-compatibility/2006" xmlns:a14="http://schemas.microsoft.com/office/drawing/2010/main">
+            <mc:Choice Requires="a14">
               <p:sp>
                 <p:nvSpPr>
                   <p:cNvPr id="16" name="Freeform 15"/>
@@ -20277,7 +20088,7 @@
                 </p:txBody>
               </p:sp>
             </mc:Choice>
-            <mc:Fallback>
+            <mc:Fallback xmlns="">
               <p:sp>
                 <p:nvSpPr>
                   <p:cNvPr id="16" name="Freeform 15"/>
@@ -20506,8 +20317,8 @@
             </p:txBody>
           </p:sp>
         </p:grpSp>
-        <mc:AlternateContent xmlns:mc="http://schemas.openxmlformats.org/markup-compatibility/2006">
-          <mc:Choice xmlns:a14="http://schemas.microsoft.com/office/drawing/2010/main" Requires="a14">
+        <mc:AlternateContent xmlns:mc="http://schemas.openxmlformats.org/markup-compatibility/2006" xmlns:a14="http://schemas.microsoft.com/office/drawing/2010/main">
+          <mc:Choice Requires="a14">
             <p:sp>
               <p:nvSpPr>
                 <p:cNvPr id="17" name="TextBox 16"/>
@@ -20530,6 +20341,7 @@
                 </a:bodyPr>
                 <a:lstStyle/>
                 <a:p>
+                  <a:pPr/>
                   <a14:m>
                     <m:oMathPara xmlns:m="http://schemas.openxmlformats.org/officeDocument/2006/math">
                       <m:oMathParaPr>
@@ -20581,7 +20393,7 @@
               </p:txBody>
             </p:sp>
           </mc:Choice>
-          <mc:Fallback>
+          <mc:Fallback xmlns="">
             <p:sp>
               <p:nvSpPr>
                 <p:cNvPr id="17" name="TextBox 16"/>
@@ -20631,13 +20443,6 @@
   <p:clrMapOvr>
     <a:masterClrMapping/>
   </p:clrMapOvr>
-  <p:timing>
-    <p:tnLst>
-      <p:par>
-        <p:cTn id="1" dur="indefinite" restart="never" nodeType="tmRoot"/>
-      </p:par>
-    </p:tnLst>
-  </p:timing>
 </p:sld>
 </file>
 
@@ -20687,8 +20492,8 @@
           </a:p>
         </p:txBody>
       </p:sp>
-      <mc:AlternateContent xmlns:mc="http://schemas.openxmlformats.org/markup-compatibility/2006">
-        <mc:Choice xmlns:a14="http://schemas.microsoft.com/office/drawing/2010/main" Requires="a14">
+      <mc:AlternateContent xmlns:mc="http://schemas.openxmlformats.org/markup-compatibility/2006" xmlns:a14="http://schemas.microsoft.com/office/drawing/2010/main">
+        <mc:Choice Requires="a14">
           <p:sp>
             <p:nvSpPr>
               <p:cNvPr id="3" name="Text Placeholder 2">
@@ -20719,7 +20524,7 @@
                   <a:buNone/>
                 </a:pPr>
                 <a:r>
-                  <a:rPr lang="en-US" altLang="zh-CN" sz="1600" dirty="0" smtClean="0"/>
+                  <a:rPr lang="en-US" altLang="zh-CN" sz="1600" dirty="0"/>
                   <a:t>Let </a:t>
                 </a:r>
                 <a14:m>
@@ -20852,19 +20657,15 @@
                 <a:pPr marL="114300" indent="0">
                   <a:buNone/>
                 </a:pPr>
-                <a:endParaRPr lang="en-US" altLang="zh-CN" sz="1600" dirty="0" smtClean="0"/>
+                <a:endParaRPr lang="en-US" altLang="zh-CN" sz="1600" dirty="0"/>
               </a:p>
               <a:p>
                 <a:pPr marL="114300" indent="0">
                   <a:buNone/>
                 </a:pPr>
                 <a:r>
-                  <a:rPr lang="en-US" altLang="zh-CN" sz="1600" dirty="0" smtClean="0"/>
-                  <a:t>If it does, then </a:t>
-                </a:r>
-                <a:r>
                   <a:rPr lang="en-US" altLang="zh-CN" sz="1600" dirty="0"/>
-                  <a:t>we say system </a:t>
+                  <a:t>If it does, then we say system </a:t>
                 </a:r>
                 <a14:m>
                   <m:oMath xmlns:m="http://schemas.openxmlformats.org/officeDocument/2006/math">
@@ -20894,7 +20695,7 @@
                   </m:oMath>
                 </a14:m>
                 <a:r>
-                  <a:rPr lang="en-US" altLang="zh-CN" dirty="0" smtClean="0"/>
+                  <a:rPr lang="en-US" altLang="zh-CN" dirty="0"/>
                   <a:t>,</a:t>
                 </a:r>
                 <a:endParaRPr lang="zh-CN" altLang="en-US" dirty="0"/>
@@ -20903,17 +20704,16 @@
                 <a:pPr marL="114300" indent="0">
                   <a:buNone/>
                 </a:pPr>
-                <a:endParaRPr lang="en-US" altLang="zh-CN" sz="1600" dirty="0" smtClean="0"/>
+                <a:endParaRPr lang="en-US" altLang="zh-CN" sz="1600" dirty="0"/>
               </a:p>
               <a:p>
                 <a:pPr marL="114300" indent="0">
                   <a:buNone/>
                 </a:pPr>
                 <a:r>
-                  <a:rPr lang="en-US" altLang="zh-CN" sz="1600" dirty="0" smtClean="0"/>
+                  <a:rPr lang="en-US" altLang="zh-CN" sz="1600" dirty="0"/>
                   <a:t>where </a:t>
                 </a:r>
-                <a:endParaRPr lang="en-US" altLang="zh-CN" sz="1600" dirty="0"/>
               </a:p>
               <a:p>
                 <a:pPr marL="114300" indent="0">
@@ -20924,7 +20724,7 @@
             </p:txBody>
           </p:sp>
         </mc:Choice>
-        <mc:Fallback>
+        <mc:Fallback xmlns="">
           <p:sp>
             <p:nvSpPr>
               <p:cNvPr id="3" name="Text Placeholder 2">
@@ -21187,8 +20987,8 @@
               <a:chExt cx="1880462" cy="821413"/>
             </a:xfrm>
           </p:grpSpPr>
-          <mc:AlternateContent xmlns:mc="http://schemas.openxmlformats.org/markup-compatibility/2006">
-            <mc:Choice xmlns:a14="http://schemas.microsoft.com/office/drawing/2010/main" Requires="a14">
+          <mc:AlternateContent xmlns:mc="http://schemas.openxmlformats.org/markup-compatibility/2006" xmlns:a14="http://schemas.microsoft.com/office/drawing/2010/main">
+            <mc:Choice Requires="a14">
               <p:sp>
                 <p:nvSpPr>
                   <p:cNvPr id="14" name="Freeform 13"/>
@@ -21362,7 +21162,7 @@
                 </p:txBody>
               </p:sp>
             </mc:Choice>
-            <mc:Fallback>
+            <mc:Fallback xmlns="">
               <p:sp>
                 <p:nvSpPr>
                   <p:cNvPr id="14" name="Freeform 13"/>
@@ -21591,8 +21391,8 @@
             </p:txBody>
           </p:sp>
         </p:grpSp>
-        <mc:AlternateContent xmlns:mc="http://schemas.openxmlformats.org/markup-compatibility/2006">
-          <mc:Choice xmlns:a14="http://schemas.microsoft.com/office/drawing/2010/main" Requires="a14">
+        <mc:AlternateContent xmlns:mc="http://schemas.openxmlformats.org/markup-compatibility/2006" xmlns:a14="http://schemas.microsoft.com/office/drawing/2010/main">
+          <mc:Choice Requires="a14">
             <p:sp>
               <p:nvSpPr>
                 <p:cNvPr id="13" name="TextBox 12"/>
@@ -21615,6 +21415,7 @@
                 </a:bodyPr>
                 <a:lstStyle/>
                 <a:p>
+                  <a:pPr/>
                   <a14:m>
                     <m:oMathPara xmlns:m="http://schemas.openxmlformats.org/officeDocument/2006/math">
                       <m:oMathParaPr>
@@ -21666,7 +21467,7 @@
               </p:txBody>
             </p:sp>
           </mc:Choice>
-          <mc:Fallback>
+          <mc:Fallback xmlns="">
             <p:sp>
               <p:nvSpPr>
                 <p:cNvPr id="13" name="TextBox 12"/>
@@ -21716,13 +21517,6 @@
   <p:clrMapOvr>
     <a:masterClrMapping/>
   </p:clrMapOvr>
-  <p:timing>
-    <p:tnLst>
-      <p:par>
-        <p:cTn id="1" dur="indefinite" restart="never" nodeType="tmRoot"/>
-      </p:par>
-    </p:tnLst>
-  </p:timing>
 </p:sld>
 </file>
 
@@ -21800,21 +21594,8 @@
             </a:pPr>
             <a:r>
               <a:rPr lang="en-US" altLang="zh-CN" sz="1600" dirty="0"/>
-              <a:t>Developers </a:t>
+              <a:t>Developers “over-engineer” a system =&gt; Consider errors/deviations in the real environment compared to the expected.</a:t>
             </a:r>
-            <a:r>
-              <a:rPr lang="en-US" altLang="zh-CN" sz="1600" dirty="0" smtClean="0"/>
-              <a:t>“over-engineer</a:t>
-            </a:r>
-            <a:r>
-              <a:rPr lang="en-US" altLang="zh-CN" sz="1600" dirty="0"/>
-              <a:t>” a </a:t>
-            </a:r>
-            <a:r>
-              <a:rPr lang="en-US" altLang="zh-CN" sz="1600" dirty="0" smtClean="0"/>
-              <a:t>system =&gt; Consider errors/deviations of the real environment compared to the expected.</a:t>
-            </a:r>
-            <a:endParaRPr lang="en-US" altLang="zh-CN" sz="1600" dirty="0"/>
           </a:p>
           <a:p>
             <a:pPr>
@@ -21823,12 +21604,8 @@
               </a:spcAft>
             </a:pPr>
             <a:r>
-              <a:rPr lang="en-US" altLang="zh-CN" sz="1600" dirty="0" smtClean="0"/>
-              <a:t>Developers </a:t>
-            </a:r>
-            <a:r>
               <a:rPr lang="en-US" altLang="zh-CN" sz="1600" dirty="0"/>
-              <a:t>make </a:t>
+              <a:t>Developers make </a:t>
             </a:r>
             <a:r>
               <a:rPr lang="en-US" altLang="zh-CN" sz="1600" b="1" i="1" dirty="0"/>
@@ -21863,13 +21640,8 @@
             </a:r>
             <a:r>
               <a:rPr lang="en-US" altLang="zh-CN" sz="1600" dirty="0"/>
-              <a:t> allowed behavior of </a:t>
+              <a:t> allowed behavior of environment.</a:t>
             </a:r>
-            <a:r>
-              <a:rPr lang="en-US" altLang="zh-CN" sz="1600" dirty="0" smtClean="0"/>
-              <a:t>environment.</a:t>
-            </a:r>
-            <a:endParaRPr lang="en-US" altLang="zh-CN" sz="1600" dirty="0"/>
           </a:p>
           <a:p>
             <a:pPr>
@@ -21882,24 +21654,8 @@
               <a:t>Weakest assumption </a:t>
             </a:r>
             <a:r>
-              <a:rPr lang="en-US" altLang="zh-CN" sz="1600" dirty="0" smtClean="0"/>
-              <a:t>describes</a:t>
-            </a:r>
-            <a:r>
-              <a:rPr lang="en-US" altLang="zh-CN" sz="1600" dirty="0" smtClean="0"/>
-              <a:t> </a:t>
-            </a:r>
-            <a:r>
               <a:rPr lang="en-US" altLang="zh-CN" sz="1600" dirty="0"/>
-              <a:t>all the </a:t>
-            </a:r>
-            <a:r>
-              <a:rPr lang="en-US" altLang="zh-CN" sz="1600" dirty="0" smtClean="0"/>
-              <a:t>behaviors of the environment allowed </a:t>
-            </a:r>
-            <a:r>
-              <a:rPr lang="en-US" altLang="zh-CN" sz="1600" dirty="0"/>
-              <a:t>by the system.</a:t>
+              <a:t>describes all the behaviors of the environment allowed by the system.</a:t>
             </a:r>
           </a:p>
           <a:p>
@@ -21955,13 +21711,6 @@
   <p:clrMapOvr>
     <a:masterClrMapping/>
   </p:clrMapOvr>
-  <p:timing>
-    <p:tnLst>
-      <p:par>
-        <p:cTn id="1" dur="indefinite" restart="never" nodeType="tmRoot"/>
-      </p:par>
-    </p:tnLst>
-  </p:timing>
 </p:sld>
 </file>
 
@@ -22217,18 +21966,6 @@
                     <a:p>
                       <a:pPr algn="ctr"/>
                       <a:r>
-                        <a:rPr lang="en-US" altLang="zh-CN" sz="1600" b="1" i="0" u="none" strike="noStrike" cap="none" dirty="0" smtClean="0">
-                          <a:solidFill>
-                            <a:schemeClr val="dk2"/>
-                          </a:solidFill>
-                          <a:latin typeface="Open Sans Light"/>
-                          <a:ea typeface="Open Sans Light"/>
-                          <a:cs typeface="Open Sans Light"/>
-                          <a:sym typeface="Open Sans Light"/>
-                        </a:rPr>
-                        <a:t>Errs/Diffs </a:t>
-                      </a:r>
-                      <a:r>
                         <a:rPr lang="en-US" altLang="zh-CN" sz="1600" b="1" i="0" u="none" strike="noStrike" cap="none" dirty="0">
                           <a:solidFill>
                             <a:schemeClr val="dk2"/>
@@ -22238,7 +21975,7 @@
                           <a:cs typeface="Open Sans Light"/>
                           <a:sym typeface="Open Sans Light"/>
                         </a:rPr>
-                        <a:t>in Reality</a:t>
+                        <a:t>Errs/Diffs in Reality</a:t>
                       </a:r>
                       <a:endParaRPr lang="zh-CN" altLang="en-US" sz="1600" b="1" i="0" u="none" strike="noStrike" cap="none" dirty="0">
                         <a:solidFill>
@@ -23158,13 +22895,6 @@
   <p:clrMapOvr>
     <a:masterClrMapping/>
   </p:clrMapOvr>
-  <p:timing>
-    <p:tnLst>
-      <p:par>
-        <p:cTn id="1" dur="indefinite" restart="never" nodeType="tmRoot"/>
-      </p:par>
-    </p:tnLst>
-  </p:timing>
 </p:sld>
 </file>
 
@@ -23207,15 +22937,15 @@
           <a:lstStyle/>
           <a:p>
             <a:r>
-              <a:rPr lang="en-US" altLang="zh-CN" dirty="0" smtClean="0"/>
+              <a:rPr lang="en-US" altLang="zh-CN" dirty="0"/>
               <a:t>Our approach to characterize robustness</a:t>
             </a:r>
             <a:endParaRPr lang="zh-CN" altLang="en-US" dirty="0"/>
           </a:p>
         </p:txBody>
       </p:sp>
-      <mc:AlternateContent xmlns:mc="http://schemas.openxmlformats.org/markup-compatibility/2006">
-        <mc:Choice xmlns:a14="http://schemas.microsoft.com/office/drawing/2010/main" Requires="a14">
+      <mc:AlternateContent xmlns:mc="http://schemas.openxmlformats.org/markup-compatibility/2006" xmlns:a14="http://schemas.microsoft.com/office/drawing/2010/main">
+        <mc:Choice Requires="a14">
           <p:sp>
             <p:nvSpPr>
               <p:cNvPr id="3" name="Text Placeholder 2">
@@ -23432,15 +23162,7 @@
                 </a14:m>
                 <a:r>
                   <a:rPr lang="en-US" altLang="zh-CN" sz="1600" dirty="0"/>
-                  <a:t>indicates the maximum </a:t>
-                </a:r>
-                <a:r>
-                  <a:rPr lang="en-US" altLang="zh-CN" sz="1600" dirty="0" smtClean="0"/>
-                  <a:t>allowed deviations </a:t>
-                </a:r>
-                <a:r>
-                  <a:rPr lang="en-US" altLang="zh-CN" sz="1600" dirty="0"/>
-                  <a:t>that </a:t>
+                  <a:t>indicates the maximum allowed deviations that </a:t>
                 </a:r>
                 <a14:m>
                   <m:oMath xmlns:m="http://schemas.openxmlformats.org/officeDocument/2006/math">
@@ -23474,7 +23196,7 @@
             </p:txBody>
           </p:sp>
         </mc:Choice>
-        <mc:Fallback>
+        <mc:Fallback xmlns="">
           <p:sp>
             <p:nvSpPr>
               <p:cNvPr id="3" name="Text Placeholder 2">
@@ -24056,13 +23778,6 @@
   <p:clrMapOvr>
     <a:masterClrMapping/>
   </p:clrMapOvr>
-  <p:timing>
-    <p:tnLst>
-      <p:par>
-        <p:cTn id="1" dur="indefinite" restart="never" nodeType="tmRoot"/>
-      </p:par>
-    </p:tnLst>
-  </p:timing>
 </p:sld>
 </file>
 
@@ -24099,10 +23814,9 @@
           <a:lstStyle/>
           <a:p>
             <a:r>
-              <a:rPr lang="en-US" dirty="0" smtClean="0"/>
+              <a:rPr lang="en-US" dirty="0"/>
               <a:t>What a system allows</a:t>
             </a:r>
-            <a:endParaRPr lang="en-US" dirty="0"/>
           </a:p>
         </p:txBody>
       </p:sp>
@@ -24207,8 +23921,8 @@
           </a:prstGeom>
         </p:spPr>
       </p:pic>
-      <mc:AlternateContent xmlns:mc="http://schemas.openxmlformats.org/markup-compatibility/2006">
-        <mc:Choice xmlns:a14="http://schemas.microsoft.com/office/drawing/2010/main" Requires="a14">
+      <mc:AlternateContent xmlns:mc="http://schemas.openxmlformats.org/markup-compatibility/2006" xmlns:a14="http://schemas.microsoft.com/office/drawing/2010/main">
+        <mc:Choice Requires="a14">
           <p:sp>
             <p:nvSpPr>
               <p:cNvPr id="8" name="Text Placeholder 2"/>
@@ -24233,11 +23947,11 @@
                   <a:buNone/>
                 </a:pPr>
                 <a:r>
-                  <a:rPr lang="en-US" sz="1600" i="1" dirty="0" smtClean="0"/>
+                  <a:rPr lang="en-US" sz="1600" i="1" dirty="0"/>
                   <a:t>A trace that is allowed:</a:t>
                 </a:r>
                 <a:r>
-                  <a:rPr lang="en-US" sz="1600" dirty="0" smtClean="0"/>
+                  <a:rPr lang="en-US" sz="1600" dirty="0"/>
                   <a:t> </a:t>
                 </a:r>
               </a:p>
@@ -24245,7 +23959,7 @@
                 <a:pPr marL="114300" indent="0">
                   <a:buNone/>
                 </a:pPr>
-                <a:endParaRPr lang="en-US" sz="1600" i="1" dirty="0" smtClean="0">
+                <a:endParaRPr lang="en-US" sz="1600" i="1" dirty="0">
                   <a:latin typeface="Cambria Math" panose="02040503050406030204" pitchFamily="18" charset="0"/>
                 </a:endParaRPr>
               </a:p>
@@ -24280,7 +23994,7 @@
                     </m:oMath>
                   </m:oMathPara>
                 </a14:m>
-                <a:endParaRPr lang="en-US" sz="1600" i="1" dirty="0" smtClean="0">
+                <a:endParaRPr lang="en-US" sz="1600" i="1" dirty="0">
                   <a:latin typeface="Cambria Math" panose="02040503050406030204" pitchFamily="18" charset="0"/>
                 </a:endParaRPr>
               </a:p>
@@ -24309,7 +24023,7 @@
                     </m:oMath>
                   </m:oMathPara>
                 </a14:m>
-                <a:endParaRPr lang="en-US" sz="1600" i="1" dirty="0" smtClean="0">
+                <a:endParaRPr lang="en-US" sz="1600" i="1" dirty="0">
                   <a:latin typeface="Cambria Math" panose="02040503050406030204" pitchFamily="18" charset="0"/>
                 </a:endParaRPr>
               </a:p>
@@ -24338,7 +24052,7 @@
                     </m:oMath>
                   </m:oMathPara>
                 </a14:m>
-                <a:endParaRPr lang="en-US" sz="1600" i="1" dirty="0" smtClean="0">
+                <a:endParaRPr lang="en-US" sz="1600" i="1" dirty="0">
                   <a:latin typeface="Cambria Math" panose="02040503050406030204" pitchFamily="18" charset="0"/>
                 </a:endParaRPr>
               </a:p>
@@ -24367,7 +24081,7 @@
                     </m:oMath>
                   </m:oMathPara>
                 </a14:m>
-                <a:endParaRPr lang="en-US" sz="1600" i="1" dirty="0" smtClean="0">
+                <a:endParaRPr lang="en-US" sz="1600" i="1" dirty="0">
                   <a:latin typeface="Cambria Math" panose="02040503050406030204" pitchFamily="18" charset="0"/>
                 </a:endParaRPr>
               </a:p>
@@ -24395,7 +24109,7 @@
             </p:txBody>
           </p:sp>
         </mc:Choice>
-        <mc:Fallback>
+        <mc:Fallback xmlns="">
           <p:sp>
             <p:nvSpPr>
               <p:cNvPr id="8" name="Text Placeholder 2"/>
@@ -24443,13 +24157,6 @@
   <p:clrMapOvr>
     <a:masterClrMapping/>
   </p:clrMapOvr>
-  <p:timing>
-    <p:tnLst>
-      <p:par>
-        <p:cTn id="1" dur="indefinite" restart="never" nodeType="tmRoot"/>
-      </p:par>
-    </p:tnLst>
-  </p:timing>
 </p:sld>
 </file>
 
@@ -24486,10 +24193,9 @@
           <a:lstStyle/>
           <a:p>
             <a:r>
-              <a:rPr lang="en-US" dirty="0" smtClean="0"/>
+              <a:rPr lang="en-US" dirty="0"/>
               <a:t>What a system disallows</a:t>
             </a:r>
-            <a:endParaRPr lang="en-US" dirty="0"/>
           </a:p>
         </p:txBody>
       </p:sp>
@@ -24555,8 +24261,8 @@
           </a:prstGeom>
         </p:spPr>
       </p:pic>
-      <mc:AlternateContent xmlns:mc="http://schemas.openxmlformats.org/markup-compatibility/2006">
-        <mc:Choice xmlns:a14="http://schemas.microsoft.com/office/drawing/2010/main" Requires="a14">
+      <mc:AlternateContent xmlns:mc="http://schemas.openxmlformats.org/markup-compatibility/2006" xmlns:a14="http://schemas.microsoft.com/office/drawing/2010/main">
+        <mc:Choice Requires="a14">
           <p:sp>
             <p:nvSpPr>
               <p:cNvPr id="8" name="Text Placeholder 2"/>
@@ -24581,11 +24287,11 @@
                   <a:buNone/>
                 </a:pPr>
                 <a:r>
-                  <a:rPr lang="en-US" sz="1600" i="1" dirty="0" smtClean="0"/>
+                  <a:rPr lang="en-US" sz="1600" i="1" dirty="0"/>
                   <a:t>A trace that is NOT allowed:</a:t>
                 </a:r>
                 <a:r>
-                  <a:rPr lang="en-US" sz="1600" dirty="0" smtClean="0"/>
+                  <a:rPr lang="en-US" sz="1600" dirty="0"/>
                   <a:t> </a:t>
                 </a:r>
               </a:p>
@@ -24593,7 +24299,7 @@
                 <a:pPr marL="114300" indent="0">
                   <a:buNone/>
                 </a:pPr>
-                <a:endParaRPr lang="en-US" sz="1600" i="1" dirty="0" smtClean="0">
+                <a:endParaRPr lang="en-US" sz="1600" i="1" dirty="0">
                   <a:latin typeface="Cambria Math" panose="02040503050406030204" pitchFamily="18" charset="0"/>
                 </a:endParaRPr>
               </a:p>
@@ -24628,7 +24334,7 @@
                     </m:oMath>
                   </m:oMathPara>
                 </a14:m>
-                <a:endParaRPr lang="en-US" sz="1600" i="1" dirty="0" smtClean="0">
+                <a:endParaRPr lang="en-US" sz="1600" i="1" dirty="0">
                   <a:latin typeface="Cambria Math" panose="02040503050406030204" pitchFamily="18" charset="0"/>
                 </a:endParaRPr>
               </a:p>
@@ -24657,7 +24363,7 @@
                     </m:oMath>
                   </m:oMathPara>
                 </a14:m>
-                <a:endParaRPr lang="en-US" sz="1600" i="1" dirty="0" smtClean="0">
+                <a:endParaRPr lang="en-US" sz="1600" i="1" dirty="0">
                   <a:latin typeface="Cambria Math" panose="02040503050406030204" pitchFamily="18" charset="0"/>
                 </a:endParaRPr>
               </a:p>
@@ -24689,7 +24395,7 @@
                     </m:oMath>
                   </m:oMathPara>
                 </a14:m>
-                <a:endParaRPr lang="en-US" sz="1600" i="1" dirty="0" smtClean="0">
+                <a:endParaRPr lang="en-US" sz="1600" i="1" dirty="0">
                   <a:latin typeface="Cambria Math" panose="02040503050406030204" pitchFamily="18" charset="0"/>
                 </a:endParaRPr>
               </a:p>
@@ -24717,7 +24423,7 @@
             </p:txBody>
           </p:sp>
         </mc:Choice>
-        <mc:Fallback>
+        <mc:Fallback xmlns="">
           <p:sp>
             <p:nvSpPr>
               <p:cNvPr id="8" name="Text Placeholder 2"/>
@@ -24804,13 +24510,6 @@
   <p:clrMapOvr>
     <a:masterClrMapping/>
   </p:clrMapOvr>
-  <p:timing>
-    <p:tnLst>
-      <p:par>
-        <p:cTn id="1" dur="indefinite" restart="never" nodeType="tmRoot"/>
-      </p:par>
-    </p:tnLst>
-  </p:timing>
 </p:sld>
 </file>
 
@@ -24847,10 +24546,9 @@
           <a:lstStyle/>
           <a:p>
             <a:r>
-              <a:rPr lang="en-US" dirty="0" smtClean="0"/>
+              <a:rPr lang="en-US" dirty="0"/>
               <a:t>Where are we?</a:t>
             </a:r>
-            <a:endParaRPr lang="en-US" dirty="0"/>
           </a:p>
         </p:txBody>
       </p:sp>
@@ -24921,10 +24619,9 @@
           <a:p>
             <a:pPr algn="ctr"/>
             <a:r>
-              <a:rPr lang="en-US" sz="1200" dirty="0" smtClean="0"/>
+              <a:rPr lang="en-US" sz="1200" dirty="0"/>
               <a:t>System Behavior Model</a:t>
             </a:r>
-            <a:endParaRPr lang="en-US" sz="1200" dirty="0"/>
           </a:p>
         </p:txBody>
       </p:sp>
@@ -24963,10 +24660,9 @@
           <a:p>
             <a:pPr algn="ctr"/>
             <a:r>
-              <a:rPr lang="en-US" sz="1200" dirty="0" smtClean="0"/>
+              <a:rPr lang="en-US" sz="1200" dirty="0"/>
               <a:t>Environment Behavior Model</a:t>
             </a:r>
-            <a:endParaRPr lang="en-US" sz="1200" dirty="0"/>
           </a:p>
         </p:txBody>
       </p:sp>
@@ -25005,10 +24701,9 @@
           <a:p>
             <a:pPr algn="ctr"/>
             <a:r>
-              <a:rPr lang="en-US" sz="1200" dirty="0" smtClean="0"/>
+              <a:rPr lang="en-US" sz="1200" dirty="0"/>
               <a:t>Properties</a:t>
             </a:r>
-            <a:endParaRPr lang="en-US" sz="1200" dirty="0"/>
           </a:p>
         </p:txBody>
       </p:sp>
@@ -25047,10 +24742,9 @@
           <a:p>
             <a:pPr algn="ctr"/>
             <a:r>
-              <a:rPr lang="en-US" sz="1200" dirty="0" smtClean="0"/>
+              <a:rPr lang="en-US" sz="1200" dirty="0"/>
               <a:t>Robustness Computer</a:t>
             </a:r>
-            <a:endParaRPr lang="en-US" sz="1200" dirty="0"/>
           </a:p>
         </p:txBody>
       </p:sp>
@@ -25089,10 +24783,9 @@
           <a:p>
             <a:pPr algn="ctr"/>
             <a:r>
-              <a:rPr lang="en-US" sz="1200" dirty="0" smtClean="0"/>
+              <a:rPr lang="en-US" sz="1200" dirty="0"/>
               <a:t>Errors/ Deviations can handle</a:t>
             </a:r>
-            <a:endParaRPr lang="en-US" sz="1200" dirty="0"/>
           </a:p>
         </p:txBody>
       </p:sp>
@@ -25131,10 +24824,9 @@
           <a:p>
             <a:pPr algn="ctr"/>
             <a:r>
-              <a:rPr lang="en-US" sz="1200" dirty="0" smtClean="0"/>
+              <a:rPr lang="en-US" sz="1200" dirty="0"/>
               <a:t>Existing Fault/Error Models</a:t>
             </a:r>
-            <a:endParaRPr lang="en-US" sz="1200" dirty="0"/>
           </a:p>
         </p:txBody>
       </p:sp>
@@ -25173,10 +24865,9 @@
           <a:p>
             <a:pPr algn="ctr"/>
             <a:r>
-              <a:rPr lang="en-US" sz="1200" dirty="0" smtClean="0"/>
+              <a:rPr lang="en-US" sz="1200" dirty="0"/>
               <a:t>A Profile of System Robustness</a:t>
             </a:r>
-            <a:endParaRPr lang="en-US" sz="1200" dirty="0"/>
           </a:p>
         </p:txBody>
       </p:sp>
@@ -25463,10 +25154,9 @@
           <a:p>
             <a:pPr algn="ctr"/>
             <a:r>
-              <a:rPr lang="en-US" dirty="0" smtClean="0"/>
+              <a:rPr lang="en-US" dirty="0"/>
               <a:t>How to represent robustness from such errors and deviations?</a:t>
             </a:r>
-            <a:endParaRPr lang="en-US" dirty="0"/>
           </a:p>
         </p:txBody>
       </p:sp>
@@ -25480,13 +25170,6 @@
   <p:clrMapOvr>
     <a:masterClrMapping/>
   </p:clrMapOvr>
-  <p:timing>
-    <p:tnLst>
-      <p:par>
-        <p:cTn id="1" dur="indefinite" restart="never" nodeType="tmRoot"/>
-      </p:par>
-    </p:tnLst>
-  </p:timing>
 </p:sld>
 </file>
 
@@ -25743,13 +25426,6 @@
   <p:clrMapOvr>
     <a:masterClrMapping/>
   </p:clrMapOvr>
-  <p:timing>
-    <p:tnLst>
-      <p:par>
-        <p:cTn id="1" dur="indefinite" restart="never" nodeType="tmRoot"/>
-      </p:par>
-    </p:tnLst>
-  </p:timing>
 </p:sld>
 </file>
 
@@ -25961,13 +25637,6 @@
   <p:clrMapOvr>
     <a:masterClrMapping/>
   </p:clrMapOvr>
-  <p:timing>
-    <p:tnLst>
-      <p:par>
-        <p:cTn id="1" dur="indefinite" restart="never" nodeType="tmRoot"/>
-      </p:par>
-    </p:tnLst>
-  </p:timing>
 </p:sld>
 </file>
 
@@ -26130,13 +25799,6 @@
   <p:clrMapOvr>
     <a:masterClrMapping/>
   </p:clrMapOvr>
-  <p:timing>
-    <p:tnLst>
-      <p:par>
-        <p:cTn id="1" dur="indefinite" restart="never" nodeType="tmRoot"/>
-      </p:par>
-    </p:tnLst>
-  </p:timing>
 </p:sld>
 </file>
 
@@ -26234,13 +25896,6 @@
   <p:clrMapOvr>
     <a:masterClrMapping/>
   </p:clrMapOvr>
-  <p:timing>
-    <p:tnLst>
-      <p:par>
-        <p:cTn id="1" dur="indefinite" restart="never" nodeType="tmRoot"/>
-      </p:par>
-    </p:tnLst>
-  </p:timing>
 </p:sld>
 </file>
 
@@ -26408,13 +26063,6 @@
   <p:clrMapOvr>
     <a:masterClrMapping/>
   </p:clrMapOvr>
-  <p:timing>
-    <p:tnLst>
-      <p:par>
-        <p:cTn id="1" dur="indefinite" restart="never" nodeType="tmRoot"/>
-      </p:par>
-    </p:tnLst>
-  </p:timing>
 </p:sld>
 </file>
 
@@ -26589,23 +26237,11 @@
             </a:pPr>
             <a:r>
               <a:rPr lang="en-US" sz="1600" dirty="0"/>
-              <a:t>… (Mostly focus on </a:t>
-            </a:r>
-            <a:r>
-              <a:rPr lang="en-US" sz="1600" dirty="0" smtClean="0"/>
-              <a:t>testing)</a:t>
-            </a:r>
-            <a:r>
-              <a:rPr lang="en-US" dirty="0"/>
-              <a:t/>
+              <a:t>… (Mostly focus on testing)</a:t>
             </a:r>
             <a:br>
               <a:rPr lang="en-US" dirty="0"/>
             </a:br>
-            <a:r>
-              <a:rPr lang="en-US" dirty="0"/>
-              <a:t/>
-            </a:r>
             <a:br>
               <a:rPr lang="en-US" dirty="0"/>
             </a:br>
@@ -26660,13 +26296,6 @@
   <p:clrMapOvr>
     <a:masterClrMapping/>
   </p:clrMapOvr>
-  <p:timing>
-    <p:tnLst>
-      <p:par>
-        <p:cTn id="1" dur="indefinite" restart="never" nodeType="tmRoot"/>
-      </p:par>
-    </p:tnLst>
-  </p:timing>
 </p:sld>
 </file>
 
@@ -26716,8 +26345,8 @@
           </a:p>
         </p:txBody>
       </p:sp>
-      <mc:AlternateContent xmlns:mc="http://schemas.openxmlformats.org/markup-compatibility/2006" xmlns:a14="http://schemas.microsoft.com/office/drawing/2010/main">
-        <mc:Choice Requires="a14">
+      <mc:AlternateContent xmlns:mc="http://schemas.openxmlformats.org/markup-compatibility/2006">
+        <mc:Choice xmlns:a14="http://schemas.microsoft.com/office/drawing/2010/main" Requires="a14">
           <p:sp>
             <p:nvSpPr>
               <p:cNvPr id="3" name="Text Placeholder 2">
@@ -26786,22 +26415,10 @@
                   <a:t>What about other properties (e.g., liveness properties)?</a:t>
                 </a:r>
               </a:p>
-              <a:p>
-                <a:r>
-                  <a:rPr lang="en-US" altLang="zh-CN" dirty="0"/>
-                  <a:t>The mismatch between event-based model (LTS) and stated-based model.</a:t>
-                </a:r>
-              </a:p>
-              <a:p>
-                <a:r>
-                  <a:rPr lang="en-US" altLang="zh-CN" dirty="0"/>
-                  <a:t>Event-based:			State-based:</a:t>
-                </a:r>
-              </a:p>
             </p:txBody>
           </p:sp>
         </mc:Choice>
-        <mc:Fallback xmlns="">
+        <mc:Fallback>
           <p:sp>
             <p:nvSpPr>
               <p:cNvPr id="3" name="Text Placeholder 2">
@@ -26822,7 +26439,7 @@
               <a:blipFill>
                 <a:blip r:embed="rId4"/>
                 <a:stretch>
-                  <a:fillRect r="-429"/>
+                  <a:fillRect/>
                 </a:stretch>
               </a:blipFill>
             </p:spPr>
@@ -26913,66 +26530,6 @@
           </a:prstGeom>
         </p:spPr>
       </p:pic>
-      <p:pic>
-        <p:nvPicPr>
-          <p:cNvPr id="9" name="Picture 8">
-            <a:extLst>
-              <a:ext uri="{FF2B5EF4-FFF2-40B4-BE49-F238E27FC236}">
-                <a16:creationId xmlns:a16="http://schemas.microsoft.com/office/drawing/2014/main" id="{CF8B4202-84F7-47C3-A811-E934E6897063}"/>
-              </a:ext>
-            </a:extLst>
-          </p:cNvPr>
-          <p:cNvPicPr>
-            <a:picLocks noChangeAspect="1"/>
-          </p:cNvPicPr>
-          <p:nvPr/>
-        </p:nvPicPr>
-        <p:blipFill>
-          <a:blip r:embed="rId6"/>
-          <a:stretch>
-            <a:fillRect/>
-          </a:stretch>
-        </p:blipFill>
-        <p:spPr>
-          <a:xfrm>
-            <a:off x="5449517" y="2818285"/>
-            <a:ext cx="2679247" cy="1577265"/>
-          </a:xfrm>
-          <a:prstGeom prst="rect">
-            <a:avLst/>
-          </a:prstGeom>
-        </p:spPr>
-      </p:pic>
-      <p:pic>
-        <p:nvPicPr>
-          <p:cNvPr id="10" name="Picture 9">
-            <a:extLst>
-              <a:ext uri="{FF2B5EF4-FFF2-40B4-BE49-F238E27FC236}">
-                <a16:creationId xmlns:a16="http://schemas.microsoft.com/office/drawing/2014/main" id="{EF247756-5E90-4DE9-9FA7-F552A22E70FA}"/>
-              </a:ext>
-            </a:extLst>
-          </p:cNvPr>
-          <p:cNvPicPr>
-            <a:picLocks noChangeAspect="1"/>
-          </p:cNvPicPr>
-          <p:nvPr/>
-        </p:nvPicPr>
-        <p:blipFill>
-          <a:blip r:embed="rId7"/>
-          <a:stretch>
-            <a:fillRect/>
-          </a:stretch>
-        </p:blipFill>
-        <p:spPr>
-          <a:xfrm>
-            <a:off x="790402" y="3264322"/>
-            <a:ext cx="3342398" cy="904657"/>
-          </a:xfrm>
-          <a:prstGeom prst="rect">
-            <a:avLst/>
-          </a:prstGeom>
-        </p:spPr>
-      </p:pic>
     </p:spTree>
     <p:extLst>
       <p:ext uri="{BB962C8B-B14F-4D97-AF65-F5344CB8AC3E}">
@@ -26983,13 +26540,6 @@
   <p:clrMapOvr>
     <a:masterClrMapping/>
   </p:clrMapOvr>
-  <p:timing>
-    <p:tnLst>
-      <p:par>
-        <p:cTn id="1" dur="indefinite" restart="never" nodeType="tmRoot"/>
-      </p:par>
-    </p:tnLst>
-  </p:timing>
 </p:sld>
 </file>
 
@@ -27026,10 +26576,9 @@
           <a:lstStyle/>
           <a:p>
             <a:r>
-              <a:rPr lang="en-US" dirty="0" smtClean="0"/>
+              <a:rPr lang="en-US" dirty="0"/>
               <a:t>Thank you!</a:t>
             </a:r>
-            <a:endParaRPr lang="en-US" dirty="0"/>
           </a:p>
         </p:txBody>
       </p:sp>
@@ -27100,10 +26649,9 @@
           <a:p>
             <a:pPr algn="ctr"/>
             <a:r>
-              <a:rPr lang="en-US" sz="1200" dirty="0" smtClean="0"/>
+              <a:rPr lang="en-US" sz="1200" dirty="0"/>
               <a:t>System Behavior Model</a:t>
             </a:r>
-            <a:endParaRPr lang="en-US" sz="1200" dirty="0"/>
           </a:p>
         </p:txBody>
       </p:sp>
@@ -27142,10 +26690,9 @@
           <a:p>
             <a:pPr algn="ctr"/>
             <a:r>
-              <a:rPr lang="en-US" sz="1200" dirty="0" smtClean="0"/>
+              <a:rPr lang="en-US" sz="1200" dirty="0"/>
               <a:t>Environment Behavior Model</a:t>
             </a:r>
-            <a:endParaRPr lang="en-US" sz="1200" dirty="0"/>
           </a:p>
         </p:txBody>
       </p:sp>
@@ -27184,10 +26731,9 @@
           <a:p>
             <a:pPr algn="ctr"/>
             <a:r>
-              <a:rPr lang="en-US" sz="1200" dirty="0" smtClean="0"/>
+              <a:rPr lang="en-US" sz="1200" dirty="0"/>
               <a:t>Properties</a:t>
             </a:r>
-            <a:endParaRPr lang="en-US" sz="1200" dirty="0"/>
           </a:p>
         </p:txBody>
       </p:sp>
@@ -27226,10 +26772,9 @@
           <a:p>
             <a:pPr algn="ctr"/>
             <a:r>
-              <a:rPr lang="en-US" sz="1200" dirty="0" smtClean="0"/>
+              <a:rPr lang="en-US" sz="1200" dirty="0"/>
               <a:t>Robustness Computer</a:t>
             </a:r>
-            <a:endParaRPr lang="en-US" sz="1200" dirty="0"/>
           </a:p>
         </p:txBody>
       </p:sp>
@@ -27268,10 +26813,9 @@
           <a:p>
             <a:pPr algn="ctr"/>
             <a:r>
-              <a:rPr lang="en-US" sz="1200" dirty="0" smtClean="0"/>
+              <a:rPr lang="en-US" sz="1200" dirty="0"/>
               <a:t>Errors/ Deviations can handle</a:t>
             </a:r>
-            <a:endParaRPr lang="en-US" sz="1200" dirty="0"/>
           </a:p>
         </p:txBody>
       </p:sp>
@@ -27310,10 +26854,9 @@
           <a:p>
             <a:pPr algn="ctr"/>
             <a:r>
-              <a:rPr lang="en-US" sz="1200" dirty="0" smtClean="0"/>
+              <a:rPr lang="en-US" sz="1200" dirty="0"/>
               <a:t>Existing Fault/Error Models</a:t>
             </a:r>
-            <a:endParaRPr lang="en-US" sz="1200" dirty="0"/>
           </a:p>
         </p:txBody>
       </p:sp>
@@ -27352,10 +26895,9 @@
           <a:p>
             <a:pPr algn="ctr"/>
             <a:r>
-              <a:rPr lang="en-US" sz="1200" dirty="0" smtClean="0"/>
+              <a:rPr lang="en-US" sz="1200" dirty="0"/>
               <a:t>A Profile of System Robustness</a:t>
             </a:r>
-            <a:endParaRPr lang="en-US" sz="1200" dirty="0"/>
           </a:p>
         </p:txBody>
       </p:sp>
@@ -27569,13 +27111,6 @@
   <p:clrMapOvr>
     <a:masterClrMapping/>
   </p:clrMapOvr>
-  <p:timing>
-    <p:tnLst>
-      <p:par>
-        <p:cTn id="1" dur="indefinite" restart="never" nodeType="tmRoot"/>
-      </p:par>
-    </p:tnLst>
-  </p:timing>
 </p:sld>
 </file>
 
@@ -27838,21 +27373,6 @@
   <p:clrMapOvr>
     <a:masterClrMapping/>
   </p:clrMapOvr>
-  <mc:AlternateContent xmlns:mc="http://schemas.openxmlformats.org/markup-compatibility/2006">
-    <mc:Choice xmlns:p14="http://schemas.microsoft.com/office/powerpoint/2010/main" Requires="p14">
-      <p:transition spd="slow" p14:dur="2000"/>
-    </mc:Choice>
-    <mc:Fallback>
-      <p:transition spd="slow"/>
-    </mc:Fallback>
-  </mc:AlternateContent>
-  <p:timing>
-    <p:tnLst>
-      <p:par>
-        <p:cTn id="1" dur="indefinite" restart="never" nodeType="tmRoot"/>
-      </p:par>
-    </p:tnLst>
-  </p:timing>
 </p:sld>
 </file>
 
@@ -28115,21 +27635,6 @@
   <p:clrMapOvr>
     <a:masterClrMapping/>
   </p:clrMapOvr>
-  <mc:AlternateContent xmlns:mc="http://schemas.openxmlformats.org/markup-compatibility/2006">
-    <mc:Choice xmlns:p14="http://schemas.microsoft.com/office/powerpoint/2010/main" Requires="p14">
-      <p:transition spd="slow" p14:dur="2000"/>
-    </mc:Choice>
-    <mc:Fallback>
-      <p:transition spd="slow"/>
-    </mc:Fallback>
-  </mc:AlternateContent>
-  <p:timing>
-    <p:tnLst>
-      <p:par>
-        <p:cTn id="1" dur="indefinite" restart="never" nodeType="tmRoot"/>
-      </p:par>
-    </p:tnLst>
-  </p:timing>
 </p:sld>
 </file>
 
@@ -28392,21 +27897,6 @@
   <p:clrMapOvr>
     <a:masterClrMapping/>
   </p:clrMapOvr>
-  <mc:AlternateContent xmlns:mc="http://schemas.openxmlformats.org/markup-compatibility/2006">
-    <mc:Choice xmlns:p14="http://schemas.microsoft.com/office/powerpoint/2010/main" Requires="p14">
-      <p:transition spd="slow" p14:dur="2000"/>
-    </mc:Choice>
-    <mc:Fallback>
-      <p:transition spd="slow"/>
-    </mc:Fallback>
-  </mc:AlternateContent>
-  <p:timing>
-    <p:tnLst>
-      <p:par>
-        <p:cTn id="1" dur="indefinite" restart="never" nodeType="tmRoot"/>
-      </p:par>
-    </p:tnLst>
-  </p:timing>
 </p:sld>
 </file>
 
@@ -28669,21 +28159,6 @@
   <p:clrMapOvr>
     <a:masterClrMapping/>
   </p:clrMapOvr>
-  <mc:AlternateContent xmlns:mc="http://schemas.openxmlformats.org/markup-compatibility/2006">
-    <mc:Choice xmlns:p14="http://schemas.microsoft.com/office/powerpoint/2010/main" Requires="p14">
-      <p:transition spd="slow" p14:dur="2000"/>
-    </mc:Choice>
-    <mc:Fallback>
-      <p:transition spd="slow"/>
-    </mc:Fallback>
-  </mc:AlternateContent>
-  <p:timing>
-    <p:tnLst>
-      <p:par>
-        <p:cTn id="1" dur="indefinite" restart="never" nodeType="tmRoot"/>
-      </p:par>
-    </p:tnLst>
-  </p:timing>
 </p:sld>
 </file>
 
@@ -28860,10 +28335,6 @@
               <a:rPr lang="en-US" sz="1600" dirty="0"/>
               <a:t>… (Mostly focus on testing)</a:t>
             </a:r>
-            <a:r>
-              <a:rPr lang="en-US" dirty="0"/>
-              <a:t/>
-            </a:r>
             <a:br>
               <a:rPr lang="en-US" dirty="0"/>
             </a:br>
@@ -28996,13 +28467,6 @@
   <p:clrMapOvr>
     <a:masterClrMapping/>
   </p:clrMapOvr>
-  <p:timing>
-    <p:tnLst>
-      <p:par>
-        <p:cTn id="1" dur="indefinite" restart="never" nodeType="tmRoot"/>
-      </p:par>
-    </p:tnLst>
-  </p:timing>
 </p:sld>
 </file>
 
@@ -29096,13 +28560,8 @@
             </a:pPr>
             <a:r>
               <a:rPr lang="en-US" altLang="zh-CN" dirty="0"/>
-              <a:t>Can we determine the robustness of a system in design phase rather than in testing phase, just like other quality attributes? (Correct-by-design</a:t>
+              <a:t>Can we determine the robustness of a system in design phase rather than in testing phase, just like other quality attributes? (Correct-by-design)</a:t>
             </a:r>
-            <a:r>
-              <a:rPr lang="en-US" altLang="zh-CN" dirty="0" smtClean="0"/>
-              <a:t>)</a:t>
-            </a:r>
-            <a:endParaRPr lang="en-US" altLang="zh-CN" dirty="0"/>
           </a:p>
           <a:p>
             <a:endParaRPr lang="zh-CN" altLang="en-US" dirty="0"/>
@@ -29223,13 +28682,6 @@
   <p:clrMapOvr>
     <a:masterClrMapping/>
   </p:clrMapOvr>
-  <p:timing>
-    <p:tnLst>
-      <p:par>
-        <p:cTn id="1" dur="indefinite" restart="never" nodeType="tmRoot"/>
-      </p:par>
-    </p:tnLst>
-  </p:timing>
 </p:sld>
 </file>
 
@@ -29272,7 +28724,7 @@
           <a:lstStyle/>
           <a:p>
             <a:r>
-              <a:rPr lang="en-US" altLang="zh-CN" dirty="0" smtClean="0"/>
+              <a:rPr lang="en-US" altLang="zh-CN" dirty="0"/>
               <a:t>Motivation</a:t>
             </a:r>
             <a:endParaRPr lang="zh-CN" altLang="en-US" dirty="0"/>
@@ -29334,16 +28786,6 @@
               <a:t> function against </a:t>
             </a:r>
             <a:r>
-              <a:rPr lang="en-US" altLang="zh-CN" i="1" u="sng" dirty="0" smtClean="0">
-                <a:solidFill>
-                  <a:schemeClr val="bg2">
-                    <a:lumMod val="50000"/>
-                  </a:schemeClr>
-                </a:solidFill>
-              </a:rPr>
-              <a:t>erroneous/deviated </a:t>
-            </a:r>
-            <a:r>
               <a:rPr lang="en-US" altLang="zh-CN" i="1" u="sng" dirty="0">
                 <a:solidFill>
                   <a:schemeClr val="bg2">
@@ -29351,7 +28793,7 @@
                   </a:schemeClr>
                 </a:solidFill>
               </a:rPr>
-              <a:t>behaviors</a:t>
+              <a:t>erroneous/deviated behaviors</a:t>
             </a:r>
             <a:r>
               <a:rPr lang="en-US" altLang="zh-CN" dirty="0">
@@ -29374,7 +28816,7 @@
               <a:t>environment</a:t>
             </a:r>
             <a:r>
-              <a:rPr lang="en-US" altLang="zh-CN" dirty="0" smtClean="0">
+              <a:rPr lang="en-US" altLang="zh-CN" dirty="0">
                 <a:solidFill>
                   <a:schemeClr val="bg2">
                     <a:lumMod val="50000"/>
@@ -29395,7 +28837,7 @@
             </a:pPr>
             <a:r>
               <a:rPr lang="en-US" altLang="zh-CN" sz="1600" dirty="0"/>
-              <a:t>Developers often “over-engineer” a system to deal with errors/deviations of the </a:t>
+              <a:t>Developers often “over-engineer” a system to deal with errors/deviations in the </a:t>
             </a:r>
             <a:r>
               <a:rPr lang="en-US" altLang="zh-CN" sz="1600" b="1" i="1" dirty="0"/>
@@ -29411,11 +28853,7 @@
             </a:r>
             <a:r>
               <a:rPr lang="en-US" altLang="zh-CN" sz="1600" dirty="0"/>
-              <a:t> one</a:t>
-            </a:r>
-            <a:r>
-              <a:rPr lang="en-US" altLang="zh-CN" sz="1600" dirty="0" smtClean="0"/>
-              <a:t>.</a:t>
+              <a:t> one.</a:t>
             </a:r>
           </a:p>
           <a:p>
@@ -29428,10 +28866,9 @@
               </a:spcAft>
             </a:pPr>
             <a:r>
-              <a:rPr lang="en-US" altLang="zh-CN" sz="1600" dirty="0" smtClean="0"/>
+              <a:rPr lang="en-US" altLang="zh-CN" sz="1600" dirty="0"/>
               <a:t>Can we extract these errors/deviations allowed by a system to represent system robustness?</a:t>
             </a:r>
-            <a:endParaRPr lang="en-US" altLang="zh-CN" sz="1600" dirty="0"/>
           </a:p>
           <a:p>
             <a:endParaRPr lang="en-US" altLang="zh-CN" sz="2000" dirty="0"/>
@@ -29486,13 +28923,6 @@
   <p:clrMapOvr>
     <a:masterClrMapping/>
   </p:clrMapOvr>
-  <p:timing>
-    <p:tnLst>
-      <p:par>
-        <p:cTn id="1" dur="indefinite" restart="never" nodeType="tmRoot"/>
-      </p:par>
-    </p:tnLst>
-  </p:timing>
 </p:sld>
 </file>
 
@@ -29529,10 +28959,9 @@
           <a:lstStyle/>
           <a:p>
             <a:r>
-              <a:rPr lang="en-US" dirty="0" smtClean="0"/>
+              <a:rPr lang="en-US" dirty="0"/>
               <a:t>Approach Overview</a:t>
             </a:r>
-            <a:endParaRPr lang="en-US" dirty="0"/>
           </a:p>
         </p:txBody>
       </p:sp>
@@ -29603,10 +29032,9 @@
           <a:p>
             <a:pPr algn="ctr"/>
             <a:r>
-              <a:rPr lang="en-US" sz="1200" dirty="0" smtClean="0"/>
+              <a:rPr lang="en-US" sz="1200" dirty="0"/>
               <a:t>System Behavior Model</a:t>
             </a:r>
-            <a:endParaRPr lang="en-US" sz="1200" dirty="0"/>
           </a:p>
         </p:txBody>
       </p:sp>
@@ -29645,10 +29073,9 @@
           <a:p>
             <a:pPr algn="ctr"/>
             <a:r>
-              <a:rPr lang="en-US" sz="1200" dirty="0" smtClean="0"/>
+              <a:rPr lang="en-US" sz="1200" dirty="0"/>
               <a:t>Environment Behavior Model</a:t>
             </a:r>
-            <a:endParaRPr lang="en-US" sz="1200" dirty="0"/>
           </a:p>
         </p:txBody>
       </p:sp>
@@ -29687,10 +29114,9 @@
           <a:p>
             <a:pPr algn="ctr"/>
             <a:r>
-              <a:rPr lang="en-US" sz="1200" dirty="0" smtClean="0"/>
+              <a:rPr lang="en-US" sz="1200" dirty="0"/>
               <a:t>Properties</a:t>
             </a:r>
-            <a:endParaRPr lang="en-US" sz="1200" dirty="0"/>
           </a:p>
         </p:txBody>
       </p:sp>
@@ -29729,10 +29155,9 @@
           <a:p>
             <a:pPr algn="ctr"/>
             <a:r>
-              <a:rPr lang="en-US" sz="1200" dirty="0" smtClean="0"/>
+              <a:rPr lang="en-US" sz="1200" dirty="0"/>
               <a:t>Robustness Computer</a:t>
             </a:r>
-            <a:endParaRPr lang="en-US" sz="1200" dirty="0"/>
           </a:p>
         </p:txBody>
       </p:sp>
@@ -29771,10 +29196,9 @@
           <a:p>
             <a:pPr algn="ctr"/>
             <a:r>
-              <a:rPr lang="en-US" sz="1200" dirty="0" smtClean="0"/>
+              <a:rPr lang="en-US" sz="1200" dirty="0"/>
               <a:t>Errors/ Deviations can handle</a:t>
             </a:r>
-            <a:endParaRPr lang="en-US" sz="1200" dirty="0"/>
           </a:p>
         </p:txBody>
       </p:sp>
@@ -29813,10 +29237,9 @@
           <a:p>
             <a:pPr algn="ctr"/>
             <a:r>
-              <a:rPr lang="en-US" sz="1200" dirty="0" smtClean="0"/>
+              <a:rPr lang="en-US" sz="1200" dirty="0"/>
               <a:t>Existing Fault/Error Models</a:t>
             </a:r>
-            <a:endParaRPr lang="en-US" sz="1200" dirty="0"/>
           </a:p>
         </p:txBody>
       </p:sp>
@@ -29855,10 +29278,9 @@
           <a:p>
             <a:pPr algn="ctr"/>
             <a:r>
-              <a:rPr lang="en-US" sz="1200" dirty="0" smtClean="0"/>
+              <a:rPr lang="en-US" sz="1200" dirty="0"/>
               <a:t>A Profile of System Robustness</a:t>
             </a:r>
-            <a:endParaRPr lang="en-US" sz="1200" dirty="0"/>
           </a:p>
         </p:txBody>
       </p:sp>
@@ -30072,13 +29494,6 @@
   <p:clrMapOvr>
     <a:masterClrMapping/>
   </p:clrMapOvr>
-  <p:timing>
-    <p:tnLst>
-      <p:par>
-        <p:cTn id="1" dur="indefinite" restart="never" nodeType="tmRoot"/>
-      </p:par>
-    </p:tnLst>
-  </p:timing>
 </p:sld>
 </file>
 
@@ -30115,10 +29530,9 @@
           <a:lstStyle/>
           <a:p>
             <a:r>
-              <a:rPr lang="en-US" dirty="0" smtClean="0"/>
+              <a:rPr lang="en-US" dirty="0"/>
               <a:t>Approach Overview</a:t>
             </a:r>
-            <a:endParaRPr lang="en-US" dirty="0"/>
           </a:p>
         </p:txBody>
       </p:sp>
@@ -30189,10 +29603,9 @@
           <a:p>
             <a:pPr algn="ctr"/>
             <a:r>
-              <a:rPr lang="en-US" sz="1200" dirty="0" smtClean="0"/>
+              <a:rPr lang="en-US" sz="1200" dirty="0"/>
               <a:t>System Behavior Model</a:t>
             </a:r>
-            <a:endParaRPr lang="en-US" sz="1200" dirty="0"/>
           </a:p>
         </p:txBody>
       </p:sp>
@@ -30231,10 +29644,9 @@
           <a:p>
             <a:pPr algn="ctr"/>
             <a:r>
-              <a:rPr lang="en-US" sz="1200" dirty="0" smtClean="0"/>
+              <a:rPr lang="en-US" sz="1200" dirty="0"/>
               <a:t>Environment Behavior Model</a:t>
             </a:r>
-            <a:endParaRPr lang="en-US" sz="1200" dirty="0"/>
           </a:p>
         </p:txBody>
       </p:sp>
@@ -30273,10 +29685,9 @@
           <a:p>
             <a:pPr algn="ctr"/>
             <a:r>
-              <a:rPr lang="en-US" sz="1200" dirty="0" smtClean="0"/>
+              <a:rPr lang="en-US" sz="1200" dirty="0"/>
               <a:t>Properties</a:t>
             </a:r>
-            <a:endParaRPr lang="en-US" sz="1200" dirty="0"/>
           </a:p>
         </p:txBody>
       </p:sp>
@@ -30315,10 +29726,9 @@
           <a:p>
             <a:pPr algn="ctr"/>
             <a:r>
-              <a:rPr lang="en-US" sz="1200" dirty="0" smtClean="0"/>
+              <a:rPr lang="en-US" sz="1200" dirty="0"/>
               <a:t>Robustness Computer</a:t>
             </a:r>
-            <a:endParaRPr lang="en-US" sz="1200" dirty="0"/>
           </a:p>
         </p:txBody>
       </p:sp>
@@ -30357,10 +29767,9 @@
           <a:p>
             <a:pPr algn="ctr"/>
             <a:r>
-              <a:rPr lang="en-US" sz="1200" dirty="0" smtClean="0"/>
+              <a:rPr lang="en-US" sz="1200" dirty="0"/>
               <a:t>Errors/ Deviations can handle</a:t>
             </a:r>
-            <a:endParaRPr lang="en-US" sz="1200" dirty="0"/>
           </a:p>
         </p:txBody>
       </p:sp>
@@ -30399,10 +29808,9 @@
           <a:p>
             <a:pPr algn="ctr"/>
             <a:r>
-              <a:rPr lang="en-US" sz="1200" dirty="0" smtClean="0"/>
+              <a:rPr lang="en-US" sz="1200" dirty="0"/>
               <a:t>Existing Fault/Error Models</a:t>
             </a:r>
-            <a:endParaRPr lang="en-US" sz="1200" dirty="0"/>
           </a:p>
         </p:txBody>
       </p:sp>
@@ -30441,10 +29849,9 @@
           <a:p>
             <a:pPr algn="ctr"/>
             <a:r>
-              <a:rPr lang="en-US" sz="1200" dirty="0" smtClean="0"/>
+              <a:rPr lang="en-US" sz="1200" dirty="0"/>
               <a:t>A Profile of System Robustness</a:t>
             </a:r>
-            <a:endParaRPr lang="en-US" sz="1200" dirty="0"/>
           </a:p>
         </p:txBody>
       </p:sp>
@@ -30686,10 +30093,9 @@
           <a:p>
             <a:pPr algn="ctr"/>
             <a:r>
-              <a:rPr lang="en-US" dirty="0" smtClean="0"/>
+              <a:rPr lang="en-US" dirty="0"/>
               <a:t>How to compute the errors/deviations allowed by a system?</a:t>
             </a:r>
-            <a:endParaRPr lang="en-US" dirty="0"/>
           </a:p>
         </p:txBody>
       </p:sp>
@@ -30935,10 +30341,9 @@
           <a:p>
             <a:pPr algn="ctr"/>
             <a:r>
-              <a:rPr lang="en-US" dirty="0" smtClean="0"/>
+              <a:rPr lang="en-US" dirty="0"/>
               <a:t>How to model these behaviors?</a:t>
             </a:r>
-            <a:endParaRPr lang="en-US" dirty="0"/>
           </a:p>
         </p:txBody>
       </p:sp>

</xml_diff>

<commit_message>
Done wit the talk
</commit_message>
<xml_diff>
--- a/Robustness-SSSG.pptx
+++ b/Robustness-SSSG.pptx
@@ -58,29 +58,33 @@
   <p:notesSz cx="6858000" cy="9144000"/>
   <p:embeddedFontLst>
     <p:embeddedFont>
-      <p:font typeface="Cambria Math" panose="02040503050406030204" pitchFamily="18" charset="0"/>
+      <p:font typeface="宋体" panose="02010600030101010101" pitchFamily="2" charset="-122"/>
       <p:regular r:id="rId48"/>
     </p:embeddedFont>
     <p:embeddedFont>
-      <p:font typeface="Open Sans" panose="02010600030101010101" charset="0"/>
+      <p:font typeface="Open Sans Light" panose="020B0604020202020204" charset="0"/>
       <p:regular r:id="rId49"/>
       <p:bold r:id="rId50"/>
       <p:italic r:id="rId51"/>
       <p:boldItalic r:id="rId52"/>
     </p:embeddedFont>
     <p:embeddedFont>
-      <p:font typeface="Open Sans Light" panose="02010600030101010101" charset="0"/>
+      <p:font typeface="Cambria Math" panose="02040503050406030204" pitchFamily="18" charset="0"/>
       <p:regular r:id="rId53"/>
-      <p:bold r:id="rId54"/>
-      <p:italic r:id="rId55"/>
-      <p:boldItalic r:id="rId56"/>
     </p:embeddedFont>
     <p:embeddedFont>
-      <p:font typeface="Open Sans SemiBold" panose="02010600030101010101" charset="0"/>
-      <p:regular r:id="rId57"/>
-      <p:bold r:id="rId58"/>
-      <p:italic r:id="rId59"/>
-      <p:boldItalic r:id="rId60"/>
+      <p:font typeface="Open Sans SemiBold" panose="020B0604020202020204" charset="0"/>
+      <p:regular r:id="rId54"/>
+      <p:bold r:id="rId55"/>
+      <p:italic r:id="rId56"/>
+      <p:boldItalic r:id="rId57"/>
+    </p:embeddedFont>
+    <p:embeddedFont>
+      <p:font typeface="Open Sans" panose="020B0604020202020204" charset="0"/>
+      <p:regular r:id="rId58"/>
+      <p:bold r:id="rId59"/>
+      <p:italic r:id="rId60"/>
+      <p:boldItalic r:id="rId61"/>
     </p:embeddedFont>
   </p:embeddedFontLst>
   <p:defaultTextStyle>
@@ -2084,14 +2088,35 @@
         </dgm:presLayoutVars>
       </dgm:prSet>
       <dgm:spPr/>
+      <dgm:t>
+        <a:bodyPr/>
+        <a:lstStyle/>
+        <a:p>
+          <a:endParaRPr lang="en-US"/>
+        </a:p>
+      </dgm:t>
     </dgm:pt>
     <dgm:pt modelId="{71DCDA3D-F6AC-477E-8277-8B1A049BA441}" type="pres">
       <dgm:prSet presAssocID="{B7E0B08A-A644-454A-9758-D5CAFB28A3CA}" presName="sibTrans" presStyleLbl="sibTrans2D1" presStyleIdx="0" presStyleCnt="2"/>
       <dgm:spPr/>
+      <dgm:t>
+        <a:bodyPr/>
+        <a:lstStyle/>
+        <a:p>
+          <a:endParaRPr lang="en-US"/>
+        </a:p>
+      </dgm:t>
     </dgm:pt>
     <dgm:pt modelId="{2F4EE405-88C1-4AF6-B24F-D6226C26F8F3}" type="pres">
       <dgm:prSet presAssocID="{B7E0B08A-A644-454A-9758-D5CAFB28A3CA}" presName="connectorText" presStyleLbl="sibTrans2D1" presStyleIdx="0" presStyleCnt="2"/>
       <dgm:spPr/>
+      <dgm:t>
+        <a:bodyPr/>
+        <a:lstStyle/>
+        <a:p>
+          <a:endParaRPr lang="en-US"/>
+        </a:p>
+      </dgm:t>
     </dgm:pt>
     <dgm:pt modelId="{F72B6CF8-105B-410B-AC54-DA7464EB14C1}" type="pres">
       <dgm:prSet presAssocID="{086413C2-C785-403D-99D3-834A0245019F}" presName="node" presStyleLbl="node1" presStyleIdx="1" presStyleCnt="3">
@@ -2100,14 +2125,35 @@
         </dgm:presLayoutVars>
       </dgm:prSet>
       <dgm:spPr/>
+      <dgm:t>
+        <a:bodyPr/>
+        <a:lstStyle/>
+        <a:p>
+          <a:endParaRPr lang="en-US"/>
+        </a:p>
+      </dgm:t>
     </dgm:pt>
     <dgm:pt modelId="{11530BA9-3DC9-4A49-BA20-8431D4462ED4}" type="pres">
       <dgm:prSet presAssocID="{44A1F245-36D7-4328-AAF3-9698D37D82A9}" presName="sibTrans" presStyleLbl="sibTrans2D1" presStyleIdx="1" presStyleCnt="2" custLinFactNeighborY="14507"/>
       <dgm:spPr/>
+      <dgm:t>
+        <a:bodyPr/>
+        <a:lstStyle/>
+        <a:p>
+          <a:endParaRPr lang="en-US"/>
+        </a:p>
+      </dgm:t>
     </dgm:pt>
     <dgm:pt modelId="{AEF80222-AA16-430E-A2E9-0EC4A65729F9}" type="pres">
       <dgm:prSet presAssocID="{44A1F245-36D7-4328-AAF3-9698D37D82A9}" presName="connectorText" presStyleLbl="sibTrans2D1" presStyleIdx="1" presStyleCnt="2"/>
       <dgm:spPr/>
+      <dgm:t>
+        <a:bodyPr/>
+        <a:lstStyle/>
+        <a:p>
+          <a:endParaRPr lang="en-US"/>
+        </a:p>
+      </dgm:t>
     </dgm:pt>
     <dgm:pt modelId="{B2EC2A35-DAD0-47D9-A89D-EB5C8F343AF9}" type="pres">
       <dgm:prSet presAssocID="{20705E99-54D4-43DC-B43F-32B12B29B9DD}" presName="node" presStyleLbl="node1" presStyleIdx="2" presStyleCnt="3">
@@ -2116,20 +2162,27 @@
         </dgm:presLayoutVars>
       </dgm:prSet>
       <dgm:spPr/>
+      <dgm:t>
+        <a:bodyPr/>
+        <a:lstStyle/>
+        <a:p>
+          <a:endParaRPr lang="en-US"/>
+        </a:p>
+      </dgm:t>
     </dgm:pt>
   </dgm:ptLst>
   <dgm:cxnLst>
-    <dgm:cxn modelId="{FB8FD60E-DF3D-4406-A670-FF0871AEEAC0}" srcId="{F202BABD-B732-4DA8-83EF-41D6FA6F3D28}" destId="{086413C2-C785-403D-99D3-834A0245019F}" srcOrd="1" destOrd="0" parTransId="{F3D23565-456D-4A7E-A256-0AA176BAD525}" sibTransId="{44A1F245-36D7-4328-AAF3-9698D37D82A9}"/>
+    <dgm:cxn modelId="{B135517C-B95D-471B-B18A-0A7D43B9FC9E}" srcId="{F202BABD-B732-4DA8-83EF-41D6FA6F3D28}" destId="{4E9F245D-6757-4C89-9F8C-64D90C686FD5}" srcOrd="0" destOrd="0" parTransId="{703A834B-BBD7-4BB5-B20F-E547C8746EA0}" sibTransId="{B7E0B08A-A644-454A-9758-D5CAFB28A3CA}"/>
+    <dgm:cxn modelId="{7D6D11B2-AA89-4350-A431-19054A44BE48}" type="presOf" srcId="{B7E0B08A-A644-454A-9758-D5CAFB28A3CA}" destId="{2F4EE405-88C1-4AF6-B24F-D6226C26F8F3}" srcOrd="1" destOrd="0" presId="urn:microsoft.com/office/officeart/2005/8/layout/process2"/>
+    <dgm:cxn modelId="{516A2FCE-C12E-4205-8703-6C318A4BFFC8}" type="presOf" srcId="{44A1F245-36D7-4328-AAF3-9698D37D82A9}" destId="{AEF80222-AA16-430E-A2E9-0EC4A65729F9}" srcOrd="1" destOrd="0" presId="urn:microsoft.com/office/officeart/2005/8/layout/process2"/>
+    <dgm:cxn modelId="{9D0B07D3-5117-4655-A382-CD93D1FF683B}" type="presOf" srcId="{4E9F245D-6757-4C89-9F8C-64D90C686FD5}" destId="{F574793B-4AA5-4E02-8858-068A6227A427}" srcOrd="0" destOrd="0" presId="urn:microsoft.com/office/officeart/2005/8/layout/process2"/>
     <dgm:cxn modelId="{A4E0155F-62A4-4996-96F1-E6AC3D4A6BBE}" type="presOf" srcId="{20705E99-54D4-43DC-B43F-32B12B29B9DD}" destId="{B2EC2A35-DAD0-47D9-A89D-EB5C8F343AF9}" srcOrd="0" destOrd="0" presId="urn:microsoft.com/office/officeart/2005/8/layout/process2"/>
-    <dgm:cxn modelId="{9F649B62-ED53-4C2D-808D-01833CF85BB7}" type="presOf" srcId="{086413C2-C785-403D-99D3-834A0245019F}" destId="{F72B6CF8-105B-410B-AC54-DA7464EB14C1}" srcOrd="0" destOrd="0" presId="urn:microsoft.com/office/officeart/2005/8/layout/process2"/>
-    <dgm:cxn modelId="{B135517C-B95D-471B-B18A-0A7D43B9FC9E}" srcId="{F202BABD-B732-4DA8-83EF-41D6FA6F3D28}" destId="{4E9F245D-6757-4C89-9F8C-64D90C686FD5}" srcOrd="0" destOrd="0" parTransId="{703A834B-BBD7-4BB5-B20F-E547C8746EA0}" sibTransId="{B7E0B08A-A644-454A-9758-D5CAFB28A3CA}"/>
+    <dgm:cxn modelId="{3046A9D1-74FA-40AF-8AE7-3A78376625D1}" type="presOf" srcId="{F202BABD-B732-4DA8-83EF-41D6FA6F3D28}" destId="{CE60B819-AB82-49EA-BA97-417BBB8C6101}" srcOrd="0" destOrd="0" presId="urn:microsoft.com/office/officeart/2005/8/layout/process2"/>
+    <dgm:cxn modelId="{E071F2AD-3D8D-4B22-ABBC-E2CEA0D3C579}" type="presOf" srcId="{B7E0B08A-A644-454A-9758-D5CAFB28A3CA}" destId="{71DCDA3D-F6AC-477E-8277-8B1A049BA441}" srcOrd="0" destOrd="0" presId="urn:microsoft.com/office/officeart/2005/8/layout/process2"/>
     <dgm:cxn modelId="{533A0D8E-8547-4692-A924-8F81E00AC74C}" type="presOf" srcId="{44A1F245-36D7-4328-AAF3-9698D37D82A9}" destId="{11530BA9-3DC9-4A49-BA20-8431D4462ED4}" srcOrd="0" destOrd="0" presId="urn:microsoft.com/office/officeart/2005/8/layout/process2"/>
     <dgm:cxn modelId="{1F8DB29C-97BD-427F-8C21-A403045A1414}" srcId="{F202BABD-B732-4DA8-83EF-41D6FA6F3D28}" destId="{20705E99-54D4-43DC-B43F-32B12B29B9DD}" srcOrd="2" destOrd="0" parTransId="{DB71EF53-8CF8-445B-BFE1-680420C0D91E}" sibTransId="{B06D6090-41F4-4E1F-BE92-602ACEA0C745}"/>
-    <dgm:cxn modelId="{E071F2AD-3D8D-4B22-ABBC-E2CEA0D3C579}" type="presOf" srcId="{B7E0B08A-A644-454A-9758-D5CAFB28A3CA}" destId="{71DCDA3D-F6AC-477E-8277-8B1A049BA441}" srcOrd="0" destOrd="0" presId="urn:microsoft.com/office/officeart/2005/8/layout/process2"/>
-    <dgm:cxn modelId="{7D6D11B2-AA89-4350-A431-19054A44BE48}" type="presOf" srcId="{B7E0B08A-A644-454A-9758-D5CAFB28A3CA}" destId="{2F4EE405-88C1-4AF6-B24F-D6226C26F8F3}" srcOrd="1" destOrd="0" presId="urn:microsoft.com/office/officeart/2005/8/layout/process2"/>
-    <dgm:cxn modelId="{516A2FCE-C12E-4205-8703-6C318A4BFFC8}" type="presOf" srcId="{44A1F245-36D7-4328-AAF3-9698D37D82A9}" destId="{AEF80222-AA16-430E-A2E9-0EC4A65729F9}" srcOrd="1" destOrd="0" presId="urn:microsoft.com/office/officeart/2005/8/layout/process2"/>
-    <dgm:cxn modelId="{3046A9D1-74FA-40AF-8AE7-3A78376625D1}" type="presOf" srcId="{F202BABD-B732-4DA8-83EF-41D6FA6F3D28}" destId="{CE60B819-AB82-49EA-BA97-417BBB8C6101}" srcOrd="0" destOrd="0" presId="urn:microsoft.com/office/officeart/2005/8/layout/process2"/>
-    <dgm:cxn modelId="{9D0B07D3-5117-4655-A382-CD93D1FF683B}" type="presOf" srcId="{4E9F245D-6757-4C89-9F8C-64D90C686FD5}" destId="{F574793B-4AA5-4E02-8858-068A6227A427}" srcOrd="0" destOrd="0" presId="urn:microsoft.com/office/officeart/2005/8/layout/process2"/>
+    <dgm:cxn modelId="{9F649B62-ED53-4C2D-808D-01833CF85BB7}" type="presOf" srcId="{086413C2-C785-403D-99D3-834A0245019F}" destId="{F72B6CF8-105B-410B-AC54-DA7464EB14C1}" srcOrd="0" destOrd="0" presId="urn:microsoft.com/office/officeart/2005/8/layout/process2"/>
+    <dgm:cxn modelId="{FB8FD60E-DF3D-4406-A670-FF0871AEEAC0}" srcId="{F202BABD-B732-4DA8-83EF-41D6FA6F3D28}" destId="{086413C2-C785-403D-99D3-834A0245019F}" srcOrd="1" destOrd="0" parTransId="{F3D23565-456D-4A7E-A256-0AA176BAD525}" sibTransId="{44A1F245-36D7-4328-AAF3-9698D37D82A9}"/>
     <dgm:cxn modelId="{8F24B9B9-2DF6-4730-A5D8-B923FB4CDEEF}" type="presParOf" srcId="{CE60B819-AB82-49EA-BA97-417BBB8C6101}" destId="{F574793B-4AA5-4E02-8858-068A6227A427}" srcOrd="0" destOrd="0" presId="urn:microsoft.com/office/officeart/2005/8/layout/process2"/>
     <dgm:cxn modelId="{95C5C9C1-D195-4057-8BBF-51321BB4CDCB}" type="presParOf" srcId="{CE60B819-AB82-49EA-BA97-417BBB8C6101}" destId="{71DCDA3D-F6AC-477E-8277-8B1A049BA441}" srcOrd="1" destOrd="0" presId="urn:microsoft.com/office/officeart/2005/8/layout/process2"/>
     <dgm:cxn modelId="{4ADC17B1-2EE6-4BA3-940D-2836B8323508}" type="presParOf" srcId="{71DCDA3D-F6AC-477E-8277-8B1A049BA441}" destId="{2F4EE405-88C1-4AF6-B24F-D6226C26F8F3}" srcOrd="0" destOrd="0" presId="urn:microsoft.com/office/officeart/2005/8/layout/process2"/>
@@ -2428,6 +2481,13 @@
         </dgm:presLayoutVars>
       </dgm:prSet>
       <dgm:spPr/>
+      <dgm:t>
+        <a:bodyPr/>
+        <a:lstStyle/>
+        <a:p>
+          <a:endParaRPr lang="en-US"/>
+        </a:p>
+      </dgm:t>
     </dgm:pt>
     <dgm:pt modelId="{FE9B7B2D-6E0A-451B-A6B6-B7A47F0A4ED4}" type="pres">
       <dgm:prSet presAssocID="{3D7B3E38-995E-45E6-B8E3-FB502DA80652}" presName="spacerT" presStyleCnt="0"/>
@@ -2436,6 +2496,13 @@
     <dgm:pt modelId="{CAE67F45-C242-4CA0-9A93-1CF54DC6A4B2}" type="pres">
       <dgm:prSet presAssocID="{3D7B3E38-995E-45E6-B8E3-FB502DA80652}" presName="sibTrans" presStyleLbl="sibTrans2D1" presStyleIdx="0" presStyleCnt="3"/>
       <dgm:spPr/>
+      <dgm:t>
+        <a:bodyPr/>
+        <a:lstStyle/>
+        <a:p>
+          <a:endParaRPr lang="en-US"/>
+        </a:p>
+      </dgm:t>
     </dgm:pt>
     <dgm:pt modelId="{2F6879B7-6BBF-4D4F-9AF5-9C6DFF4C5A4B}" type="pres">
       <dgm:prSet presAssocID="{3D7B3E38-995E-45E6-B8E3-FB502DA80652}" presName="spacerB" presStyleCnt="0"/>
@@ -2448,6 +2515,13 @@
         </dgm:presLayoutVars>
       </dgm:prSet>
       <dgm:spPr/>
+      <dgm:t>
+        <a:bodyPr/>
+        <a:lstStyle/>
+        <a:p>
+          <a:endParaRPr lang="en-US"/>
+        </a:p>
+      </dgm:t>
     </dgm:pt>
     <dgm:pt modelId="{37E56C71-CDC9-4B39-92CB-FECEABBAF583}" type="pres">
       <dgm:prSet presAssocID="{22CC6DC0-3F9A-46C5-B765-A8692E00B968}" presName="spacerT" presStyleCnt="0"/>
@@ -2456,6 +2530,13 @@
     <dgm:pt modelId="{A4F524BC-5044-43E9-9ED4-F28F50329C8E}" type="pres">
       <dgm:prSet presAssocID="{22CC6DC0-3F9A-46C5-B765-A8692E00B968}" presName="sibTrans" presStyleLbl="sibTrans2D1" presStyleIdx="1" presStyleCnt="3"/>
       <dgm:spPr/>
+      <dgm:t>
+        <a:bodyPr/>
+        <a:lstStyle/>
+        <a:p>
+          <a:endParaRPr lang="en-US"/>
+        </a:p>
+      </dgm:t>
     </dgm:pt>
     <dgm:pt modelId="{68B319BC-7EE2-42A3-B838-9339FF0A3099}" type="pres">
       <dgm:prSet presAssocID="{22CC6DC0-3F9A-46C5-B765-A8692E00B968}" presName="spacerB" presStyleCnt="0"/>
@@ -2468,14 +2549,35 @@
         </dgm:presLayoutVars>
       </dgm:prSet>
       <dgm:spPr/>
+      <dgm:t>
+        <a:bodyPr/>
+        <a:lstStyle/>
+        <a:p>
+          <a:endParaRPr lang="en-US"/>
+        </a:p>
+      </dgm:t>
     </dgm:pt>
     <dgm:pt modelId="{8C167BF4-3B48-4E48-B7EB-402E1EBCD4C4}" type="pres">
       <dgm:prSet presAssocID="{7F6B5A0A-0F54-4B18-951E-1A0CFC44F6C4}" presName="sibTransLast" presStyleLbl="sibTrans2D1" presStyleIdx="2" presStyleCnt="3"/>
       <dgm:spPr/>
+      <dgm:t>
+        <a:bodyPr/>
+        <a:lstStyle/>
+        <a:p>
+          <a:endParaRPr lang="en-US"/>
+        </a:p>
+      </dgm:t>
     </dgm:pt>
     <dgm:pt modelId="{6D3D89C7-2463-4B65-8B98-57E4FF79799E}" type="pres">
       <dgm:prSet presAssocID="{7F6B5A0A-0F54-4B18-951E-1A0CFC44F6C4}" presName="connectorText" presStyleLbl="sibTrans2D1" presStyleIdx="2" presStyleCnt="3"/>
       <dgm:spPr/>
+      <dgm:t>
+        <a:bodyPr/>
+        <a:lstStyle/>
+        <a:p>
+          <a:endParaRPr lang="en-US"/>
+        </a:p>
+      </dgm:t>
     </dgm:pt>
     <dgm:pt modelId="{019AF5E6-0576-4F30-AF54-C6ABA9F8714D}" type="pres">
       <dgm:prSet presAssocID="{7F6B5A0A-0F54-4B18-951E-1A0CFC44F6C4}" presName="lastNode" presStyleLbl="node1" presStyleIdx="3" presStyleCnt="4">
@@ -2484,22 +2586,29 @@
         </dgm:presLayoutVars>
       </dgm:prSet>
       <dgm:spPr/>
+      <dgm:t>
+        <a:bodyPr/>
+        <a:lstStyle/>
+        <a:p>
+          <a:endParaRPr lang="en-US"/>
+        </a:p>
+      </dgm:t>
     </dgm:pt>
   </dgm:ptLst>
   <dgm:cxnLst>
+    <dgm:cxn modelId="{C4EE0257-8F26-40B8-98FD-28E7D13A18FE}" type="presOf" srcId="{788FFD9D-7404-4CCE-A245-0BD6B0E93B24}" destId="{ADDE6D51-0326-48FC-8262-22DC9FF00928}" srcOrd="0" destOrd="0" presId="urn:microsoft.com/office/officeart/2005/8/layout/equation2"/>
+    <dgm:cxn modelId="{9DF4F15D-83DA-4A81-AC99-DAAA7154E8FC}" type="presOf" srcId="{3D7B3E38-995E-45E6-B8E3-FB502DA80652}" destId="{CAE67F45-C242-4CA0-9A93-1CF54DC6A4B2}" srcOrd="0" destOrd="0" presId="urn:microsoft.com/office/officeart/2005/8/layout/equation2"/>
     <dgm:cxn modelId="{3074BA33-5E6B-4CD8-B00C-4B1D75F82156}" type="presOf" srcId="{22CC6DC0-3F9A-46C5-B765-A8692E00B968}" destId="{A4F524BC-5044-43E9-9ED4-F28F50329C8E}" srcOrd="0" destOrd="0" presId="urn:microsoft.com/office/officeart/2005/8/layout/equation2"/>
     <dgm:cxn modelId="{129B2235-A666-4972-9C81-A32268B29CC3}" srcId="{7F6B5A0A-0F54-4B18-951E-1A0CFC44F6C4}" destId="{788FFD9D-7404-4CCE-A245-0BD6B0E93B24}" srcOrd="0" destOrd="0" parTransId="{5E24E0D7-ADE3-4230-995A-808460C79C74}" sibTransId="{3D7B3E38-995E-45E6-B8E3-FB502DA80652}"/>
+    <dgm:cxn modelId="{2E697D6D-F056-4088-9E32-833B4B75A03C}" type="presOf" srcId="{09353CC5-9DAE-40D9-A6ED-AC3D6931F2A5}" destId="{019AF5E6-0576-4F30-AF54-C6ABA9F8714D}" srcOrd="0" destOrd="0" presId="urn:microsoft.com/office/officeart/2005/8/layout/equation2"/>
+    <dgm:cxn modelId="{8A82D260-762D-4E67-B9C2-EE27803E73AC}" type="presOf" srcId="{CDEEB3D3-689E-413A-B48B-3B4C259D2CDA}" destId="{19F58809-13FA-49CC-AECD-B6EA26B8D0F9}" srcOrd="0" destOrd="0" presId="urn:microsoft.com/office/officeart/2005/8/layout/equation2"/>
+    <dgm:cxn modelId="{683C64B8-0BF0-4A2E-9133-256426DBA86B}" srcId="{7F6B5A0A-0F54-4B18-951E-1A0CFC44F6C4}" destId="{09353CC5-9DAE-40D9-A6ED-AC3D6931F2A5}" srcOrd="3" destOrd="0" parTransId="{DAF3A442-BF4D-4AC2-A3B6-6C05624A55CE}" sibTransId="{00373967-E678-4682-81B8-B346B7B1880E}"/>
+    <dgm:cxn modelId="{348596DD-86F7-4CC5-9998-9E16C8F5357F}" type="presOf" srcId="{E7CA5D59-5D6A-4850-A24E-CB6E32D1EA89}" destId="{6D3D89C7-2463-4B65-8B98-57E4FF79799E}" srcOrd="1" destOrd="0" presId="urn:microsoft.com/office/officeart/2005/8/layout/equation2"/>
+    <dgm:cxn modelId="{DA7D3650-E88E-4310-A3CB-787262591F55}" type="presOf" srcId="{E7CA5D59-5D6A-4850-A24E-CB6E32D1EA89}" destId="{8C167BF4-3B48-4E48-B7EB-402E1EBCD4C4}" srcOrd="0" destOrd="0" presId="urn:microsoft.com/office/officeart/2005/8/layout/equation2"/>
     <dgm:cxn modelId="{204A073C-B394-4995-92B2-29EDC5B85EE2}" type="presOf" srcId="{13DFDD1A-F857-4873-9289-F89CB29F0AE3}" destId="{CEF2E0B5-9AB4-4780-9ABF-357ADA3D91CB}" srcOrd="0" destOrd="0" presId="urn:microsoft.com/office/officeart/2005/8/layout/equation2"/>
+    <dgm:cxn modelId="{1BFB0EA2-22FF-498D-A19E-FD59F187BE85}" type="presOf" srcId="{7F6B5A0A-0F54-4B18-951E-1A0CFC44F6C4}" destId="{600386E9-DD67-4413-8FD7-D7B9E299B8F1}" srcOrd="0" destOrd="0" presId="urn:microsoft.com/office/officeart/2005/8/layout/equation2"/>
+    <dgm:cxn modelId="{CC6B26CB-7305-494E-80B1-A99DB7744352}" srcId="{7F6B5A0A-0F54-4B18-951E-1A0CFC44F6C4}" destId="{13DFDD1A-F857-4873-9289-F89CB29F0AE3}" srcOrd="2" destOrd="0" parTransId="{35071CC0-26AC-4257-906B-C57E6550F4D8}" sibTransId="{E7CA5D59-5D6A-4850-A24E-CB6E32D1EA89}"/>
     <dgm:cxn modelId="{19C8C83D-641A-494E-A8D8-62E4FE557EF4}" srcId="{7F6B5A0A-0F54-4B18-951E-1A0CFC44F6C4}" destId="{CDEEB3D3-689E-413A-B48B-3B4C259D2CDA}" srcOrd="1" destOrd="0" parTransId="{F27EFF3B-7C66-4921-A60B-0490F7F05817}" sibTransId="{22CC6DC0-3F9A-46C5-B765-A8692E00B968}"/>
-    <dgm:cxn modelId="{9DF4F15D-83DA-4A81-AC99-DAAA7154E8FC}" type="presOf" srcId="{3D7B3E38-995E-45E6-B8E3-FB502DA80652}" destId="{CAE67F45-C242-4CA0-9A93-1CF54DC6A4B2}" srcOrd="0" destOrd="0" presId="urn:microsoft.com/office/officeart/2005/8/layout/equation2"/>
-    <dgm:cxn modelId="{8A82D260-762D-4E67-B9C2-EE27803E73AC}" type="presOf" srcId="{CDEEB3D3-689E-413A-B48B-3B4C259D2CDA}" destId="{19F58809-13FA-49CC-AECD-B6EA26B8D0F9}" srcOrd="0" destOrd="0" presId="urn:microsoft.com/office/officeart/2005/8/layout/equation2"/>
-    <dgm:cxn modelId="{2E697D6D-F056-4088-9E32-833B4B75A03C}" type="presOf" srcId="{09353CC5-9DAE-40D9-A6ED-AC3D6931F2A5}" destId="{019AF5E6-0576-4F30-AF54-C6ABA9F8714D}" srcOrd="0" destOrd="0" presId="urn:microsoft.com/office/officeart/2005/8/layout/equation2"/>
-    <dgm:cxn modelId="{DA7D3650-E88E-4310-A3CB-787262591F55}" type="presOf" srcId="{E7CA5D59-5D6A-4850-A24E-CB6E32D1EA89}" destId="{8C167BF4-3B48-4E48-B7EB-402E1EBCD4C4}" srcOrd="0" destOrd="0" presId="urn:microsoft.com/office/officeart/2005/8/layout/equation2"/>
-    <dgm:cxn modelId="{C4EE0257-8F26-40B8-98FD-28E7D13A18FE}" type="presOf" srcId="{788FFD9D-7404-4CCE-A245-0BD6B0E93B24}" destId="{ADDE6D51-0326-48FC-8262-22DC9FF00928}" srcOrd="0" destOrd="0" presId="urn:microsoft.com/office/officeart/2005/8/layout/equation2"/>
-    <dgm:cxn modelId="{1BFB0EA2-22FF-498D-A19E-FD59F187BE85}" type="presOf" srcId="{7F6B5A0A-0F54-4B18-951E-1A0CFC44F6C4}" destId="{600386E9-DD67-4413-8FD7-D7B9E299B8F1}" srcOrd="0" destOrd="0" presId="urn:microsoft.com/office/officeart/2005/8/layout/equation2"/>
-    <dgm:cxn modelId="{683C64B8-0BF0-4A2E-9133-256426DBA86B}" srcId="{7F6B5A0A-0F54-4B18-951E-1A0CFC44F6C4}" destId="{09353CC5-9DAE-40D9-A6ED-AC3D6931F2A5}" srcOrd="3" destOrd="0" parTransId="{DAF3A442-BF4D-4AC2-A3B6-6C05624A55CE}" sibTransId="{00373967-E678-4682-81B8-B346B7B1880E}"/>
-    <dgm:cxn modelId="{CC6B26CB-7305-494E-80B1-A99DB7744352}" srcId="{7F6B5A0A-0F54-4B18-951E-1A0CFC44F6C4}" destId="{13DFDD1A-F857-4873-9289-F89CB29F0AE3}" srcOrd="2" destOrd="0" parTransId="{35071CC0-26AC-4257-906B-C57E6550F4D8}" sibTransId="{E7CA5D59-5D6A-4850-A24E-CB6E32D1EA89}"/>
-    <dgm:cxn modelId="{348596DD-86F7-4CC5-9998-9E16C8F5357F}" type="presOf" srcId="{E7CA5D59-5D6A-4850-A24E-CB6E32D1EA89}" destId="{6D3D89C7-2463-4B65-8B98-57E4FF79799E}" srcOrd="1" destOrd="0" presId="urn:microsoft.com/office/officeart/2005/8/layout/equation2"/>
     <dgm:cxn modelId="{814D597A-20A3-45B0-BCA8-CE4F71C3F6F8}" type="presParOf" srcId="{600386E9-DD67-4413-8FD7-D7B9E299B8F1}" destId="{19697C7A-B482-43A6-ADF5-AAB6958C65CD}" srcOrd="0" destOrd="0" presId="urn:microsoft.com/office/officeart/2005/8/layout/equation2"/>
     <dgm:cxn modelId="{7433A93E-5832-4E98-A452-511F15FD99D7}" type="presParOf" srcId="{19697C7A-B482-43A6-ADF5-AAB6958C65CD}" destId="{ADDE6D51-0326-48FC-8262-22DC9FF00928}" srcOrd="0" destOrd="0" presId="urn:microsoft.com/office/officeart/2005/8/layout/equation2"/>
     <dgm:cxn modelId="{DD4AE222-CE87-40E7-ACA8-0B228B1FEF42}" type="presParOf" srcId="{19697C7A-B482-43A6-ADF5-AAB6958C65CD}" destId="{FE9B7B2D-6E0A-451B-A6B6-B7A47F0A4ED4}" srcOrd="1" destOrd="0" presId="urn:microsoft.com/office/officeart/2005/8/layout/equation2"/>
@@ -2589,7 +2698,7 @@
         </a:bodyPr>
         <a:lstStyle/>
         <a:p>
-          <a:pPr marL="0" lvl="0" indent="0" algn="ctr" defTabSz="800100">
+          <a:pPr lvl="0" algn="ctr" defTabSz="800100">
             <a:lnSpc>
               <a:spcPct val="90000"/>
             </a:lnSpc>
@@ -2599,7 +2708,6 @@
             <a:spcAft>
               <a:spcPct val="35000"/>
             </a:spcAft>
-            <a:buNone/>
           </a:pPr>
           <a:r>
             <a:rPr lang="en-US" sz="1800" kern="1200" dirty="0"/>
@@ -2662,7 +2770,7 @@
         </a:bodyPr>
         <a:lstStyle/>
         <a:p>
-          <a:pPr marL="0" lvl="0" indent="0" algn="ctr" defTabSz="622300">
+          <a:pPr lvl="0" algn="ctr" defTabSz="622300">
             <a:lnSpc>
               <a:spcPct val="90000"/>
             </a:lnSpc>
@@ -2672,7 +2780,6 @@
             <a:spcAft>
               <a:spcPct val="35000"/>
             </a:spcAft>
-            <a:buNone/>
           </a:pPr>
           <a:endParaRPr lang="en-US" sz="1400" kern="1200"/>
         </a:p>
@@ -2739,7 +2846,7 @@
         </a:bodyPr>
         <a:lstStyle/>
         <a:p>
-          <a:pPr marL="0" lvl="0" indent="0" algn="ctr" defTabSz="800100">
+          <a:pPr lvl="0" algn="ctr" defTabSz="800100">
             <a:lnSpc>
               <a:spcPct val="90000"/>
             </a:lnSpc>
@@ -2749,7 +2856,6 @@
             <a:spcAft>
               <a:spcPct val="35000"/>
             </a:spcAft>
-            <a:buNone/>
           </a:pPr>
           <a:r>
             <a:rPr lang="en-US" sz="1800" kern="1200" dirty="0"/>
@@ -2812,7 +2918,7 @@
         </a:bodyPr>
         <a:lstStyle/>
         <a:p>
-          <a:pPr marL="0" lvl="0" indent="0" algn="ctr" defTabSz="622300">
+          <a:pPr lvl="0" algn="ctr" defTabSz="622300">
             <a:lnSpc>
               <a:spcPct val="90000"/>
             </a:lnSpc>
@@ -2822,7 +2928,6 @@
             <a:spcAft>
               <a:spcPct val="35000"/>
             </a:spcAft>
-            <a:buNone/>
           </a:pPr>
           <a:endParaRPr lang="en-US" sz="1400" kern="1200"/>
         </a:p>
@@ -2889,7 +2994,7 @@
         </a:bodyPr>
         <a:lstStyle/>
         <a:p>
-          <a:pPr marL="0" lvl="0" indent="0" algn="ctr" defTabSz="800100">
+          <a:pPr lvl="0" algn="ctr" defTabSz="800100">
             <a:lnSpc>
               <a:spcPct val="90000"/>
             </a:lnSpc>
@@ -2899,7 +3004,6 @@
             <a:spcAft>
               <a:spcPct val="35000"/>
             </a:spcAft>
-            <a:buNone/>
           </a:pPr>
           <a:r>
             <a:rPr lang="en-US" sz="1800" kern="1200" dirty="0"/>
@@ -2974,7 +3078,7 @@
         </a:bodyPr>
         <a:lstStyle/>
         <a:p>
-          <a:pPr marL="0" lvl="0" indent="0" algn="ctr" defTabSz="355600">
+          <a:pPr lvl="0" algn="ctr" defTabSz="355600">
             <a:lnSpc>
               <a:spcPct val="90000"/>
             </a:lnSpc>
@@ -2984,7 +3088,6 @@
             <a:spcAft>
               <a:spcPct val="35000"/>
             </a:spcAft>
-            <a:buNone/>
           </a:pPr>
           <a:r>
             <a:rPr lang="en-US" sz="800" kern="1200" dirty="0"/>
@@ -3047,7 +3150,7 @@
         </a:bodyPr>
         <a:lstStyle/>
         <a:p>
-          <a:pPr marL="0" lvl="0" indent="0" algn="ctr" defTabSz="266700">
+          <a:pPr lvl="0" algn="ctr" defTabSz="266700">
             <a:lnSpc>
               <a:spcPct val="90000"/>
             </a:lnSpc>
@@ -3057,7 +3160,6 @@
             <a:spcAft>
               <a:spcPct val="35000"/>
             </a:spcAft>
-            <a:buNone/>
           </a:pPr>
           <a:endParaRPr lang="en-US" sz="600" kern="1200"/>
         </a:p>
@@ -3117,7 +3219,7 @@
         </a:bodyPr>
         <a:lstStyle/>
         <a:p>
-          <a:pPr marL="0" lvl="0" indent="0" algn="ctr" defTabSz="355600">
+          <a:pPr lvl="0" algn="ctr" defTabSz="355600">
             <a:lnSpc>
               <a:spcPct val="90000"/>
             </a:lnSpc>
@@ -3127,7 +3229,6 @@
             <a:spcAft>
               <a:spcPct val="35000"/>
             </a:spcAft>
-            <a:buNone/>
           </a:pPr>
           <a:r>
             <a:rPr lang="en-US" sz="800" kern="1200" dirty="0" err="1"/>
@@ -3194,7 +3295,7 @@
         </a:bodyPr>
         <a:lstStyle/>
         <a:p>
-          <a:pPr marL="0" lvl="0" indent="0" algn="ctr" defTabSz="266700">
+          <a:pPr lvl="0" algn="ctr" defTabSz="266700">
             <a:lnSpc>
               <a:spcPct val="90000"/>
             </a:lnSpc>
@@ -3204,7 +3305,6 @@
             <a:spcAft>
               <a:spcPct val="35000"/>
             </a:spcAft>
-            <a:buNone/>
           </a:pPr>
           <a:endParaRPr lang="en-US" sz="600" kern="1200"/>
         </a:p>
@@ -3264,7 +3364,7 @@
         </a:bodyPr>
         <a:lstStyle/>
         <a:p>
-          <a:pPr marL="0" lvl="0" indent="0" algn="ctr" defTabSz="355600">
+          <a:pPr lvl="0" algn="ctr" defTabSz="355600">
             <a:lnSpc>
               <a:spcPct val="90000"/>
             </a:lnSpc>
@@ -3274,7 +3374,6 @@
             <a:spcAft>
               <a:spcPct val="35000"/>
             </a:spcAft>
-            <a:buNone/>
           </a:pPr>
           <a:r>
             <a:rPr lang="en-US" sz="800" kern="1200" dirty="0"/>
@@ -3340,7 +3439,7 @@
         </a:bodyPr>
         <a:lstStyle/>
         <a:p>
-          <a:pPr marL="0" lvl="0" indent="0" algn="ctr" defTabSz="311150">
+          <a:pPr lvl="0" algn="ctr" defTabSz="311150">
             <a:lnSpc>
               <a:spcPct val="90000"/>
             </a:lnSpc>
@@ -3350,7 +3449,6 @@
             <a:spcAft>
               <a:spcPct val="35000"/>
             </a:spcAft>
-            <a:buNone/>
           </a:pPr>
           <a:endParaRPr lang="en-US" sz="700" kern="1200"/>
         </a:p>
@@ -3410,7 +3508,7 @@
         </a:bodyPr>
         <a:lstStyle/>
         <a:p>
-          <a:pPr marL="0" lvl="0" indent="0" algn="ctr" defTabSz="533400">
+          <a:pPr lvl="0" algn="ctr" defTabSz="533400">
             <a:lnSpc>
               <a:spcPct val="90000"/>
             </a:lnSpc>
@@ -3420,7 +3518,6 @@
             <a:spcAft>
               <a:spcPct val="35000"/>
             </a:spcAft>
-            <a:buNone/>
           </a:pPr>
           <a:r>
             <a:rPr lang="en-US" sz="1200" kern="1200" dirty="0"/>
@@ -14386,80 +14483,9 @@
   <p:timing>
     <p:tnLst>
       <p:par>
-        <p:cTn id="1" dur="indefinite" restart="never" nodeType="tmRoot">
-          <p:childTnLst>
-            <p:seq concurrent="1" nextAc="seek">
-              <p:cTn id="2" dur="indefinite" nodeType="mainSeq">
-                <p:childTnLst>
-                  <p:par>
-                    <p:cTn id="3" fill="hold">
-                      <p:stCondLst>
-                        <p:cond delay="indefinite"/>
-                      </p:stCondLst>
-                      <p:childTnLst>
-                        <p:par>
-                          <p:cTn id="4" fill="hold">
-                            <p:stCondLst>
-                              <p:cond delay="0"/>
-                            </p:stCondLst>
-                            <p:childTnLst>
-                              <p:par>
-                                <p:cTn id="5" presetID="1" presetClass="entr" presetSubtype="0" fill="hold" grpId="0" nodeType="clickEffect">
-                                  <p:stCondLst>
-                                    <p:cond delay="0"/>
-                                  </p:stCondLst>
-                                  <p:childTnLst>
-                                    <p:set>
-                                      <p:cBhvr>
-                                        <p:cTn id="6" dur="1" fill="hold">
-                                          <p:stCondLst>
-                                            <p:cond delay="0"/>
-                                          </p:stCondLst>
-                                        </p:cTn>
-                                        <p:tgtEl>
-                                          <p:spTgt spid="18"/>
-                                        </p:tgtEl>
-                                        <p:attrNameLst>
-                                          <p:attrName>style.visibility</p:attrName>
-                                        </p:attrNameLst>
-                                      </p:cBhvr>
-                                      <p:to>
-                                        <p:strVal val="visible"/>
-                                      </p:to>
-                                    </p:set>
-                                  </p:childTnLst>
-                                </p:cTn>
-                              </p:par>
-                            </p:childTnLst>
-                          </p:cTn>
-                        </p:par>
-                      </p:childTnLst>
-                    </p:cTn>
-                  </p:par>
-                </p:childTnLst>
-              </p:cTn>
-              <p:prevCondLst>
-                <p:cond evt="onPrev" delay="0">
-                  <p:tgtEl>
-                    <p:sldTgt/>
-                  </p:tgtEl>
-                </p:cond>
-              </p:prevCondLst>
-              <p:nextCondLst>
-                <p:cond evt="onNext" delay="0">
-                  <p:tgtEl>
-                    <p:sldTgt/>
-                  </p:tgtEl>
-                </p:cond>
-              </p:nextCondLst>
-            </p:seq>
-          </p:childTnLst>
-        </p:cTn>
+        <p:cTn id="1" dur="indefinite" restart="never" nodeType="tmRoot"/>
       </p:par>
     </p:tnLst>
-    <p:bldLst>
-      <p:bldP spid="18" grpId="0" animBg="1"/>
-    </p:bldLst>
   </p:timing>
 </p:sld>
 </file>
@@ -15121,6 +15147,13 @@
   <p:clrMapOvr>
     <a:masterClrMapping/>
   </p:clrMapOvr>
+  <p:timing>
+    <p:tnLst>
+      <p:par>
+        <p:cTn id="1" dur="indefinite" restart="never" nodeType="tmRoot"/>
+      </p:par>
+    </p:tnLst>
+  </p:timing>
 </p:sld>
 </file>
 
@@ -15310,6 +15343,13 @@
   <p:clrMapOvr>
     <a:masterClrMapping/>
   </p:clrMapOvr>
+  <p:timing>
+    <p:tnLst>
+      <p:par>
+        <p:cTn id="1" dur="indefinite" restart="never" nodeType="tmRoot"/>
+      </p:par>
+    </p:tnLst>
+  </p:timing>
 </p:sld>
 </file>
 
@@ -15550,6 +15590,13 @@
   <p:clrMapOvr>
     <a:masterClrMapping/>
   </p:clrMapOvr>
+  <p:timing>
+    <p:tnLst>
+      <p:par>
+        <p:cTn id="1" dur="indefinite" restart="never" nodeType="tmRoot"/>
+      </p:par>
+    </p:tnLst>
+  </p:timing>
 </p:sld>
 </file>
 
@@ -15854,6 +15901,13 @@
   <p:clrMapOvr>
     <a:masterClrMapping/>
   </p:clrMapOvr>
+  <p:timing>
+    <p:tnLst>
+      <p:par>
+        <p:cTn id="1" dur="indefinite" restart="never" nodeType="tmRoot"/>
+      </p:par>
+    </p:tnLst>
+  </p:timing>
 </p:sld>
 </file>
 
@@ -16243,6 +16297,13 @@
   <p:clrMapOvr>
     <a:masterClrMapping/>
   </p:clrMapOvr>
+  <p:timing>
+    <p:tnLst>
+      <p:par>
+        <p:cTn id="1" dur="indefinite" restart="never" nodeType="tmRoot"/>
+      </p:par>
+    </p:tnLst>
+  </p:timing>
 </p:sld>
 </file>
 
@@ -16489,6 +16550,13 @@
   <p:clrMapOvr>
     <a:masterClrMapping/>
   </p:clrMapOvr>
+  <p:timing>
+    <p:tnLst>
+      <p:par>
+        <p:cTn id="1" dur="indefinite" restart="never" nodeType="tmRoot"/>
+      </p:par>
+    </p:tnLst>
+  </p:timing>
 </p:sld>
 </file>
 
@@ -16724,6 +16792,13 @@
   <p:clrMapOvr>
     <a:masterClrMapping/>
   </p:clrMapOvr>
+  <p:timing>
+    <p:tnLst>
+      <p:par>
+        <p:cTn id="1" dur="indefinite" restart="never" nodeType="tmRoot"/>
+      </p:par>
+    </p:tnLst>
+  </p:timing>
 </p:sld>
 </file>
 
@@ -17009,6 +17084,13 @@
   <p:clrMapOvr>
     <a:masterClrMapping/>
   </p:clrMapOvr>
+  <p:timing>
+    <p:tnLst>
+      <p:par>
+        <p:cTn id="1" dur="indefinite" restart="never" nodeType="tmRoot"/>
+      </p:par>
+    </p:tnLst>
+  </p:timing>
 </p:sld>
 </file>
 
@@ -17246,6 +17328,13 @@
   <p:clrMapOvr>
     <a:masterClrMapping/>
   </p:clrMapOvr>
+  <p:timing>
+    <p:tnLst>
+      <p:par>
+        <p:cTn id="1" dur="indefinite" restart="never" nodeType="tmRoot"/>
+      </p:par>
+    </p:tnLst>
+  </p:timing>
 </p:sld>
 </file>
 
@@ -17594,6 +17683,13 @@
   <p:clrMapOvr>
     <a:masterClrMapping/>
   </p:clrMapOvr>
+  <p:timing>
+    <p:tnLst>
+      <p:par>
+        <p:cTn id="1" dur="indefinite" restart="never" nodeType="tmRoot"/>
+      </p:par>
+    </p:tnLst>
+  </p:timing>
 </p:sld>
 </file>
 
@@ -17780,6 +17876,13 @@
   <p:clrMapOvr>
     <a:masterClrMapping/>
   </p:clrMapOvr>
+  <p:timing>
+    <p:tnLst>
+      <p:par>
+        <p:cTn id="1" dur="indefinite" restart="never" nodeType="tmRoot"/>
+      </p:par>
+    </p:tnLst>
+  </p:timing>
 </p:sld>
 </file>
 
@@ -17966,6 +18069,13 @@
   <p:clrMapOvr>
     <a:masterClrMapping/>
   </p:clrMapOvr>
+  <p:timing>
+    <p:tnLst>
+      <p:par>
+        <p:cTn id="1" dur="indefinite" restart="never" nodeType="tmRoot"/>
+      </p:par>
+    </p:tnLst>
+  </p:timing>
 </p:sld>
 </file>
 
@@ -18152,6 +18262,13 @@
   <p:clrMapOvr>
     <a:masterClrMapping/>
   </p:clrMapOvr>
+  <p:timing>
+    <p:tnLst>
+      <p:par>
+        <p:cTn id="1" dur="indefinite" restart="never" nodeType="tmRoot"/>
+      </p:par>
+    </p:tnLst>
+  </p:timing>
 </p:sld>
 </file>
 
@@ -18390,6 +18507,13 @@
   <p:clrMapOvr>
     <a:masterClrMapping/>
   </p:clrMapOvr>
+  <p:timing>
+    <p:tnLst>
+      <p:par>
+        <p:cTn id="1" dur="indefinite" restart="never" nodeType="tmRoot"/>
+      </p:par>
+    </p:tnLst>
+  </p:timing>
 </p:sld>
 </file>
 
@@ -19050,6 +19174,13 @@
   <p:clrMapOvr>
     <a:masterClrMapping/>
   </p:clrMapOvr>
+  <p:timing>
+    <p:tnLst>
+      <p:par>
+        <p:cTn id="1" dur="indefinite" restart="never" nodeType="tmRoot"/>
+      </p:par>
+    </p:tnLst>
+  </p:timing>
 </p:sld>
 </file>
 
@@ -19420,6 +19551,13 @@
   <p:clrMapOvr>
     <a:masterClrMapping/>
   </p:clrMapOvr>
+  <p:timing>
+    <p:tnLst>
+      <p:par>
+        <p:cTn id="1" dur="indefinite" restart="never" nodeType="tmRoot"/>
+      </p:par>
+    </p:tnLst>
+  </p:timing>
 </p:sld>
 </file>
 
@@ -20443,6 +20581,13 @@
   <p:clrMapOvr>
     <a:masterClrMapping/>
   </p:clrMapOvr>
+  <p:timing>
+    <p:tnLst>
+      <p:par>
+        <p:cTn id="1" dur="indefinite" restart="never" nodeType="tmRoot"/>
+      </p:par>
+    </p:tnLst>
+  </p:timing>
 </p:sld>
 </file>
 
@@ -21517,6 +21662,13 @@
   <p:clrMapOvr>
     <a:masterClrMapping/>
   </p:clrMapOvr>
+  <p:timing>
+    <p:tnLst>
+      <p:par>
+        <p:cTn id="1" dur="indefinite" restart="never" nodeType="tmRoot"/>
+      </p:par>
+    </p:tnLst>
+  </p:timing>
 </p:sld>
 </file>
 
@@ -21711,6 +21863,13 @@
   <p:clrMapOvr>
     <a:masterClrMapping/>
   </p:clrMapOvr>
+  <p:timing>
+    <p:tnLst>
+      <p:par>
+        <p:cTn id="1" dur="indefinite" restart="never" nodeType="tmRoot"/>
+      </p:par>
+    </p:tnLst>
+  </p:timing>
 </p:sld>
 </file>
 
@@ -23778,6 +23937,13 @@
   <p:clrMapOvr>
     <a:masterClrMapping/>
   </p:clrMapOvr>
+  <p:timing>
+    <p:tnLst>
+      <p:par>
+        <p:cTn id="1" dur="indefinite" restart="never" nodeType="tmRoot"/>
+      </p:par>
+    </p:tnLst>
+  </p:timing>
 </p:sld>
 </file>
 
@@ -24157,6 +24323,13 @@
   <p:clrMapOvr>
     <a:masterClrMapping/>
   </p:clrMapOvr>
+  <p:timing>
+    <p:tnLst>
+      <p:par>
+        <p:cTn id="1" dur="indefinite" restart="never" nodeType="tmRoot"/>
+      </p:par>
+    </p:tnLst>
+  </p:timing>
 </p:sld>
 </file>
 
@@ -24510,6 +24683,13 @@
   <p:clrMapOvr>
     <a:masterClrMapping/>
   </p:clrMapOvr>
+  <p:timing>
+    <p:tnLst>
+      <p:par>
+        <p:cTn id="1" dur="indefinite" restart="never" nodeType="tmRoot"/>
+      </p:par>
+    </p:tnLst>
+  </p:timing>
 </p:sld>
 </file>
 
@@ -25170,6 +25350,13 @@
   <p:clrMapOvr>
     <a:masterClrMapping/>
   </p:clrMapOvr>
+  <p:timing>
+    <p:tnLst>
+      <p:par>
+        <p:cTn id="1" dur="indefinite" restart="never" nodeType="tmRoot"/>
+      </p:par>
+    </p:tnLst>
+  </p:timing>
 </p:sld>
 </file>
 
@@ -25426,6 +25613,13 @@
   <p:clrMapOvr>
     <a:masterClrMapping/>
   </p:clrMapOvr>
+  <p:timing>
+    <p:tnLst>
+      <p:par>
+        <p:cTn id="1" dur="indefinite" restart="never" nodeType="tmRoot"/>
+      </p:par>
+    </p:tnLst>
+  </p:timing>
 </p:sld>
 </file>
 
@@ -25637,6 +25831,13 @@
   <p:clrMapOvr>
     <a:masterClrMapping/>
   </p:clrMapOvr>
+  <p:timing>
+    <p:tnLst>
+      <p:par>
+        <p:cTn id="1" dur="indefinite" restart="never" nodeType="tmRoot"/>
+      </p:par>
+    </p:tnLst>
+  </p:timing>
 </p:sld>
 </file>
 
@@ -25799,6 +26000,13 @@
   <p:clrMapOvr>
     <a:masterClrMapping/>
   </p:clrMapOvr>
+  <p:timing>
+    <p:tnLst>
+      <p:par>
+        <p:cTn id="1" dur="indefinite" restart="never" nodeType="tmRoot"/>
+      </p:par>
+    </p:tnLst>
+  </p:timing>
 </p:sld>
 </file>
 
@@ -25896,6 +26104,13 @@
   <p:clrMapOvr>
     <a:masterClrMapping/>
   </p:clrMapOvr>
+  <p:timing>
+    <p:tnLst>
+      <p:par>
+        <p:cTn id="1" dur="indefinite" restart="never" nodeType="tmRoot"/>
+      </p:par>
+    </p:tnLst>
+  </p:timing>
 </p:sld>
 </file>
 
@@ -26063,6 +26278,13 @@
   <p:clrMapOvr>
     <a:masterClrMapping/>
   </p:clrMapOvr>
+  <p:timing>
+    <p:tnLst>
+      <p:par>
+        <p:cTn id="1" dur="indefinite" restart="never" nodeType="tmRoot"/>
+      </p:par>
+    </p:tnLst>
+  </p:timing>
 </p:sld>
 </file>
 
@@ -26239,9 +26461,17 @@
               <a:rPr lang="en-US" sz="1600" dirty="0"/>
               <a:t>… (Mostly focus on testing)</a:t>
             </a:r>
+            <a:r>
+              <a:rPr lang="en-US" dirty="0"/>
+              <a:t/>
+            </a:r>
             <a:br>
               <a:rPr lang="en-US" dirty="0"/>
             </a:br>
+            <a:r>
+              <a:rPr lang="en-US" dirty="0"/>
+              <a:t/>
+            </a:r>
             <a:br>
               <a:rPr lang="en-US" dirty="0"/>
             </a:br>
@@ -26345,8 +26575,8 @@
           </a:p>
         </p:txBody>
       </p:sp>
-      <mc:AlternateContent xmlns:mc="http://schemas.openxmlformats.org/markup-compatibility/2006">
-        <mc:Choice xmlns:a14="http://schemas.microsoft.com/office/drawing/2010/main" Requires="a14">
+      <mc:AlternateContent xmlns:mc="http://schemas.openxmlformats.org/markup-compatibility/2006" xmlns:a14="http://schemas.microsoft.com/office/drawing/2010/main">
+        <mc:Choice Requires="a14">
           <p:sp>
             <p:nvSpPr>
               <p:cNvPr id="3" name="Text Placeholder 2">
@@ -26418,7 +26648,7 @@
             </p:txBody>
           </p:sp>
         </mc:Choice>
-        <mc:Fallback>
+        <mc:Fallback xmlns="">
           <p:sp>
             <p:nvSpPr>
               <p:cNvPr id="3" name="Text Placeholder 2">
@@ -26540,6 +26770,13 @@
   <p:clrMapOvr>
     <a:masterClrMapping/>
   </p:clrMapOvr>
+  <p:timing>
+    <p:tnLst>
+      <p:par>
+        <p:cTn id="1" dur="indefinite" restart="never" nodeType="tmRoot"/>
+      </p:par>
+    </p:tnLst>
+  </p:timing>
 </p:sld>
 </file>
 
@@ -27111,6 +27348,13 @@
   <p:clrMapOvr>
     <a:masterClrMapping/>
   </p:clrMapOvr>
+  <p:timing>
+    <p:tnLst>
+      <p:par>
+        <p:cTn id="1" dur="indefinite" restart="never" nodeType="tmRoot"/>
+      </p:par>
+    </p:tnLst>
+  </p:timing>
 </p:sld>
 </file>
 
@@ -27373,6 +27617,21 @@
   <p:clrMapOvr>
     <a:masterClrMapping/>
   </p:clrMapOvr>
+  <mc:AlternateContent xmlns:mc="http://schemas.openxmlformats.org/markup-compatibility/2006">
+    <mc:Choice xmlns:p14="http://schemas.microsoft.com/office/powerpoint/2010/main" Requires="p14">
+      <p:transition spd="slow" p14:dur="2000"/>
+    </mc:Choice>
+    <mc:Fallback>
+      <p:transition spd="slow"/>
+    </mc:Fallback>
+  </mc:AlternateContent>
+  <p:timing>
+    <p:tnLst>
+      <p:par>
+        <p:cTn id="1" dur="indefinite" restart="never" nodeType="tmRoot"/>
+      </p:par>
+    </p:tnLst>
+  </p:timing>
 </p:sld>
 </file>
 
@@ -27635,6 +27894,21 @@
   <p:clrMapOvr>
     <a:masterClrMapping/>
   </p:clrMapOvr>
+  <mc:AlternateContent xmlns:mc="http://schemas.openxmlformats.org/markup-compatibility/2006">
+    <mc:Choice xmlns:p14="http://schemas.microsoft.com/office/powerpoint/2010/main" Requires="p14">
+      <p:transition spd="slow" p14:dur="2000"/>
+    </mc:Choice>
+    <mc:Fallback>
+      <p:transition spd="slow"/>
+    </mc:Fallback>
+  </mc:AlternateContent>
+  <p:timing>
+    <p:tnLst>
+      <p:par>
+        <p:cTn id="1" dur="indefinite" restart="never" nodeType="tmRoot"/>
+      </p:par>
+    </p:tnLst>
+  </p:timing>
 </p:sld>
 </file>
 
@@ -27897,6 +28171,21 @@
   <p:clrMapOvr>
     <a:masterClrMapping/>
   </p:clrMapOvr>
+  <mc:AlternateContent xmlns:mc="http://schemas.openxmlformats.org/markup-compatibility/2006">
+    <mc:Choice xmlns:p14="http://schemas.microsoft.com/office/powerpoint/2010/main" Requires="p14">
+      <p:transition spd="slow" p14:dur="2000"/>
+    </mc:Choice>
+    <mc:Fallback>
+      <p:transition spd="slow"/>
+    </mc:Fallback>
+  </mc:AlternateContent>
+  <p:timing>
+    <p:tnLst>
+      <p:par>
+        <p:cTn id="1" dur="indefinite" restart="never" nodeType="tmRoot"/>
+      </p:par>
+    </p:tnLst>
+  </p:timing>
 </p:sld>
 </file>
 
@@ -28159,6 +28448,21 @@
   <p:clrMapOvr>
     <a:masterClrMapping/>
   </p:clrMapOvr>
+  <mc:AlternateContent xmlns:mc="http://schemas.openxmlformats.org/markup-compatibility/2006">
+    <mc:Choice xmlns:p14="http://schemas.microsoft.com/office/powerpoint/2010/main" Requires="p14">
+      <p:transition spd="slow" p14:dur="2000"/>
+    </mc:Choice>
+    <mc:Fallback>
+      <p:transition spd="slow"/>
+    </mc:Fallback>
+  </mc:AlternateContent>
+  <p:timing>
+    <p:tnLst>
+      <p:par>
+        <p:cTn id="1" dur="indefinite" restart="never" nodeType="tmRoot"/>
+      </p:par>
+    </p:tnLst>
+  </p:timing>
 </p:sld>
 </file>
 
@@ -28334,6 +28638,10 @@
             <a:r>
               <a:rPr lang="en-US" sz="1600" dirty="0"/>
               <a:t>… (Mostly focus on testing)</a:t>
+            </a:r>
+            <a:r>
+              <a:rPr lang="en-US" dirty="0"/>
+              <a:t/>
             </a:r>
             <a:br>
               <a:rPr lang="en-US" dirty="0"/>
@@ -28682,6 +28990,13 @@
   <p:clrMapOvr>
     <a:masterClrMapping/>
   </p:clrMapOvr>
+  <p:timing>
+    <p:tnLst>
+      <p:par>
+        <p:cTn id="1" dur="indefinite" restart="never" nodeType="tmRoot"/>
+      </p:par>
+    </p:tnLst>
+  </p:timing>
 </p:sld>
 </file>
 
@@ -28836,8 +29151,42 @@
               </a:spcAft>
             </a:pPr>
             <a:r>
+              <a:rPr lang="en-US" altLang="zh-CN" sz="1600" dirty="0" smtClean="0"/>
+              <a:t>A system should </a:t>
+            </a:r>
+            <a:r>
+              <a:rPr lang="en-US" altLang="zh-CN" sz="1600" smtClean="0"/>
+              <a:t>work correctly under </a:t>
+            </a:r>
+            <a:r>
+              <a:rPr lang="en-US" altLang="zh-CN" sz="1600" dirty="0" smtClean="0"/>
+              <a:t>certain </a:t>
+            </a:r>
+            <a:r>
+              <a:rPr lang="en-US" altLang="zh-CN" sz="1600" b="1" i="1" dirty="0" smtClean="0"/>
+              <a:t>expected</a:t>
+            </a:r>
+            <a:r>
+              <a:rPr lang="en-US" altLang="zh-CN" sz="1600" dirty="0" smtClean="0"/>
+              <a:t> environment.</a:t>
+            </a:r>
+          </a:p>
+          <a:p>
+            <a:pPr>
+              <a:spcBef>
+                <a:spcPts val="800"/>
+              </a:spcBef>
+              <a:spcAft>
+                <a:spcPts val="1600"/>
+              </a:spcAft>
+            </a:pPr>
+            <a:r>
+              <a:rPr lang="en-US" altLang="zh-CN" sz="1600" dirty="0" smtClean="0"/>
+              <a:t>Developers </a:t>
+            </a:r>
+            <a:r>
               <a:rPr lang="en-US" altLang="zh-CN" sz="1600" dirty="0"/>
-              <a:t>Developers often “over-engineer” a system to deal with errors/deviations in the </a:t>
+              <a:t>often “over-engineer” a system to deal with errors/deviations in the </a:t>
             </a:r>
             <a:r>
               <a:rPr lang="en-US" altLang="zh-CN" sz="1600" b="1" i="1" dirty="0"/>
@@ -28923,6 +29272,13 @@
   <p:clrMapOvr>
     <a:masterClrMapping/>
   </p:clrMapOvr>
+  <p:timing>
+    <p:tnLst>
+      <p:par>
+        <p:cTn id="1" dur="indefinite" restart="never" nodeType="tmRoot"/>
+      </p:par>
+    </p:tnLst>
+  </p:timing>
 </p:sld>
 </file>
 
@@ -29494,6 +29850,13 @@
   <p:clrMapOvr>
     <a:masterClrMapping/>
   </p:clrMapOvr>
+  <p:timing>
+    <p:tnLst>
+      <p:par>
+        <p:cTn id="1" dur="indefinite" restart="never" nodeType="tmRoot"/>
+      </p:par>
+    </p:tnLst>
+  </p:timing>
 </p:sld>
 </file>
 

</xml_diff>